<commit_message>
Added comparison plots to manuscript
</commit_message>
<xml_diff>
--- a/documents/202425s1-RM-Slides-Sy.pptx
+++ b/documents/202425s1-RM-Slides-Sy.pptx
@@ -5,7 +5,7 @@
     <p:sldMasterId id="2147483648" r:id="rId1"/>
   </p:sldMasterIdLst>
   <p:notesMasterIdLst>
-    <p:notesMasterId r:id="rId15"/>
+    <p:notesMasterId r:id="rId19"/>
   </p:notesMasterIdLst>
   <p:sldIdLst>
     <p:sldId id="256" r:id="rId2"/>
@@ -21,6 +21,10 @@
     <p:sldId id="307" r:id="rId12"/>
     <p:sldId id="308" r:id="rId13"/>
     <p:sldId id="309" r:id="rId14"/>
+    <p:sldId id="311" r:id="rId15"/>
+    <p:sldId id="312" r:id="rId16"/>
+    <p:sldId id="313" r:id="rId17"/>
+    <p:sldId id="310" r:id="rId18"/>
   </p:sldIdLst>
   <p:sldSz cx="12192000" cy="6858000"/>
   <p:notesSz cx="6858000" cy="9144000"/>
@@ -153,6 +157,10 @@
           <p14:sldIdLst>
             <p14:sldId id="308"/>
             <p14:sldId id="309"/>
+            <p14:sldId id="311"/>
+            <p14:sldId id="312"/>
+            <p14:sldId id="313"/>
+            <p14:sldId id="310"/>
           </p14:sldIdLst>
         </p14:section>
       </p14:sectionLst>
@@ -11476,7 +11484,7 @@
           <a:p>
             <a:fld id="{B2B8B589-3DCF-4CC3-8CB1-8F263020D954}" type="datetimeFigureOut">
               <a:rPr lang="en-PH" smtClean="0"/>
-              <a:t>09/26/2024</a:t>
+              <a:t>10/02/2024</a:t>
             </a:fld>
             <a:endParaRPr lang="en-PH"/>
           </a:p>
@@ -15730,8 +15738,8 @@
             <a:chExt cx="468720" cy="462960"/>
           </a:xfrm>
         </p:grpSpPr>
-        <mc:AlternateContent xmlns:mc="http://schemas.openxmlformats.org/markup-compatibility/2006">
-          <mc:Choice xmlns:p14="http://schemas.microsoft.com/office/powerpoint/2010/main" Requires="p14">
+        <mc:AlternateContent xmlns:mc="http://schemas.openxmlformats.org/markup-compatibility/2006" xmlns:p14="http://schemas.microsoft.com/office/powerpoint/2010/main">
+          <mc:Choice Requires="p14">
             <p:contentPart p14:bwMode="auto" r:id="rId2">
               <p14:nvContentPartPr>
                 <p14:cNvPr id="9" name="Ink 8">
@@ -15750,7 +15758,7 @@
               </p14:xfrm>
             </p:contentPart>
           </mc:Choice>
-          <mc:Fallback>
+          <mc:Fallback xmlns="">
             <p:pic>
               <p:nvPicPr>
                 <p:cNvPr id="9" name="Ink 8">
@@ -15781,8 +15789,8 @@
             </p:pic>
           </mc:Fallback>
         </mc:AlternateContent>
-        <mc:AlternateContent xmlns:mc="http://schemas.openxmlformats.org/markup-compatibility/2006">
-          <mc:Choice xmlns:p14="http://schemas.microsoft.com/office/powerpoint/2010/main" Requires="p14">
+        <mc:AlternateContent xmlns:mc="http://schemas.openxmlformats.org/markup-compatibility/2006" xmlns:p14="http://schemas.microsoft.com/office/powerpoint/2010/main">
+          <mc:Choice Requires="p14">
             <p:contentPart p14:bwMode="auto" r:id="rId4">
               <p14:nvContentPartPr>
                 <p14:cNvPr id="10" name="Ink 9">
@@ -15801,7 +15809,7 @@
               </p14:xfrm>
             </p:contentPart>
           </mc:Choice>
-          <mc:Fallback>
+          <mc:Fallback xmlns="">
             <p:pic>
               <p:nvPicPr>
                 <p:cNvPr id="10" name="Ink 9">
@@ -15832,8 +15840,8 @@
             </p:pic>
           </mc:Fallback>
         </mc:AlternateContent>
-        <mc:AlternateContent xmlns:mc="http://schemas.openxmlformats.org/markup-compatibility/2006">
-          <mc:Choice xmlns:p14="http://schemas.microsoft.com/office/powerpoint/2010/main" Requires="p14">
+        <mc:AlternateContent xmlns:mc="http://schemas.openxmlformats.org/markup-compatibility/2006" xmlns:p14="http://schemas.microsoft.com/office/powerpoint/2010/main">
+          <mc:Choice Requires="p14">
             <p:contentPart p14:bwMode="auto" r:id="rId6">
               <p14:nvContentPartPr>
                 <p14:cNvPr id="11" name="Ink 10">
@@ -15852,7 +15860,7 @@
               </p14:xfrm>
             </p:contentPart>
           </mc:Choice>
-          <mc:Fallback>
+          <mc:Fallback xmlns="">
             <p:pic>
               <p:nvPicPr>
                 <p:cNvPr id="11" name="Ink 10">
@@ -15883,8 +15891,8 @@
             </p:pic>
           </mc:Fallback>
         </mc:AlternateContent>
-        <mc:AlternateContent xmlns:mc="http://schemas.openxmlformats.org/markup-compatibility/2006">
-          <mc:Choice xmlns:p14="http://schemas.microsoft.com/office/powerpoint/2010/main" Requires="p14">
+        <mc:AlternateContent xmlns:mc="http://schemas.openxmlformats.org/markup-compatibility/2006" xmlns:p14="http://schemas.microsoft.com/office/powerpoint/2010/main">
+          <mc:Choice Requires="p14">
             <p:contentPart p14:bwMode="auto" r:id="rId8">
               <p14:nvContentPartPr>
                 <p14:cNvPr id="12" name="Ink 11">
@@ -15903,7 +15911,7 @@
               </p14:xfrm>
             </p:contentPart>
           </mc:Choice>
-          <mc:Fallback>
+          <mc:Fallback xmlns="">
             <p:pic>
               <p:nvPicPr>
                 <p:cNvPr id="12" name="Ink 11">
@@ -15935,8 +15943,8 @@
           </mc:Fallback>
         </mc:AlternateContent>
       </p:grpSp>
-      <mc:AlternateContent xmlns:mc="http://schemas.openxmlformats.org/markup-compatibility/2006">
-        <mc:Choice xmlns:p14="http://schemas.microsoft.com/office/powerpoint/2010/main" Requires="p14">
+      <mc:AlternateContent xmlns:mc="http://schemas.openxmlformats.org/markup-compatibility/2006" xmlns:p14="http://schemas.microsoft.com/office/powerpoint/2010/main">
+        <mc:Choice Requires="p14">
           <p:contentPart p14:bwMode="auto" r:id="rId10">
             <p14:nvContentPartPr>
               <p14:cNvPr id="13" name="Ink 12">
@@ -15955,7 +15963,7 @@
             </p14:xfrm>
           </p:contentPart>
         </mc:Choice>
-        <mc:Fallback>
+        <mc:Fallback xmlns="">
           <p:pic>
             <p:nvPicPr>
               <p:cNvPr id="13" name="Ink 12">
@@ -15986,8 +15994,8 @@
           </p:pic>
         </mc:Fallback>
       </mc:AlternateContent>
-      <mc:AlternateContent xmlns:mc="http://schemas.openxmlformats.org/markup-compatibility/2006">
-        <mc:Choice xmlns:p14="http://schemas.microsoft.com/office/powerpoint/2010/main" Requires="p14">
+      <mc:AlternateContent xmlns:mc="http://schemas.openxmlformats.org/markup-compatibility/2006" xmlns:p14="http://schemas.microsoft.com/office/powerpoint/2010/main">
+        <mc:Choice Requires="p14">
           <p:contentPart p14:bwMode="auto" r:id="rId12">
             <p14:nvContentPartPr>
               <p14:cNvPr id="19" name="Ink 18">
@@ -16006,7 +16014,7 @@
             </p14:xfrm>
           </p:contentPart>
         </mc:Choice>
-        <mc:Fallback>
+        <mc:Fallback xmlns="">
           <p:pic>
             <p:nvPicPr>
               <p:cNvPr id="19" name="Ink 18">
@@ -16037,8 +16045,8 @@
           </p:pic>
         </mc:Fallback>
       </mc:AlternateContent>
-      <mc:AlternateContent xmlns:mc="http://schemas.openxmlformats.org/markup-compatibility/2006">
-        <mc:Choice xmlns:p14="http://schemas.microsoft.com/office/powerpoint/2010/main" Requires="p14">
+      <mc:AlternateContent xmlns:mc="http://schemas.openxmlformats.org/markup-compatibility/2006" xmlns:p14="http://schemas.microsoft.com/office/powerpoint/2010/main">
+        <mc:Choice Requires="p14">
           <p:contentPart p14:bwMode="auto" r:id="rId14">
             <p14:nvContentPartPr>
               <p14:cNvPr id="22" name="Ink 21">
@@ -16057,7 +16065,7 @@
             </p14:xfrm>
           </p:contentPart>
         </mc:Choice>
-        <mc:Fallback>
+        <mc:Fallback xmlns="">
           <p:pic>
             <p:nvPicPr>
               <p:cNvPr id="22" name="Ink 21">
@@ -16088,8 +16096,8 @@
           </p:pic>
         </mc:Fallback>
       </mc:AlternateContent>
-      <mc:AlternateContent xmlns:mc="http://schemas.openxmlformats.org/markup-compatibility/2006">
-        <mc:Choice xmlns:p14="http://schemas.microsoft.com/office/powerpoint/2010/main" Requires="p14">
+      <mc:AlternateContent xmlns:mc="http://schemas.openxmlformats.org/markup-compatibility/2006" xmlns:p14="http://schemas.microsoft.com/office/powerpoint/2010/main">
+        <mc:Choice Requires="p14">
           <p:contentPart p14:bwMode="auto" r:id="rId16">
             <p14:nvContentPartPr>
               <p14:cNvPr id="23" name="Ink 22">
@@ -16108,7 +16116,7 @@
             </p14:xfrm>
           </p:contentPart>
         </mc:Choice>
-        <mc:Fallback>
+        <mc:Fallback xmlns="">
           <p:pic>
             <p:nvPicPr>
               <p:cNvPr id="23" name="Ink 22">
@@ -16139,8 +16147,8 @@
           </p:pic>
         </mc:Fallback>
       </mc:AlternateContent>
-      <mc:AlternateContent xmlns:mc="http://schemas.openxmlformats.org/markup-compatibility/2006">
-        <mc:Choice xmlns:p14="http://schemas.microsoft.com/office/powerpoint/2010/main" Requires="p14">
+      <mc:AlternateContent xmlns:mc="http://schemas.openxmlformats.org/markup-compatibility/2006" xmlns:p14="http://schemas.microsoft.com/office/powerpoint/2010/main">
+        <mc:Choice Requires="p14">
           <p:contentPart p14:bwMode="auto" r:id="rId18">
             <p14:nvContentPartPr>
               <p14:cNvPr id="24" name="Ink 23">
@@ -16159,7 +16167,7 @@
             </p14:xfrm>
           </p:contentPart>
         </mc:Choice>
-        <mc:Fallback>
+        <mc:Fallback xmlns="">
           <p:pic>
             <p:nvPicPr>
               <p:cNvPr id="24" name="Ink 23">
@@ -16190,8 +16198,8 @@
           </p:pic>
         </mc:Fallback>
       </mc:AlternateContent>
-      <mc:AlternateContent xmlns:mc="http://schemas.openxmlformats.org/markup-compatibility/2006">
-        <mc:Choice xmlns:p14="http://schemas.microsoft.com/office/powerpoint/2010/main" Requires="p14">
+      <mc:AlternateContent xmlns:mc="http://schemas.openxmlformats.org/markup-compatibility/2006" xmlns:p14="http://schemas.microsoft.com/office/powerpoint/2010/main">
+        <mc:Choice Requires="p14">
           <p:contentPart p14:bwMode="auto" r:id="rId20">
             <p14:nvContentPartPr>
               <p14:cNvPr id="35" name="Ink 34">
@@ -16210,7 +16218,7 @@
             </p14:xfrm>
           </p:contentPart>
         </mc:Choice>
-        <mc:Fallback>
+        <mc:Fallback xmlns="">
           <p:pic>
             <p:nvPicPr>
               <p:cNvPr id="35" name="Ink 34">
@@ -16261,8 +16269,8 @@
             <a:chExt cx="2433600" cy="1087560"/>
           </a:xfrm>
         </p:grpSpPr>
-        <mc:AlternateContent xmlns:mc="http://schemas.openxmlformats.org/markup-compatibility/2006">
-          <mc:Choice xmlns:p14="http://schemas.microsoft.com/office/powerpoint/2010/main" Requires="p14">
+        <mc:AlternateContent xmlns:mc="http://schemas.openxmlformats.org/markup-compatibility/2006" xmlns:p14="http://schemas.microsoft.com/office/powerpoint/2010/main">
+          <mc:Choice Requires="p14">
             <p:contentPart p14:bwMode="auto" r:id="rId22">
               <p14:nvContentPartPr>
                 <p14:cNvPr id="18" name="Ink 17">
@@ -16281,7 +16289,7 @@
               </p14:xfrm>
             </p:contentPart>
           </mc:Choice>
-          <mc:Fallback>
+          <mc:Fallback xmlns="">
             <p:pic>
               <p:nvPicPr>
                 <p:cNvPr id="18" name="Ink 17">
@@ -16312,8 +16320,8 @@
             </p:pic>
           </mc:Fallback>
         </mc:AlternateContent>
-        <mc:AlternateContent xmlns:mc="http://schemas.openxmlformats.org/markup-compatibility/2006">
-          <mc:Choice xmlns:p14="http://schemas.microsoft.com/office/powerpoint/2010/main" Requires="p14">
+        <mc:AlternateContent xmlns:mc="http://schemas.openxmlformats.org/markup-compatibility/2006" xmlns:p14="http://schemas.microsoft.com/office/powerpoint/2010/main">
+          <mc:Choice Requires="p14">
             <p:contentPart p14:bwMode="auto" r:id="rId24">
               <p14:nvContentPartPr>
                 <p14:cNvPr id="20" name="Ink 19">
@@ -16332,7 +16340,7 @@
               </p14:xfrm>
             </p:contentPart>
           </mc:Choice>
-          <mc:Fallback>
+          <mc:Fallback xmlns="">
             <p:pic>
               <p:nvPicPr>
                 <p:cNvPr id="20" name="Ink 19">
@@ -16384,8 +16392,8 @@
             <a:chExt cx="619560" cy="439920"/>
           </a:xfrm>
         </p:grpSpPr>
-        <mc:AlternateContent xmlns:mc="http://schemas.openxmlformats.org/markup-compatibility/2006">
-          <mc:Choice xmlns:p14="http://schemas.microsoft.com/office/powerpoint/2010/main" Requires="p14">
+        <mc:AlternateContent xmlns:mc="http://schemas.openxmlformats.org/markup-compatibility/2006" xmlns:p14="http://schemas.microsoft.com/office/powerpoint/2010/main">
+          <mc:Choice Requires="p14">
             <p:contentPart p14:bwMode="auto" r:id="rId26">
               <p14:nvContentPartPr>
                 <p14:cNvPr id="61" name="Ink 60">
@@ -16404,7 +16412,7 @@
               </p14:xfrm>
             </p:contentPart>
           </mc:Choice>
-          <mc:Fallback>
+          <mc:Fallback xmlns="">
             <p:pic>
               <p:nvPicPr>
                 <p:cNvPr id="61" name="Ink 60">
@@ -16435,8 +16443,8 @@
             </p:pic>
           </mc:Fallback>
         </mc:AlternateContent>
-        <mc:AlternateContent xmlns:mc="http://schemas.openxmlformats.org/markup-compatibility/2006">
-          <mc:Choice xmlns:p14="http://schemas.microsoft.com/office/powerpoint/2010/main" Requires="p14">
+        <mc:AlternateContent xmlns:mc="http://schemas.openxmlformats.org/markup-compatibility/2006" xmlns:p14="http://schemas.microsoft.com/office/powerpoint/2010/main">
+          <mc:Choice Requires="p14">
             <p:contentPart p14:bwMode="auto" r:id="rId28">
               <p14:nvContentPartPr>
                 <p14:cNvPr id="62" name="Ink 61">
@@ -16455,7 +16463,7 @@
               </p14:xfrm>
             </p:contentPart>
           </mc:Choice>
-          <mc:Fallback>
+          <mc:Fallback xmlns="">
             <p:pic>
               <p:nvPicPr>
                 <p:cNvPr id="62" name="Ink 61">
@@ -16486,8 +16494,8 @@
             </p:pic>
           </mc:Fallback>
         </mc:AlternateContent>
-        <mc:AlternateContent xmlns:mc="http://schemas.openxmlformats.org/markup-compatibility/2006">
-          <mc:Choice xmlns:p14="http://schemas.microsoft.com/office/powerpoint/2010/main" Requires="p14">
+        <mc:AlternateContent xmlns:mc="http://schemas.openxmlformats.org/markup-compatibility/2006" xmlns:p14="http://schemas.microsoft.com/office/powerpoint/2010/main">
+          <mc:Choice Requires="p14">
             <p:contentPart p14:bwMode="auto" r:id="rId30">
               <p14:nvContentPartPr>
                 <p14:cNvPr id="63" name="Ink 62">
@@ -16506,7 +16514,7 @@
               </p14:xfrm>
             </p:contentPart>
           </mc:Choice>
-          <mc:Fallback>
+          <mc:Fallback xmlns="">
             <p:pic>
               <p:nvPicPr>
                 <p:cNvPr id="63" name="Ink 62">
@@ -16537,8 +16545,8 @@
             </p:pic>
           </mc:Fallback>
         </mc:AlternateContent>
-        <mc:AlternateContent xmlns:mc="http://schemas.openxmlformats.org/markup-compatibility/2006">
-          <mc:Choice xmlns:p14="http://schemas.microsoft.com/office/powerpoint/2010/main" Requires="p14">
+        <mc:AlternateContent xmlns:mc="http://schemas.openxmlformats.org/markup-compatibility/2006" xmlns:p14="http://schemas.microsoft.com/office/powerpoint/2010/main">
+          <mc:Choice Requires="p14">
             <p:contentPart p14:bwMode="auto" r:id="rId32">
               <p14:nvContentPartPr>
                 <p14:cNvPr id="64" name="Ink 63">
@@ -16557,7 +16565,7 @@
               </p14:xfrm>
             </p:contentPart>
           </mc:Choice>
-          <mc:Fallback>
+          <mc:Fallback xmlns="">
             <p:pic>
               <p:nvPicPr>
                 <p:cNvPr id="64" name="Ink 63">
@@ -16609,8 +16617,8 @@
             <a:chExt cx="2000195" cy="617345"/>
           </a:xfrm>
         </p:grpSpPr>
-        <mc:AlternateContent xmlns:mc="http://schemas.openxmlformats.org/markup-compatibility/2006">
-          <mc:Choice xmlns:p14="http://schemas.microsoft.com/office/powerpoint/2010/main" Requires="p14">
+        <mc:AlternateContent xmlns:mc="http://schemas.openxmlformats.org/markup-compatibility/2006" xmlns:p14="http://schemas.microsoft.com/office/powerpoint/2010/main">
+          <mc:Choice Requires="p14">
             <p:contentPart p14:bwMode="auto" r:id="rId34">
               <p14:nvContentPartPr>
                 <p14:cNvPr id="66" name="Ink 65">
@@ -16629,7 +16637,7 @@
               </p14:xfrm>
             </p:contentPart>
           </mc:Choice>
-          <mc:Fallback>
+          <mc:Fallback xmlns="">
             <p:pic>
               <p:nvPicPr>
                 <p:cNvPr id="66" name="Ink 65">
@@ -16660,8 +16668,8 @@
             </p:pic>
           </mc:Fallback>
         </mc:AlternateContent>
-        <mc:AlternateContent xmlns:mc="http://schemas.openxmlformats.org/markup-compatibility/2006">
-          <mc:Choice xmlns:p14="http://schemas.microsoft.com/office/powerpoint/2010/main" Requires="p14">
+        <mc:AlternateContent xmlns:mc="http://schemas.openxmlformats.org/markup-compatibility/2006" xmlns:p14="http://schemas.microsoft.com/office/powerpoint/2010/main">
+          <mc:Choice Requires="p14">
             <p:contentPart p14:bwMode="auto" r:id="rId36">
               <p14:nvContentPartPr>
                 <p14:cNvPr id="67" name="Ink 66">
@@ -16680,7 +16688,7 @@
               </p14:xfrm>
             </p:contentPart>
           </mc:Choice>
-          <mc:Fallback>
+          <mc:Fallback xmlns="">
             <p:pic>
               <p:nvPicPr>
                 <p:cNvPr id="67" name="Ink 66">
@@ -16711,8 +16719,8 @@
             </p:pic>
           </mc:Fallback>
         </mc:AlternateContent>
-        <mc:AlternateContent xmlns:mc="http://schemas.openxmlformats.org/markup-compatibility/2006">
-          <mc:Choice xmlns:p14="http://schemas.microsoft.com/office/powerpoint/2010/main" Requires="p14">
+        <mc:AlternateContent xmlns:mc="http://schemas.openxmlformats.org/markup-compatibility/2006" xmlns:p14="http://schemas.microsoft.com/office/powerpoint/2010/main">
+          <mc:Choice Requires="p14">
             <p:contentPart p14:bwMode="auto" r:id="rId38">
               <p14:nvContentPartPr>
                 <p14:cNvPr id="68" name="Ink 67">
@@ -16731,7 +16739,7 @@
               </p14:xfrm>
             </p:contentPart>
           </mc:Choice>
-          <mc:Fallback>
+          <mc:Fallback xmlns="">
             <p:pic>
               <p:nvPicPr>
                 <p:cNvPr id="68" name="Ink 67">
@@ -16762,8 +16770,8 @@
             </p:pic>
           </mc:Fallback>
         </mc:AlternateContent>
-        <mc:AlternateContent xmlns:mc="http://schemas.openxmlformats.org/markup-compatibility/2006">
-          <mc:Choice xmlns:p14="http://schemas.microsoft.com/office/powerpoint/2010/main" Requires="p14">
+        <mc:AlternateContent xmlns:mc="http://schemas.openxmlformats.org/markup-compatibility/2006" xmlns:p14="http://schemas.microsoft.com/office/powerpoint/2010/main">
+          <mc:Choice Requires="p14">
             <p:contentPart p14:bwMode="auto" r:id="rId40">
               <p14:nvContentPartPr>
                 <p14:cNvPr id="70" name="Ink 69">
@@ -16782,7 +16790,7 @@
               </p14:xfrm>
             </p:contentPart>
           </mc:Choice>
-          <mc:Fallback>
+          <mc:Fallback xmlns="">
             <p:pic>
               <p:nvPicPr>
                 <p:cNvPr id="70" name="Ink 69">
@@ -16813,8 +16821,8 @@
             </p:pic>
           </mc:Fallback>
         </mc:AlternateContent>
-        <mc:AlternateContent xmlns:mc="http://schemas.openxmlformats.org/markup-compatibility/2006">
-          <mc:Choice xmlns:p14="http://schemas.microsoft.com/office/powerpoint/2010/main" Requires="p14">
+        <mc:AlternateContent xmlns:mc="http://schemas.openxmlformats.org/markup-compatibility/2006" xmlns:p14="http://schemas.microsoft.com/office/powerpoint/2010/main">
+          <mc:Choice Requires="p14">
             <p:contentPart p14:bwMode="auto" r:id="rId42">
               <p14:nvContentPartPr>
                 <p14:cNvPr id="71" name="Ink 70">
@@ -16833,7 +16841,7 @@
               </p14:xfrm>
             </p:contentPart>
           </mc:Choice>
-          <mc:Fallback>
+          <mc:Fallback xmlns="">
             <p:pic>
               <p:nvPicPr>
                 <p:cNvPr id="71" name="Ink 70">
@@ -16864,8 +16872,8 @@
             </p:pic>
           </mc:Fallback>
         </mc:AlternateContent>
-        <mc:AlternateContent xmlns:mc="http://schemas.openxmlformats.org/markup-compatibility/2006">
-          <mc:Choice xmlns:p14="http://schemas.microsoft.com/office/powerpoint/2010/main" Requires="p14">
+        <mc:AlternateContent xmlns:mc="http://schemas.openxmlformats.org/markup-compatibility/2006" xmlns:p14="http://schemas.microsoft.com/office/powerpoint/2010/main">
+          <mc:Choice Requires="p14">
             <p:contentPart p14:bwMode="auto" r:id="rId44">
               <p14:nvContentPartPr>
                 <p14:cNvPr id="72" name="Ink 71">
@@ -16884,7 +16892,7 @@
               </p14:xfrm>
             </p:contentPart>
           </mc:Choice>
-          <mc:Fallback>
+          <mc:Fallback xmlns="">
             <p:pic>
               <p:nvPicPr>
                 <p:cNvPr id="72" name="Ink 71">
@@ -16915,8 +16923,8 @@
             </p:pic>
           </mc:Fallback>
         </mc:AlternateContent>
-        <mc:AlternateContent xmlns:mc="http://schemas.openxmlformats.org/markup-compatibility/2006">
-          <mc:Choice xmlns:p14="http://schemas.microsoft.com/office/powerpoint/2010/main" Requires="p14">
+        <mc:AlternateContent xmlns:mc="http://schemas.openxmlformats.org/markup-compatibility/2006" xmlns:p14="http://schemas.microsoft.com/office/powerpoint/2010/main">
+          <mc:Choice Requires="p14">
             <p:contentPart p14:bwMode="auto" r:id="rId46">
               <p14:nvContentPartPr>
                 <p14:cNvPr id="99" name="Ink 98">
@@ -16935,7 +16943,7 @@
               </p14:xfrm>
             </p:contentPart>
           </mc:Choice>
-          <mc:Fallback>
+          <mc:Fallback xmlns="">
             <p:pic>
               <p:nvPicPr>
                 <p:cNvPr id="99" name="Ink 98">
@@ -16966,8 +16974,8 @@
             </p:pic>
           </mc:Fallback>
         </mc:AlternateContent>
-        <mc:AlternateContent xmlns:mc="http://schemas.openxmlformats.org/markup-compatibility/2006">
-          <mc:Choice xmlns:p14="http://schemas.microsoft.com/office/powerpoint/2010/main" Requires="p14">
+        <mc:AlternateContent xmlns:mc="http://schemas.openxmlformats.org/markup-compatibility/2006" xmlns:p14="http://schemas.microsoft.com/office/powerpoint/2010/main">
+          <mc:Choice Requires="p14">
             <p:contentPart p14:bwMode="auto" r:id="rId48">
               <p14:nvContentPartPr>
                 <p14:cNvPr id="100" name="Ink 99">
@@ -16986,7 +16994,7 @@
               </p14:xfrm>
             </p:contentPart>
           </mc:Choice>
-          <mc:Fallback>
+          <mc:Fallback xmlns="">
             <p:pic>
               <p:nvPicPr>
                 <p:cNvPr id="100" name="Ink 99">
@@ -17017,8 +17025,8 @@
             </p:pic>
           </mc:Fallback>
         </mc:AlternateContent>
-        <mc:AlternateContent xmlns:mc="http://schemas.openxmlformats.org/markup-compatibility/2006">
-          <mc:Choice xmlns:p14="http://schemas.microsoft.com/office/powerpoint/2010/main" Requires="p14">
+        <mc:AlternateContent xmlns:mc="http://schemas.openxmlformats.org/markup-compatibility/2006" xmlns:p14="http://schemas.microsoft.com/office/powerpoint/2010/main">
+          <mc:Choice Requires="p14">
             <p:contentPart p14:bwMode="auto" r:id="rId50">
               <p14:nvContentPartPr>
                 <p14:cNvPr id="101" name="Ink 100">
@@ -17037,7 +17045,7 @@
               </p14:xfrm>
             </p:contentPart>
           </mc:Choice>
-          <mc:Fallback>
+          <mc:Fallback xmlns="">
             <p:pic>
               <p:nvPicPr>
                 <p:cNvPr id="101" name="Ink 100">
@@ -17068,8 +17076,8 @@
             </p:pic>
           </mc:Fallback>
         </mc:AlternateContent>
-        <mc:AlternateContent xmlns:mc="http://schemas.openxmlformats.org/markup-compatibility/2006">
-          <mc:Choice xmlns:p14="http://schemas.microsoft.com/office/powerpoint/2010/main" Requires="p14">
+        <mc:AlternateContent xmlns:mc="http://schemas.openxmlformats.org/markup-compatibility/2006" xmlns:p14="http://schemas.microsoft.com/office/powerpoint/2010/main">
+          <mc:Choice Requires="p14">
             <p:contentPart p14:bwMode="auto" r:id="rId52">
               <p14:nvContentPartPr>
                 <p14:cNvPr id="102" name="Ink 101">
@@ -17088,7 +17096,7 @@
               </p14:xfrm>
             </p:contentPart>
           </mc:Choice>
-          <mc:Fallback>
+          <mc:Fallback xmlns="">
             <p:pic>
               <p:nvPicPr>
                 <p:cNvPr id="102" name="Ink 101">
@@ -17119,8 +17127,8 @@
             </p:pic>
           </mc:Fallback>
         </mc:AlternateContent>
-        <mc:AlternateContent xmlns:mc="http://schemas.openxmlformats.org/markup-compatibility/2006">
-          <mc:Choice xmlns:p14="http://schemas.microsoft.com/office/powerpoint/2010/main" Requires="p14">
+        <mc:AlternateContent xmlns:mc="http://schemas.openxmlformats.org/markup-compatibility/2006" xmlns:p14="http://schemas.microsoft.com/office/powerpoint/2010/main">
+          <mc:Choice Requires="p14">
             <p:contentPart p14:bwMode="auto" r:id="rId54">
               <p14:nvContentPartPr>
                 <p14:cNvPr id="103" name="Ink 102">
@@ -17139,7 +17147,7 @@
               </p14:xfrm>
             </p:contentPart>
           </mc:Choice>
-          <mc:Fallback>
+          <mc:Fallback xmlns="">
             <p:pic>
               <p:nvPicPr>
                 <p:cNvPr id="103" name="Ink 102">
@@ -17171,8 +17179,8 @@
           </mc:Fallback>
         </mc:AlternateContent>
       </p:grpSp>
-      <mc:AlternateContent xmlns:mc="http://schemas.openxmlformats.org/markup-compatibility/2006">
-        <mc:Choice xmlns:p14="http://schemas.microsoft.com/office/powerpoint/2010/main" Requires="p14">
+      <mc:AlternateContent xmlns:mc="http://schemas.openxmlformats.org/markup-compatibility/2006" xmlns:p14="http://schemas.microsoft.com/office/powerpoint/2010/main">
+        <mc:Choice Requires="p14">
           <p:contentPart p14:bwMode="auto" r:id="rId56">
             <p14:nvContentPartPr>
               <p14:cNvPr id="185" name="Ink 184">
@@ -17191,7 +17199,7 @@
             </p14:xfrm>
           </p:contentPart>
         </mc:Choice>
-        <mc:Fallback>
+        <mc:Fallback xmlns="">
           <p:pic>
             <p:nvPicPr>
               <p:cNvPr id="185" name="Ink 184">
@@ -17222,8 +17230,8 @@
           </p:pic>
         </mc:Fallback>
       </mc:AlternateContent>
-      <mc:AlternateContent xmlns:mc="http://schemas.openxmlformats.org/markup-compatibility/2006">
-        <mc:Choice xmlns:p14="http://schemas.microsoft.com/office/powerpoint/2010/main" Requires="p14">
+      <mc:AlternateContent xmlns:mc="http://schemas.openxmlformats.org/markup-compatibility/2006" xmlns:p14="http://schemas.microsoft.com/office/powerpoint/2010/main">
+        <mc:Choice Requires="p14">
           <p:contentPart p14:bwMode="auto" r:id="rId58">
             <p14:nvContentPartPr>
               <p14:cNvPr id="36" name="Ink 35">
@@ -17242,7 +17250,7 @@
             </p14:xfrm>
           </p:contentPart>
         </mc:Choice>
-        <mc:Fallback>
+        <mc:Fallback xmlns="">
           <p:pic>
             <p:nvPicPr>
               <p:cNvPr id="36" name="Ink 35">
@@ -17273,8 +17281,8 @@
           </p:pic>
         </mc:Fallback>
       </mc:AlternateContent>
-      <mc:AlternateContent xmlns:mc="http://schemas.openxmlformats.org/markup-compatibility/2006">
-        <mc:Choice xmlns:p14="http://schemas.microsoft.com/office/powerpoint/2010/main" Requires="p14">
+      <mc:AlternateContent xmlns:mc="http://schemas.openxmlformats.org/markup-compatibility/2006" xmlns:p14="http://schemas.microsoft.com/office/powerpoint/2010/main">
+        <mc:Choice Requires="p14">
           <p:contentPart p14:bwMode="auto" r:id="rId60">
             <p14:nvContentPartPr>
               <p14:cNvPr id="37" name="Ink 36">
@@ -17293,7 +17301,7 @@
             </p14:xfrm>
           </p:contentPart>
         </mc:Choice>
-        <mc:Fallback>
+        <mc:Fallback xmlns="">
           <p:pic>
             <p:nvPicPr>
               <p:cNvPr id="37" name="Ink 36">
@@ -17324,8 +17332,8 @@
           </p:pic>
         </mc:Fallback>
       </mc:AlternateContent>
-      <mc:AlternateContent xmlns:mc="http://schemas.openxmlformats.org/markup-compatibility/2006">
-        <mc:Choice xmlns:p14="http://schemas.microsoft.com/office/powerpoint/2010/main" Requires="p14">
+      <mc:AlternateContent xmlns:mc="http://schemas.openxmlformats.org/markup-compatibility/2006" xmlns:p14="http://schemas.microsoft.com/office/powerpoint/2010/main">
+        <mc:Choice Requires="p14">
           <p:contentPart p14:bwMode="auto" r:id="rId62">
             <p14:nvContentPartPr>
               <p14:cNvPr id="41" name="Ink 40">
@@ -17344,7 +17352,7 @@
             </p14:xfrm>
           </p:contentPart>
         </mc:Choice>
-        <mc:Fallback>
+        <mc:Fallback xmlns="">
           <p:pic>
             <p:nvPicPr>
               <p:cNvPr id="41" name="Ink 40">
@@ -17375,8 +17383,8 @@
           </p:pic>
         </mc:Fallback>
       </mc:AlternateContent>
-      <mc:AlternateContent xmlns:mc="http://schemas.openxmlformats.org/markup-compatibility/2006">
-        <mc:Choice xmlns:p14="http://schemas.microsoft.com/office/powerpoint/2010/main" Requires="p14">
+      <mc:AlternateContent xmlns:mc="http://schemas.openxmlformats.org/markup-compatibility/2006" xmlns:p14="http://schemas.microsoft.com/office/powerpoint/2010/main">
+        <mc:Choice Requires="p14">
           <p:contentPart p14:bwMode="auto" r:id="rId64">
             <p14:nvContentPartPr>
               <p14:cNvPr id="42" name="Ink 41">
@@ -17395,7 +17403,7 @@
             </p14:xfrm>
           </p:contentPart>
         </mc:Choice>
-        <mc:Fallback>
+        <mc:Fallback xmlns="">
           <p:pic>
             <p:nvPicPr>
               <p:cNvPr id="42" name="Ink 41">
@@ -17426,8 +17434,8 @@
           </p:pic>
         </mc:Fallback>
       </mc:AlternateContent>
-      <mc:AlternateContent xmlns:mc="http://schemas.openxmlformats.org/markup-compatibility/2006">
-        <mc:Choice xmlns:p14="http://schemas.microsoft.com/office/powerpoint/2010/main" Requires="p14">
+      <mc:AlternateContent xmlns:mc="http://schemas.openxmlformats.org/markup-compatibility/2006" xmlns:p14="http://schemas.microsoft.com/office/powerpoint/2010/main">
+        <mc:Choice Requires="p14">
           <p:contentPart p14:bwMode="auto" r:id="rId66">
             <p14:nvContentPartPr>
               <p14:cNvPr id="43" name="Ink 42">
@@ -17446,7 +17454,7 @@
             </p14:xfrm>
           </p:contentPart>
         </mc:Choice>
-        <mc:Fallback>
+        <mc:Fallback xmlns="">
           <p:pic>
             <p:nvPicPr>
               <p:cNvPr id="43" name="Ink 42">
@@ -17477,8 +17485,8 @@
           </p:pic>
         </mc:Fallback>
       </mc:AlternateContent>
-      <mc:AlternateContent xmlns:mc="http://schemas.openxmlformats.org/markup-compatibility/2006">
-        <mc:Choice xmlns:p14="http://schemas.microsoft.com/office/powerpoint/2010/main" Requires="p14">
+      <mc:AlternateContent xmlns:mc="http://schemas.openxmlformats.org/markup-compatibility/2006" xmlns:p14="http://schemas.microsoft.com/office/powerpoint/2010/main">
+        <mc:Choice Requires="p14">
           <p:contentPart p14:bwMode="auto" r:id="rId68">
             <p14:nvContentPartPr>
               <p14:cNvPr id="44" name="Ink 43">
@@ -17497,7 +17505,7 @@
             </p14:xfrm>
           </p:contentPart>
         </mc:Choice>
-        <mc:Fallback>
+        <mc:Fallback xmlns="">
           <p:pic>
             <p:nvPicPr>
               <p:cNvPr id="44" name="Ink 43">
@@ -17528,8 +17536,8 @@
           </p:pic>
         </mc:Fallback>
       </mc:AlternateContent>
-      <mc:AlternateContent xmlns:mc="http://schemas.openxmlformats.org/markup-compatibility/2006">
-        <mc:Choice xmlns:p14="http://schemas.microsoft.com/office/powerpoint/2010/main" Requires="p14">
+      <mc:AlternateContent xmlns:mc="http://schemas.openxmlformats.org/markup-compatibility/2006" xmlns:p14="http://schemas.microsoft.com/office/powerpoint/2010/main">
+        <mc:Choice Requires="p14">
           <p:contentPart p14:bwMode="auto" r:id="rId70">
             <p14:nvContentPartPr>
               <p14:cNvPr id="45" name="Ink 44">
@@ -17548,7 +17556,7 @@
             </p14:xfrm>
           </p:contentPart>
         </mc:Choice>
-        <mc:Fallback>
+        <mc:Fallback xmlns="">
           <p:pic>
             <p:nvPicPr>
               <p:cNvPr id="45" name="Ink 44">
@@ -17599,8 +17607,8 @@
             <a:chExt cx="845954" cy="373680"/>
           </a:xfrm>
         </p:grpSpPr>
-        <mc:AlternateContent xmlns:mc="http://schemas.openxmlformats.org/markup-compatibility/2006">
-          <mc:Choice xmlns:p14="http://schemas.microsoft.com/office/powerpoint/2010/main" Requires="p14">
+        <mc:AlternateContent xmlns:mc="http://schemas.openxmlformats.org/markup-compatibility/2006" xmlns:p14="http://schemas.microsoft.com/office/powerpoint/2010/main">
+          <mc:Choice Requires="p14">
             <p:contentPart p14:bwMode="auto" r:id="rId72">
               <p14:nvContentPartPr>
                 <p14:cNvPr id="46" name="Ink 45">
@@ -17619,7 +17627,7 @@
               </p14:xfrm>
             </p:contentPart>
           </mc:Choice>
-          <mc:Fallback>
+          <mc:Fallback xmlns="">
             <p:pic>
               <p:nvPicPr>
                 <p:cNvPr id="46" name="Ink 45">
@@ -17650,8 +17658,8 @@
             </p:pic>
           </mc:Fallback>
         </mc:AlternateContent>
-        <mc:AlternateContent xmlns:mc="http://schemas.openxmlformats.org/markup-compatibility/2006">
-          <mc:Choice xmlns:p14="http://schemas.microsoft.com/office/powerpoint/2010/main" Requires="p14">
+        <mc:AlternateContent xmlns:mc="http://schemas.openxmlformats.org/markup-compatibility/2006" xmlns:p14="http://schemas.microsoft.com/office/powerpoint/2010/main">
+          <mc:Choice Requires="p14">
             <p:contentPart p14:bwMode="auto" r:id="rId74">
               <p14:nvContentPartPr>
                 <p14:cNvPr id="47" name="Ink 46">
@@ -17670,7 +17678,7 @@
               </p14:xfrm>
             </p:contentPart>
           </mc:Choice>
-          <mc:Fallback>
+          <mc:Fallback xmlns="">
             <p:pic>
               <p:nvPicPr>
                 <p:cNvPr id="47" name="Ink 46">
@@ -17701,8 +17709,8 @@
             </p:pic>
           </mc:Fallback>
         </mc:AlternateContent>
-        <mc:AlternateContent xmlns:mc="http://schemas.openxmlformats.org/markup-compatibility/2006">
-          <mc:Choice xmlns:p14="http://schemas.microsoft.com/office/powerpoint/2010/main" Requires="p14">
+        <mc:AlternateContent xmlns:mc="http://schemas.openxmlformats.org/markup-compatibility/2006" xmlns:p14="http://schemas.microsoft.com/office/powerpoint/2010/main">
+          <mc:Choice Requires="p14">
             <p:contentPart p14:bwMode="auto" r:id="rId76">
               <p14:nvContentPartPr>
                 <p14:cNvPr id="190" name="Ink 189">
@@ -17721,7 +17729,7 @@
               </p14:xfrm>
             </p:contentPart>
           </mc:Choice>
-          <mc:Fallback>
+          <mc:Fallback xmlns="">
             <p:pic>
               <p:nvPicPr>
                 <p:cNvPr id="190" name="Ink 189">
@@ -17752,8 +17760,8 @@
             </p:pic>
           </mc:Fallback>
         </mc:AlternateContent>
-        <mc:AlternateContent xmlns:mc="http://schemas.openxmlformats.org/markup-compatibility/2006">
-          <mc:Choice xmlns:p14="http://schemas.microsoft.com/office/powerpoint/2010/main" Requires="p14">
+        <mc:AlternateContent xmlns:mc="http://schemas.openxmlformats.org/markup-compatibility/2006" xmlns:p14="http://schemas.microsoft.com/office/powerpoint/2010/main">
+          <mc:Choice Requires="p14">
             <p:contentPart p14:bwMode="auto" r:id="rId78">
               <p14:nvContentPartPr>
                 <p14:cNvPr id="191" name="Ink 190">
@@ -17772,7 +17780,7 @@
               </p14:xfrm>
             </p:contentPart>
           </mc:Choice>
-          <mc:Fallback>
+          <mc:Fallback xmlns="">
             <p:pic>
               <p:nvPicPr>
                 <p:cNvPr id="191" name="Ink 190">
@@ -17803,8 +17811,8 @@
             </p:pic>
           </mc:Fallback>
         </mc:AlternateContent>
-        <mc:AlternateContent xmlns:mc="http://schemas.openxmlformats.org/markup-compatibility/2006">
-          <mc:Choice xmlns:p14="http://schemas.microsoft.com/office/powerpoint/2010/main" Requires="p14">
+        <mc:AlternateContent xmlns:mc="http://schemas.openxmlformats.org/markup-compatibility/2006" xmlns:p14="http://schemas.microsoft.com/office/powerpoint/2010/main">
+          <mc:Choice Requires="p14">
             <p:contentPart p14:bwMode="auto" r:id="rId80">
               <p14:nvContentPartPr>
                 <p14:cNvPr id="193" name="Ink 192">
@@ -17823,7 +17831,7 @@
               </p14:xfrm>
             </p:contentPart>
           </mc:Choice>
-          <mc:Fallback>
+          <mc:Fallback xmlns="">
             <p:pic>
               <p:nvPicPr>
                 <p:cNvPr id="193" name="Ink 192">
@@ -17854,8 +17862,8 @@
             </p:pic>
           </mc:Fallback>
         </mc:AlternateContent>
-        <mc:AlternateContent xmlns:mc="http://schemas.openxmlformats.org/markup-compatibility/2006">
-          <mc:Choice xmlns:p14="http://schemas.microsoft.com/office/powerpoint/2010/main" Requires="p14">
+        <mc:AlternateContent xmlns:mc="http://schemas.openxmlformats.org/markup-compatibility/2006" xmlns:p14="http://schemas.microsoft.com/office/powerpoint/2010/main">
+          <mc:Choice Requires="p14">
             <p:contentPart p14:bwMode="auto" r:id="rId82">
               <p14:nvContentPartPr>
                 <p14:cNvPr id="194" name="Ink 193">
@@ -17874,7 +17882,7 @@
               </p14:xfrm>
             </p:contentPart>
           </mc:Choice>
-          <mc:Fallback>
+          <mc:Fallback xmlns="">
             <p:pic>
               <p:nvPicPr>
                 <p:cNvPr id="194" name="Ink 193">
@@ -17905,8 +17913,8 @@
             </p:pic>
           </mc:Fallback>
         </mc:AlternateContent>
-        <mc:AlternateContent xmlns:mc="http://schemas.openxmlformats.org/markup-compatibility/2006">
-          <mc:Choice xmlns:p14="http://schemas.microsoft.com/office/powerpoint/2010/main" Requires="p14">
+        <mc:AlternateContent xmlns:mc="http://schemas.openxmlformats.org/markup-compatibility/2006" xmlns:p14="http://schemas.microsoft.com/office/powerpoint/2010/main">
+          <mc:Choice Requires="p14">
             <p:contentPart p14:bwMode="auto" r:id="rId84">
               <p14:nvContentPartPr>
                 <p14:cNvPr id="195" name="Ink 194">
@@ -17925,7 +17933,7 @@
               </p14:xfrm>
             </p:contentPart>
           </mc:Choice>
-          <mc:Fallback>
+          <mc:Fallback xmlns="">
             <p:pic>
               <p:nvPicPr>
                 <p:cNvPr id="195" name="Ink 194">
@@ -17956,8 +17964,8 @@
             </p:pic>
           </mc:Fallback>
         </mc:AlternateContent>
-        <mc:AlternateContent xmlns:mc="http://schemas.openxmlformats.org/markup-compatibility/2006">
-          <mc:Choice xmlns:p14="http://schemas.microsoft.com/office/powerpoint/2010/main" Requires="p14">
+        <mc:AlternateContent xmlns:mc="http://schemas.openxmlformats.org/markup-compatibility/2006" xmlns:p14="http://schemas.microsoft.com/office/powerpoint/2010/main">
+          <mc:Choice Requires="p14">
             <p:contentPart p14:bwMode="auto" r:id="rId86">
               <p14:nvContentPartPr>
                 <p14:cNvPr id="196" name="Ink 195">
@@ -17976,7 +17984,7 @@
               </p14:xfrm>
             </p:contentPart>
           </mc:Choice>
-          <mc:Fallback>
+          <mc:Fallback xmlns="">
             <p:pic>
               <p:nvPicPr>
                 <p:cNvPr id="196" name="Ink 195">
@@ -18007,8 +18015,8 @@
             </p:pic>
           </mc:Fallback>
         </mc:AlternateContent>
-        <mc:AlternateContent xmlns:mc="http://schemas.openxmlformats.org/markup-compatibility/2006">
-          <mc:Choice xmlns:p14="http://schemas.microsoft.com/office/powerpoint/2010/main" Requires="p14">
+        <mc:AlternateContent xmlns:mc="http://schemas.openxmlformats.org/markup-compatibility/2006" xmlns:p14="http://schemas.microsoft.com/office/powerpoint/2010/main">
+          <mc:Choice Requires="p14">
             <p:contentPart p14:bwMode="auto" r:id="rId88">
               <p14:nvContentPartPr>
                 <p14:cNvPr id="198" name="Ink 197">
@@ -18027,7 +18035,7 @@
               </p14:xfrm>
             </p:contentPart>
           </mc:Choice>
-          <mc:Fallback>
+          <mc:Fallback xmlns="">
             <p:pic>
               <p:nvPicPr>
                 <p:cNvPr id="198" name="Ink 197">
@@ -18058,8 +18066,8 @@
             </p:pic>
           </mc:Fallback>
         </mc:AlternateContent>
-        <mc:AlternateContent xmlns:mc="http://schemas.openxmlformats.org/markup-compatibility/2006">
-          <mc:Choice xmlns:p14="http://schemas.microsoft.com/office/powerpoint/2010/main" Requires="p14">
+        <mc:AlternateContent xmlns:mc="http://schemas.openxmlformats.org/markup-compatibility/2006" xmlns:p14="http://schemas.microsoft.com/office/powerpoint/2010/main">
+          <mc:Choice Requires="p14">
             <p:contentPart p14:bwMode="auto" r:id="rId90">
               <p14:nvContentPartPr>
                 <p14:cNvPr id="202" name="Ink 201">
@@ -18078,7 +18086,7 @@
               </p14:xfrm>
             </p:contentPart>
           </mc:Choice>
-          <mc:Fallback>
+          <mc:Fallback xmlns="">
             <p:pic>
               <p:nvPicPr>
                 <p:cNvPr id="202" name="Ink 201">
@@ -18110,8 +18118,8 @@
           </mc:Fallback>
         </mc:AlternateContent>
       </p:grpSp>
-      <mc:AlternateContent xmlns:mc="http://schemas.openxmlformats.org/markup-compatibility/2006">
-        <mc:Choice xmlns:p14="http://schemas.microsoft.com/office/powerpoint/2010/main" Requires="p14">
+      <mc:AlternateContent xmlns:mc="http://schemas.openxmlformats.org/markup-compatibility/2006" xmlns:p14="http://schemas.microsoft.com/office/powerpoint/2010/main">
+        <mc:Choice Requires="p14">
           <p:contentPart p14:bwMode="auto" r:id="rId92">
             <p14:nvContentPartPr>
               <p14:cNvPr id="225" name="Ink 224">
@@ -18130,7 +18138,7 @@
             </p14:xfrm>
           </p:contentPart>
         </mc:Choice>
-        <mc:Fallback>
+        <mc:Fallback xmlns="">
           <p:pic>
             <p:nvPicPr>
               <p:cNvPr id="225" name="Ink 224">
@@ -18181,8 +18189,8 @@
             <a:chExt cx="897840" cy="311400"/>
           </a:xfrm>
         </p:grpSpPr>
-        <mc:AlternateContent xmlns:mc="http://schemas.openxmlformats.org/markup-compatibility/2006">
-          <mc:Choice xmlns:p14="http://schemas.microsoft.com/office/powerpoint/2010/main" Requires="p14">
+        <mc:AlternateContent xmlns:mc="http://schemas.openxmlformats.org/markup-compatibility/2006" xmlns:p14="http://schemas.microsoft.com/office/powerpoint/2010/main">
+          <mc:Choice Requires="p14">
             <p:contentPart p14:bwMode="auto" r:id="rId94">
               <p14:nvContentPartPr>
                 <p14:cNvPr id="26" name="Ink 25">
@@ -18201,7 +18209,7 @@
               </p14:xfrm>
             </p:contentPart>
           </mc:Choice>
-          <mc:Fallback>
+          <mc:Fallback xmlns="">
             <p:pic>
               <p:nvPicPr>
                 <p:cNvPr id="26" name="Ink 25">
@@ -18232,8 +18240,8 @@
             </p:pic>
           </mc:Fallback>
         </mc:AlternateContent>
-        <mc:AlternateContent xmlns:mc="http://schemas.openxmlformats.org/markup-compatibility/2006">
-          <mc:Choice xmlns:p14="http://schemas.microsoft.com/office/powerpoint/2010/main" Requires="p14">
+        <mc:AlternateContent xmlns:mc="http://schemas.openxmlformats.org/markup-compatibility/2006" xmlns:p14="http://schemas.microsoft.com/office/powerpoint/2010/main">
+          <mc:Choice Requires="p14">
             <p:contentPart p14:bwMode="auto" r:id="rId96">
               <p14:nvContentPartPr>
                 <p14:cNvPr id="27" name="Ink 26">
@@ -18252,7 +18260,7 @@
               </p14:xfrm>
             </p:contentPart>
           </mc:Choice>
-          <mc:Fallback>
+          <mc:Fallback xmlns="">
             <p:pic>
               <p:nvPicPr>
                 <p:cNvPr id="27" name="Ink 26">
@@ -18283,8 +18291,8 @@
             </p:pic>
           </mc:Fallback>
         </mc:AlternateContent>
-        <mc:AlternateContent xmlns:mc="http://schemas.openxmlformats.org/markup-compatibility/2006">
-          <mc:Choice xmlns:p14="http://schemas.microsoft.com/office/powerpoint/2010/main" Requires="p14">
+        <mc:AlternateContent xmlns:mc="http://schemas.openxmlformats.org/markup-compatibility/2006" xmlns:p14="http://schemas.microsoft.com/office/powerpoint/2010/main">
+          <mc:Choice Requires="p14">
             <p:contentPart p14:bwMode="auto" r:id="rId98">
               <p14:nvContentPartPr>
                 <p14:cNvPr id="28" name="Ink 27">
@@ -18303,7 +18311,7 @@
               </p14:xfrm>
             </p:contentPart>
           </mc:Choice>
-          <mc:Fallback>
+          <mc:Fallback xmlns="">
             <p:pic>
               <p:nvPicPr>
                 <p:cNvPr id="28" name="Ink 27">
@@ -18334,8 +18342,8 @@
             </p:pic>
           </mc:Fallback>
         </mc:AlternateContent>
-        <mc:AlternateContent xmlns:mc="http://schemas.openxmlformats.org/markup-compatibility/2006">
-          <mc:Choice xmlns:p14="http://schemas.microsoft.com/office/powerpoint/2010/main" Requires="p14">
+        <mc:AlternateContent xmlns:mc="http://schemas.openxmlformats.org/markup-compatibility/2006" xmlns:p14="http://schemas.microsoft.com/office/powerpoint/2010/main">
+          <mc:Choice Requires="p14">
             <p:contentPart p14:bwMode="auto" r:id="rId99">
               <p14:nvContentPartPr>
                 <p14:cNvPr id="29" name="Ink 28">
@@ -18354,7 +18362,7 @@
               </p14:xfrm>
             </p:contentPart>
           </mc:Choice>
-          <mc:Fallback>
+          <mc:Fallback xmlns="">
             <p:pic>
               <p:nvPicPr>
                 <p:cNvPr id="29" name="Ink 28">
@@ -18385,8 +18393,8 @@
             </p:pic>
           </mc:Fallback>
         </mc:AlternateContent>
-        <mc:AlternateContent xmlns:mc="http://schemas.openxmlformats.org/markup-compatibility/2006">
-          <mc:Choice xmlns:p14="http://schemas.microsoft.com/office/powerpoint/2010/main" Requires="p14">
+        <mc:AlternateContent xmlns:mc="http://schemas.openxmlformats.org/markup-compatibility/2006" xmlns:p14="http://schemas.microsoft.com/office/powerpoint/2010/main">
+          <mc:Choice Requires="p14">
             <p:contentPart p14:bwMode="auto" r:id="rId101">
               <p14:nvContentPartPr>
                 <p14:cNvPr id="30" name="Ink 29">
@@ -18405,7 +18413,7 @@
               </p14:xfrm>
             </p:contentPart>
           </mc:Choice>
-          <mc:Fallback>
+          <mc:Fallback xmlns="">
             <p:pic>
               <p:nvPicPr>
                 <p:cNvPr id="30" name="Ink 29">
@@ -18436,8 +18444,8 @@
             </p:pic>
           </mc:Fallback>
         </mc:AlternateContent>
-        <mc:AlternateContent xmlns:mc="http://schemas.openxmlformats.org/markup-compatibility/2006">
-          <mc:Choice xmlns:p14="http://schemas.microsoft.com/office/powerpoint/2010/main" Requires="p14">
+        <mc:AlternateContent xmlns:mc="http://schemas.openxmlformats.org/markup-compatibility/2006" xmlns:p14="http://schemas.microsoft.com/office/powerpoint/2010/main">
+          <mc:Choice Requires="p14">
             <p:contentPart p14:bwMode="auto" r:id="rId103">
               <p14:nvContentPartPr>
                 <p14:cNvPr id="31" name="Ink 30">
@@ -18456,7 +18464,7 @@
               </p14:xfrm>
             </p:contentPart>
           </mc:Choice>
-          <mc:Fallback>
+          <mc:Fallback xmlns="">
             <p:pic>
               <p:nvPicPr>
                 <p:cNvPr id="31" name="Ink 30">
@@ -18487,8 +18495,8 @@
             </p:pic>
           </mc:Fallback>
         </mc:AlternateContent>
-        <mc:AlternateContent xmlns:mc="http://schemas.openxmlformats.org/markup-compatibility/2006">
-          <mc:Choice xmlns:p14="http://schemas.microsoft.com/office/powerpoint/2010/main" Requires="p14">
+        <mc:AlternateContent xmlns:mc="http://schemas.openxmlformats.org/markup-compatibility/2006" xmlns:p14="http://schemas.microsoft.com/office/powerpoint/2010/main">
+          <mc:Choice Requires="p14">
             <p:contentPart p14:bwMode="auto" r:id="rId105">
               <p14:nvContentPartPr>
                 <p14:cNvPr id="32" name="Ink 31">
@@ -18507,7 +18515,7 @@
               </p14:xfrm>
             </p:contentPart>
           </mc:Choice>
-          <mc:Fallback>
+          <mc:Fallback xmlns="">
             <p:pic>
               <p:nvPicPr>
                 <p:cNvPr id="32" name="Ink 31">
@@ -18538,8 +18546,8 @@
             </p:pic>
           </mc:Fallback>
         </mc:AlternateContent>
-        <mc:AlternateContent xmlns:mc="http://schemas.openxmlformats.org/markup-compatibility/2006">
-          <mc:Choice xmlns:p14="http://schemas.microsoft.com/office/powerpoint/2010/main" Requires="p14">
+        <mc:AlternateContent xmlns:mc="http://schemas.openxmlformats.org/markup-compatibility/2006" xmlns:p14="http://schemas.microsoft.com/office/powerpoint/2010/main">
+          <mc:Choice Requires="p14">
             <p:contentPart p14:bwMode="auto" r:id="rId107">
               <p14:nvContentPartPr>
                 <p14:cNvPr id="33" name="Ink 32">
@@ -18558,7 +18566,7 @@
               </p14:xfrm>
             </p:contentPart>
           </mc:Choice>
-          <mc:Fallback>
+          <mc:Fallback xmlns="">
             <p:pic>
               <p:nvPicPr>
                 <p:cNvPr id="33" name="Ink 32">
@@ -18589,8 +18597,8 @@
             </p:pic>
           </mc:Fallback>
         </mc:AlternateContent>
-        <mc:AlternateContent xmlns:mc="http://schemas.openxmlformats.org/markup-compatibility/2006">
-          <mc:Choice xmlns:p14="http://schemas.microsoft.com/office/powerpoint/2010/main" Requires="p14">
+        <mc:AlternateContent xmlns:mc="http://schemas.openxmlformats.org/markup-compatibility/2006" xmlns:p14="http://schemas.microsoft.com/office/powerpoint/2010/main">
+          <mc:Choice Requires="p14">
             <p:contentPart p14:bwMode="auto" r:id="rId109">
               <p14:nvContentPartPr>
                 <p14:cNvPr id="226" name="Ink 225">
@@ -18609,7 +18617,7 @@
               </p14:xfrm>
             </p:contentPart>
           </mc:Choice>
-          <mc:Fallback>
+          <mc:Fallback xmlns="">
             <p:pic>
               <p:nvPicPr>
                 <p:cNvPr id="226" name="Ink 225">
@@ -18640,8 +18648,8 @@
             </p:pic>
           </mc:Fallback>
         </mc:AlternateContent>
-        <mc:AlternateContent xmlns:mc="http://schemas.openxmlformats.org/markup-compatibility/2006">
-          <mc:Choice xmlns:p14="http://schemas.microsoft.com/office/powerpoint/2010/main" Requires="p14">
+        <mc:AlternateContent xmlns:mc="http://schemas.openxmlformats.org/markup-compatibility/2006" xmlns:p14="http://schemas.microsoft.com/office/powerpoint/2010/main">
+          <mc:Choice Requires="p14">
             <p:contentPart p14:bwMode="auto" r:id="rId111">
               <p14:nvContentPartPr>
                 <p14:cNvPr id="227" name="Ink 226">
@@ -18660,7 +18668,7 @@
               </p14:xfrm>
             </p:contentPart>
           </mc:Choice>
-          <mc:Fallback>
+          <mc:Fallback xmlns="">
             <p:pic>
               <p:nvPicPr>
                 <p:cNvPr id="227" name="Ink 226">
@@ -18692,8 +18700,8 @@
           </mc:Fallback>
         </mc:AlternateContent>
       </p:grpSp>
-      <mc:AlternateContent xmlns:mc="http://schemas.openxmlformats.org/markup-compatibility/2006">
-        <mc:Choice xmlns:p14="http://schemas.microsoft.com/office/powerpoint/2010/main" Requires="p14">
+      <mc:AlternateContent xmlns:mc="http://schemas.openxmlformats.org/markup-compatibility/2006" xmlns:p14="http://schemas.microsoft.com/office/powerpoint/2010/main">
+        <mc:Choice Requires="p14">
           <p:contentPart p14:bwMode="auto" r:id="rId113">
             <p14:nvContentPartPr>
               <p14:cNvPr id="157" name="Ink 156">
@@ -18712,7 +18720,7 @@
             </p14:xfrm>
           </p:contentPart>
         </mc:Choice>
-        <mc:Fallback>
+        <mc:Fallback xmlns="">
           <p:pic>
             <p:nvPicPr>
               <p:cNvPr id="157" name="Ink 156">
@@ -18743,8 +18751,8 @@
           </p:pic>
         </mc:Fallback>
       </mc:AlternateContent>
-      <mc:AlternateContent xmlns:mc="http://schemas.openxmlformats.org/markup-compatibility/2006">
-        <mc:Choice xmlns:p14="http://schemas.microsoft.com/office/powerpoint/2010/main" Requires="p14">
+      <mc:AlternateContent xmlns:mc="http://schemas.openxmlformats.org/markup-compatibility/2006" xmlns:p14="http://schemas.microsoft.com/office/powerpoint/2010/main">
+        <mc:Choice Requires="p14">
           <p:contentPart p14:bwMode="auto" r:id="rId115">
             <p14:nvContentPartPr>
               <p14:cNvPr id="158" name="Ink 157">
@@ -18763,7 +18771,7 @@
             </p14:xfrm>
           </p:contentPart>
         </mc:Choice>
-        <mc:Fallback>
+        <mc:Fallback xmlns="">
           <p:pic>
             <p:nvPicPr>
               <p:cNvPr id="158" name="Ink 157">
@@ -18794,8 +18802,8 @@
           </p:pic>
         </mc:Fallback>
       </mc:AlternateContent>
-      <mc:AlternateContent xmlns:mc="http://schemas.openxmlformats.org/markup-compatibility/2006">
-        <mc:Choice xmlns:p14="http://schemas.microsoft.com/office/powerpoint/2010/main" Requires="p14">
+      <mc:AlternateContent xmlns:mc="http://schemas.openxmlformats.org/markup-compatibility/2006" xmlns:p14="http://schemas.microsoft.com/office/powerpoint/2010/main">
+        <mc:Choice Requires="p14">
           <p:contentPart p14:bwMode="auto" r:id="rId117">
             <p14:nvContentPartPr>
               <p14:cNvPr id="160" name="Ink 159">
@@ -18814,7 +18822,7 @@
             </p14:xfrm>
           </p:contentPart>
         </mc:Choice>
-        <mc:Fallback>
+        <mc:Fallback xmlns="">
           <p:pic>
             <p:nvPicPr>
               <p:cNvPr id="160" name="Ink 159">
@@ -18845,8 +18853,8 @@
           </p:pic>
         </mc:Fallback>
       </mc:AlternateContent>
-      <mc:AlternateContent xmlns:mc="http://schemas.openxmlformats.org/markup-compatibility/2006">
-        <mc:Choice xmlns:p14="http://schemas.microsoft.com/office/powerpoint/2010/main" Requires="p14">
+      <mc:AlternateContent xmlns:mc="http://schemas.openxmlformats.org/markup-compatibility/2006" xmlns:p14="http://schemas.microsoft.com/office/powerpoint/2010/main">
+        <mc:Choice Requires="p14">
           <p:contentPart p14:bwMode="auto" r:id="rId119">
             <p14:nvContentPartPr>
               <p14:cNvPr id="161" name="Ink 160">
@@ -18865,7 +18873,7 @@
             </p14:xfrm>
           </p:contentPart>
         </mc:Choice>
-        <mc:Fallback>
+        <mc:Fallback xmlns="">
           <p:pic>
             <p:nvPicPr>
               <p:cNvPr id="161" name="Ink 160">
@@ -18896,8 +18904,8 @@
           </p:pic>
         </mc:Fallback>
       </mc:AlternateContent>
-      <mc:AlternateContent xmlns:mc="http://schemas.openxmlformats.org/markup-compatibility/2006">
-        <mc:Choice xmlns:p14="http://schemas.microsoft.com/office/powerpoint/2010/main" Requires="p14">
+      <mc:AlternateContent xmlns:mc="http://schemas.openxmlformats.org/markup-compatibility/2006" xmlns:p14="http://schemas.microsoft.com/office/powerpoint/2010/main">
+        <mc:Choice Requires="p14">
           <p:contentPart p14:bwMode="auto" r:id="rId121">
             <p14:nvContentPartPr>
               <p14:cNvPr id="163" name="Ink 162">
@@ -18916,7 +18924,7 @@
             </p14:xfrm>
           </p:contentPart>
         </mc:Choice>
-        <mc:Fallback>
+        <mc:Fallback xmlns="">
           <p:pic>
             <p:nvPicPr>
               <p:cNvPr id="163" name="Ink 162">
@@ -18947,8 +18955,8 @@
           </p:pic>
         </mc:Fallback>
       </mc:AlternateContent>
-      <mc:AlternateContent xmlns:mc="http://schemas.openxmlformats.org/markup-compatibility/2006">
-        <mc:Choice xmlns:p14="http://schemas.microsoft.com/office/powerpoint/2010/main" Requires="p14">
+      <mc:AlternateContent xmlns:mc="http://schemas.openxmlformats.org/markup-compatibility/2006" xmlns:p14="http://schemas.microsoft.com/office/powerpoint/2010/main">
+        <mc:Choice Requires="p14">
           <p:contentPart p14:bwMode="auto" r:id="rId123">
             <p14:nvContentPartPr>
               <p14:cNvPr id="164" name="Ink 163">
@@ -18967,7 +18975,7 @@
             </p14:xfrm>
           </p:contentPart>
         </mc:Choice>
-        <mc:Fallback>
+        <mc:Fallback xmlns="">
           <p:pic>
             <p:nvPicPr>
               <p:cNvPr id="164" name="Ink 163">
@@ -18998,8 +19006,8 @@
           </p:pic>
         </mc:Fallback>
       </mc:AlternateContent>
-      <mc:AlternateContent xmlns:mc="http://schemas.openxmlformats.org/markup-compatibility/2006">
-        <mc:Choice xmlns:p14="http://schemas.microsoft.com/office/powerpoint/2010/main" Requires="p14">
+      <mc:AlternateContent xmlns:mc="http://schemas.openxmlformats.org/markup-compatibility/2006" xmlns:p14="http://schemas.microsoft.com/office/powerpoint/2010/main">
+        <mc:Choice Requires="p14">
           <p:contentPart p14:bwMode="auto" r:id="rId125">
             <p14:nvContentPartPr>
               <p14:cNvPr id="165" name="Ink 164">
@@ -19018,7 +19026,7 @@
             </p14:xfrm>
           </p:contentPart>
         </mc:Choice>
-        <mc:Fallback>
+        <mc:Fallback xmlns="">
           <p:pic>
             <p:nvPicPr>
               <p:cNvPr id="165" name="Ink 164">
@@ -19049,8 +19057,8 @@
           </p:pic>
         </mc:Fallback>
       </mc:AlternateContent>
-      <mc:AlternateContent xmlns:mc="http://schemas.openxmlformats.org/markup-compatibility/2006">
-        <mc:Choice xmlns:p14="http://schemas.microsoft.com/office/powerpoint/2010/main" Requires="p14">
+      <mc:AlternateContent xmlns:mc="http://schemas.openxmlformats.org/markup-compatibility/2006" xmlns:p14="http://schemas.microsoft.com/office/powerpoint/2010/main">
+        <mc:Choice Requires="p14">
           <p:contentPart p14:bwMode="auto" r:id="rId127">
             <p14:nvContentPartPr>
               <p14:cNvPr id="166" name="Ink 165">
@@ -19069,7 +19077,7 @@
             </p14:xfrm>
           </p:contentPart>
         </mc:Choice>
-        <mc:Fallback>
+        <mc:Fallback xmlns="">
           <p:pic>
             <p:nvPicPr>
               <p:cNvPr id="166" name="Ink 165">
@@ -19100,8 +19108,8 @@
           </p:pic>
         </mc:Fallback>
       </mc:AlternateContent>
-      <mc:AlternateContent xmlns:mc="http://schemas.openxmlformats.org/markup-compatibility/2006">
-        <mc:Choice xmlns:p14="http://schemas.microsoft.com/office/powerpoint/2010/main" Requires="p14">
+      <mc:AlternateContent xmlns:mc="http://schemas.openxmlformats.org/markup-compatibility/2006" xmlns:p14="http://schemas.microsoft.com/office/powerpoint/2010/main">
+        <mc:Choice Requires="p14">
           <p:contentPart p14:bwMode="auto" r:id="rId129">
             <p14:nvContentPartPr>
               <p14:cNvPr id="167" name="Ink 166">
@@ -19120,7 +19128,7 @@
             </p14:xfrm>
           </p:contentPart>
         </mc:Choice>
-        <mc:Fallback>
+        <mc:Fallback xmlns="">
           <p:pic>
             <p:nvPicPr>
               <p:cNvPr id="167" name="Ink 166">
@@ -19151,8 +19159,8 @@
           </p:pic>
         </mc:Fallback>
       </mc:AlternateContent>
-      <mc:AlternateContent xmlns:mc="http://schemas.openxmlformats.org/markup-compatibility/2006">
-        <mc:Choice xmlns:p14="http://schemas.microsoft.com/office/powerpoint/2010/main" Requires="p14">
+      <mc:AlternateContent xmlns:mc="http://schemas.openxmlformats.org/markup-compatibility/2006" xmlns:p14="http://schemas.microsoft.com/office/powerpoint/2010/main">
+        <mc:Choice Requires="p14">
           <p:contentPart p14:bwMode="auto" r:id="rId131">
             <p14:nvContentPartPr>
               <p14:cNvPr id="168" name="Ink 167">
@@ -19171,7 +19179,7 @@
             </p14:xfrm>
           </p:contentPart>
         </mc:Choice>
-        <mc:Fallback>
+        <mc:Fallback xmlns="">
           <p:pic>
             <p:nvPicPr>
               <p:cNvPr id="168" name="Ink 167">
@@ -19202,8 +19210,8 @@
           </p:pic>
         </mc:Fallback>
       </mc:AlternateContent>
-      <mc:AlternateContent xmlns:mc="http://schemas.openxmlformats.org/markup-compatibility/2006">
-        <mc:Choice xmlns:p14="http://schemas.microsoft.com/office/powerpoint/2010/main" Requires="p14">
+      <mc:AlternateContent xmlns:mc="http://schemas.openxmlformats.org/markup-compatibility/2006" xmlns:p14="http://schemas.microsoft.com/office/powerpoint/2010/main">
+        <mc:Choice Requires="p14">
           <p:contentPart p14:bwMode="auto" r:id="rId133">
             <p14:nvContentPartPr>
               <p14:cNvPr id="170" name="Ink 169">
@@ -19222,7 +19230,7 @@
             </p14:xfrm>
           </p:contentPart>
         </mc:Choice>
-        <mc:Fallback>
+        <mc:Fallback xmlns="">
           <p:pic>
             <p:nvPicPr>
               <p:cNvPr id="170" name="Ink 169">
@@ -19253,8 +19261,8 @@
           </p:pic>
         </mc:Fallback>
       </mc:AlternateContent>
-      <mc:AlternateContent xmlns:mc="http://schemas.openxmlformats.org/markup-compatibility/2006">
-        <mc:Choice xmlns:p14="http://schemas.microsoft.com/office/powerpoint/2010/main" Requires="p14">
+      <mc:AlternateContent xmlns:mc="http://schemas.openxmlformats.org/markup-compatibility/2006" xmlns:p14="http://schemas.microsoft.com/office/powerpoint/2010/main">
+        <mc:Choice Requires="p14">
           <p:contentPart p14:bwMode="auto" r:id="rId135">
             <p14:nvContentPartPr>
               <p14:cNvPr id="171" name="Ink 170">
@@ -19273,7 +19281,7 @@
             </p14:xfrm>
           </p:contentPart>
         </mc:Choice>
-        <mc:Fallback>
+        <mc:Fallback xmlns="">
           <p:pic>
             <p:nvPicPr>
               <p:cNvPr id="171" name="Ink 170">
@@ -19304,8 +19312,8 @@
           </p:pic>
         </mc:Fallback>
       </mc:AlternateContent>
-      <mc:AlternateContent xmlns:mc="http://schemas.openxmlformats.org/markup-compatibility/2006">
-        <mc:Choice xmlns:p14="http://schemas.microsoft.com/office/powerpoint/2010/main" Requires="p14">
+      <mc:AlternateContent xmlns:mc="http://schemas.openxmlformats.org/markup-compatibility/2006" xmlns:p14="http://schemas.microsoft.com/office/powerpoint/2010/main">
+        <mc:Choice Requires="p14">
           <p:contentPart p14:bwMode="auto" r:id="rId137">
             <p14:nvContentPartPr>
               <p14:cNvPr id="173" name="Ink 172">
@@ -19324,7 +19332,7 @@
             </p14:xfrm>
           </p:contentPart>
         </mc:Choice>
-        <mc:Fallback>
+        <mc:Fallback xmlns="">
           <p:pic>
             <p:nvPicPr>
               <p:cNvPr id="173" name="Ink 172">
@@ -19355,8 +19363,8 @@
           </p:pic>
         </mc:Fallback>
       </mc:AlternateContent>
-      <mc:AlternateContent xmlns:mc="http://schemas.openxmlformats.org/markup-compatibility/2006">
-        <mc:Choice xmlns:p14="http://schemas.microsoft.com/office/powerpoint/2010/main" Requires="p14">
+      <mc:AlternateContent xmlns:mc="http://schemas.openxmlformats.org/markup-compatibility/2006" xmlns:p14="http://schemas.microsoft.com/office/powerpoint/2010/main">
+        <mc:Choice Requires="p14">
           <p:contentPart p14:bwMode="auto" r:id="rId139">
             <p14:nvContentPartPr>
               <p14:cNvPr id="178" name="Ink 177">
@@ -19375,7 +19383,7 @@
             </p14:xfrm>
           </p:contentPart>
         </mc:Choice>
-        <mc:Fallback>
+        <mc:Fallback xmlns="">
           <p:pic>
             <p:nvPicPr>
               <p:cNvPr id="178" name="Ink 177">
@@ -19406,8 +19414,8 @@
           </p:pic>
         </mc:Fallback>
       </mc:AlternateContent>
-      <mc:AlternateContent xmlns:mc="http://schemas.openxmlformats.org/markup-compatibility/2006">
-        <mc:Choice xmlns:p14="http://schemas.microsoft.com/office/powerpoint/2010/main" Requires="p14">
+      <mc:AlternateContent xmlns:mc="http://schemas.openxmlformats.org/markup-compatibility/2006" xmlns:p14="http://schemas.microsoft.com/office/powerpoint/2010/main">
+        <mc:Choice Requires="p14">
           <p:contentPart p14:bwMode="auto" r:id="rId141">
             <p14:nvContentPartPr>
               <p14:cNvPr id="180" name="Ink 179">
@@ -19426,7 +19434,7 @@
             </p14:xfrm>
           </p:contentPart>
         </mc:Choice>
-        <mc:Fallback>
+        <mc:Fallback xmlns="">
           <p:pic>
             <p:nvPicPr>
               <p:cNvPr id="180" name="Ink 179">
@@ -19457,8 +19465,8 @@
           </p:pic>
         </mc:Fallback>
       </mc:AlternateContent>
-      <mc:AlternateContent xmlns:mc="http://schemas.openxmlformats.org/markup-compatibility/2006">
-        <mc:Choice xmlns:p14="http://schemas.microsoft.com/office/powerpoint/2010/main" Requires="p14">
+      <mc:AlternateContent xmlns:mc="http://schemas.openxmlformats.org/markup-compatibility/2006" xmlns:p14="http://schemas.microsoft.com/office/powerpoint/2010/main">
+        <mc:Choice Requires="p14">
           <p:contentPart p14:bwMode="auto" r:id="rId143">
             <p14:nvContentPartPr>
               <p14:cNvPr id="181" name="Ink 180">
@@ -19477,7 +19485,7 @@
             </p14:xfrm>
           </p:contentPart>
         </mc:Choice>
-        <mc:Fallback>
+        <mc:Fallback xmlns="">
           <p:pic>
             <p:nvPicPr>
               <p:cNvPr id="181" name="Ink 180">
@@ -19508,8 +19516,8 @@
           </p:pic>
         </mc:Fallback>
       </mc:AlternateContent>
-      <mc:AlternateContent xmlns:mc="http://schemas.openxmlformats.org/markup-compatibility/2006">
-        <mc:Choice xmlns:p14="http://schemas.microsoft.com/office/powerpoint/2010/main" Requires="p14">
+      <mc:AlternateContent xmlns:mc="http://schemas.openxmlformats.org/markup-compatibility/2006" xmlns:p14="http://schemas.microsoft.com/office/powerpoint/2010/main">
+        <mc:Choice Requires="p14">
           <p:contentPart p14:bwMode="auto" r:id="rId145">
             <p14:nvContentPartPr>
               <p14:cNvPr id="182" name="Ink 181">
@@ -19528,7 +19536,7 @@
             </p14:xfrm>
           </p:contentPart>
         </mc:Choice>
-        <mc:Fallback>
+        <mc:Fallback xmlns="">
           <p:pic>
             <p:nvPicPr>
               <p:cNvPr id="182" name="Ink 181">
@@ -19559,8 +19567,8 @@
           </p:pic>
         </mc:Fallback>
       </mc:AlternateContent>
-      <mc:AlternateContent xmlns:mc="http://schemas.openxmlformats.org/markup-compatibility/2006">
-        <mc:Choice xmlns:p14="http://schemas.microsoft.com/office/powerpoint/2010/main" Requires="p14">
+      <mc:AlternateContent xmlns:mc="http://schemas.openxmlformats.org/markup-compatibility/2006" xmlns:p14="http://schemas.microsoft.com/office/powerpoint/2010/main">
+        <mc:Choice Requires="p14">
           <p:contentPart p14:bwMode="auto" r:id="rId147">
             <p14:nvContentPartPr>
               <p14:cNvPr id="183" name="Ink 182">
@@ -19579,7 +19587,7 @@
             </p14:xfrm>
           </p:contentPart>
         </mc:Choice>
-        <mc:Fallback>
+        <mc:Fallback xmlns="">
           <p:pic>
             <p:nvPicPr>
               <p:cNvPr id="183" name="Ink 182">
@@ -19610,8 +19618,8 @@
           </p:pic>
         </mc:Fallback>
       </mc:AlternateContent>
-      <mc:AlternateContent xmlns:mc="http://schemas.openxmlformats.org/markup-compatibility/2006">
-        <mc:Choice xmlns:p14="http://schemas.microsoft.com/office/powerpoint/2010/main" Requires="p14">
+      <mc:AlternateContent xmlns:mc="http://schemas.openxmlformats.org/markup-compatibility/2006" xmlns:p14="http://schemas.microsoft.com/office/powerpoint/2010/main">
+        <mc:Choice Requires="p14">
           <p:contentPart p14:bwMode="auto" r:id="rId149">
             <p14:nvContentPartPr>
               <p14:cNvPr id="229" name="Ink 228">
@@ -19630,7 +19638,7 @@
             </p14:xfrm>
           </p:contentPart>
         </mc:Choice>
-        <mc:Fallback>
+        <mc:Fallback xmlns="">
           <p:pic>
             <p:nvPicPr>
               <p:cNvPr id="229" name="Ink 228">
@@ -19661,8 +19669,8 @@
           </p:pic>
         </mc:Fallback>
       </mc:AlternateContent>
-      <mc:AlternateContent xmlns:mc="http://schemas.openxmlformats.org/markup-compatibility/2006">
-        <mc:Choice xmlns:p14="http://schemas.microsoft.com/office/powerpoint/2010/main" Requires="p14">
+      <mc:AlternateContent xmlns:mc="http://schemas.openxmlformats.org/markup-compatibility/2006" xmlns:p14="http://schemas.microsoft.com/office/powerpoint/2010/main">
+        <mc:Choice Requires="p14">
           <p:contentPart p14:bwMode="auto" r:id="rId151">
             <p14:nvContentPartPr>
               <p14:cNvPr id="230" name="Ink 229">
@@ -19681,7 +19689,7 @@
             </p14:xfrm>
           </p:contentPart>
         </mc:Choice>
-        <mc:Fallback>
+        <mc:Fallback xmlns="">
           <p:pic>
             <p:nvPicPr>
               <p:cNvPr id="230" name="Ink 229">
@@ -19732,8 +19740,8 @@
             <a:chExt cx="1785960" cy="685080"/>
           </a:xfrm>
         </p:grpSpPr>
-        <mc:AlternateContent xmlns:mc="http://schemas.openxmlformats.org/markup-compatibility/2006">
-          <mc:Choice xmlns:p14="http://schemas.microsoft.com/office/powerpoint/2010/main" Requires="p14">
+        <mc:AlternateContent xmlns:mc="http://schemas.openxmlformats.org/markup-compatibility/2006" xmlns:p14="http://schemas.microsoft.com/office/powerpoint/2010/main">
+          <mc:Choice Requires="p14">
             <p:contentPart p14:bwMode="auto" r:id="rId153">
               <p14:nvContentPartPr>
                 <p14:cNvPr id="204" name="Ink 203">
@@ -19752,7 +19760,7 @@
               </p14:xfrm>
             </p:contentPart>
           </mc:Choice>
-          <mc:Fallback>
+          <mc:Fallback xmlns="">
             <p:pic>
               <p:nvPicPr>
                 <p:cNvPr id="204" name="Ink 203">
@@ -19783,8 +19791,8 @@
             </p:pic>
           </mc:Fallback>
         </mc:AlternateContent>
-        <mc:AlternateContent xmlns:mc="http://schemas.openxmlformats.org/markup-compatibility/2006">
-          <mc:Choice xmlns:p14="http://schemas.microsoft.com/office/powerpoint/2010/main" Requires="p14">
+        <mc:AlternateContent xmlns:mc="http://schemas.openxmlformats.org/markup-compatibility/2006" xmlns:p14="http://schemas.microsoft.com/office/powerpoint/2010/main">
+          <mc:Choice Requires="p14">
             <p:contentPart p14:bwMode="auto" r:id="rId155">
               <p14:nvContentPartPr>
                 <p14:cNvPr id="205" name="Ink 204">
@@ -19803,7 +19811,7 @@
               </p14:xfrm>
             </p:contentPart>
           </mc:Choice>
-          <mc:Fallback>
+          <mc:Fallback xmlns="">
             <p:pic>
               <p:nvPicPr>
                 <p:cNvPr id="205" name="Ink 204">
@@ -19834,8 +19842,8 @@
             </p:pic>
           </mc:Fallback>
         </mc:AlternateContent>
-        <mc:AlternateContent xmlns:mc="http://schemas.openxmlformats.org/markup-compatibility/2006">
-          <mc:Choice xmlns:p14="http://schemas.microsoft.com/office/powerpoint/2010/main" Requires="p14">
+        <mc:AlternateContent xmlns:mc="http://schemas.openxmlformats.org/markup-compatibility/2006" xmlns:p14="http://schemas.microsoft.com/office/powerpoint/2010/main">
+          <mc:Choice Requires="p14">
             <p:contentPart p14:bwMode="auto" r:id="rId157">
               <p14:nvContentPartPr>
                 <p14:cNvPr id="206" name="Ink 205">
@@ -19854,7 +19862,7 @@
               </p14:xfrm>
             </p:contentPart>
           </mc:Choice>
-          <mc:Fallback>
+          <mc:Fallback xmlns="">
             <p:pic>
               <p:nvPicPr>
                 <p:cNvPr id="206" name="Ink 205">
@@ -19885,8 +19893,8 @@
             </p:pic>
           </mc:Fallback>
         </mc:AlternateContent>
-        <mc:AlternateContent xmlns:mc="http://schemas.openxmlformats.org/markup-compatibility/2006">
-          <mc:Choice xmlns:p14="http://schemas.microsoft.com/office/powerpoint/2010/main" Requires="p14">
+        <mc:AlternateContent xmlns:mc="http://schemas.openxmlformats.org/markup-compatibility/2006" xmlns:p14="http://schemas.microsoft.com/office/powerpoint/2010/main">
+          <mc:Choice Requires="p14">
             <p:contentPart p14:bwMode="auto" r:id="rId159">
               <p14:nvContentPartPr>
                 <p14:cNvPr id="214" name="Ink 213">
@@ -19905,7 +19913,7 @@
               </p14:xfrm>
             </p:contentPart>
           </mc:Choice>
-          <mc:Fallback>
+          <mc:Fallback xmlns="">
             <p:pic>
               <p:nvPicPr>
                 <p:cNvPr id="214" name="Ink 213">
@@ -19936,8 +19944,8 @@
             </p:pic>
           </mc:Fallback>
         </mc:AlternateContent>
-        <mc:AlternateContent xmlns:mc="http://schemas.openxmlformats.org/markup-compatibility/2006">
-          <mc:Choice xmlns:p14="http://schemas.microsoft.com/office/powerpoint/2010/main" Requires="p14">
+        <mc:AlternateContent xmlns:mc="http://schemas.openxmlformats.org/markup-compatibility/2006" xmlns:p14="http://schemas.microsoft.com/office/powerpoint/2010/main">
+          <mc:Choice Requires="p14">
             <p:contentPart p14:bwMode="auto" r:id="rId161">
               <p14:nvContentPartPr>
                 <p14:cNvPr id="215" name="Ink 214">
@@ -19956,7 +19964,7 @@
               </p14:xfrm>
             </p:contentPart>
           </mc:Choice>
-          <mc:Fallback>
+          <mc:Fallback xmlns="">
             <p:pic>
               <p:nvPicPr>
                 <p:cNvPr id="215" name="Ink 214">
@@ -19987,8 +19995,8 @@
             </p:pic>
           </mc:Fallback>
         </mc:AlternateContent>
-        <mc:AlternateContent xmlns:mc="http://schemas.openxmlformats.org/markup-compatibility/2006">
-          <mc:Choice xmlns:p14="http://schemas.microsoft.com/office/powerpoint/2010/main" Requires="p14">
+        <mc:AlternateContent xmlns:mc="http://schemas.openxmlformats.org/markup-compatibility/2006" xmlns:p14="http://schemas.microsoft.com/office/powerpoint/2010/main">
+          <mc:Choice Requires="p14">
             <p:contentPart p14:bwMode="auto" r:id="rId163">
               <p14:nvContentPartPr>
                 <p14:cNvPr id="216" name="Ink 215">
@@ -20007,7 +20015,7 @@
               </p14:xfrm>
             </p:contentPart>
           </mc:Choice>
-          <mc:Fallback>
+          <mc:Fallback xmlns="">
             <p:pic>
               <p:nvPicPr>
                 <p:cNvPr id="216" name="Ink 215">
@@ -20038,8 +20046,8 @@
             </p:pic>
           </mc:Fallback>
         </mc:AlternateContent>
-        <mc:AlternateContent xmlns:mc="http://schemas.openxmlformats.org/markup-compatibility/2006">
-          <mc:Choice xmlns:p14="http://schemas.microsoft.com/office/powerpoint/2010/main" Requires="p14">
+        <mc:AlternateContent xmlns:mc="http://schemas.openxmlformats.org/markup-compatibility/2006" xmlns:p14="http://schemas.microsoft.com/office/powerpoint/2010/main">
+          <mc:Choice Requires="p14">
             <p:contentPart p14:bwMode="auto" r:id="rId165">
               <p14:nvContentPartPr>
                 <p14:cNvPr id="217" name="Ink 216">
@@ -20058,7 +20066,7 @@
               </p14:xfrm>
             </p:contentPart>
           </mc:Choice>
-          <mc:Fallback>
+          <mc:Fallback xmlns="">
             <p:pic>
               <p:nvPicPr>
                 <p:cNvPr id="217" name="Ink 216">
@@ -20089,8 +20097,8 @@
             </p:pic>
           </mc:Fallback>
         </mc:AlternateContent>
-        <mc:AlternateContent xmlns:mc="http://schemas.openxmlformats.org/markup-compatibility/2006">
-          <mc:Choice xmlns:p14="http://schemas.microsoft.com/office/powerpoint/2010/main" Requires="p14">
+        <mc:AlternateContent xmlns:mc="http://schemas.openxmlformats.org/markup-compatibility/2006" xmlns:p14="http://schemas.microsoft.com/office/powerpoint/2010/main">
+          <mc:Choice Requires="p14">
             <p:contentPart p14:bwMode="auto" r:id="rId167">
               <p14:nvContentPartPr>
                 <p14:cNvPr id="219" name="Ink 218">
@@ -20109,7 +20117,7 @@
               </p14:xfrm>
             </p:contentPart>
           </mc:Choice>
-          <mc:Fallback>
+          <mc:Fallback xmlns="">
             <p:pic>
               <p:nvPicPr>
                 <p:cNvPr id="219" name="Ink 218">
@@ -20140,8 +20148,8 @@
             </p:pic>
           </mc:Fallback>
         </mc:AlternateContent>
-        <mc:AlternateContent xmlns:mc="http://schemas.openxmlformats.org/markup-compatibility/2006">
-          <mc:Choice xmlns:p14="http://schemas.microsoft.com/office/powerpoint/2010/main" Requires="p14">
+        <mc:AlternateContent xmlns:mc="http://schemas.openxmlformats.org/markup-compatibility/2006" xmlns:p14="http://schemas.microsoft.com/office/powerpoint/2010/main">
+          <mc:Choice Requires="p14">
             <p:contentPart p14:bwMode="auto" r:id="rId169">
               <p14:nvContentPartPr>
                 <p14:cNvPr id="220" name="Ink 219">
@@ -20160,7 +20168,7 @@
               </p14:xfrm>
             </p:contentPart>
           </mc:Choice>
-          <mc:Fallback>
+          <mc:Fallback xmlns="">
             <p:pic>
               <p:nvPicPr>
                 <p:cNvPr id="220" name="Ink 219">
@@ -20191,8 +20199,8 @@
             </p:pic>
           </mc:Fallback>
         </mc:AlternateContent>
-        <mc:AlternateContent xmlns:mc="http://schemas.openxmlformats.org/markup-compatibility/2006">
-          <mc:Choice xmlns:p14="http://schemas.microsoft.com/office/powerpoint/2010/main" Requires="p14">
+        <mc:AlternateContent xmlns:mc="http://schemas.openxmlformats.org/markup-compatibility/2006" xmlns:p14="http://schemas.microsoft.com/office/powerpoint/2010/main">
+          <mc:Choice Requires="p14">
             <p:contentPart p14:bwMode="auto" r:id="rId171">
               <p14:nvContentPartPr>
                 <p14:cNvPr id="221" name="Ink 220">
@@ -20211,7 +20219,7 @@
               </p14:xfrm>
             </p:contentPart>
           </mc:Choice>
-          <mc:Fallback>
+          <mc:Fallback xmlns="">
             <p:pic>
               <p:nvPicPr>
                 <p:cNvPr id="221" name="Ink 220">
@@ -20242,8 +20250,8 @@
             </p:pic>
           </mc:Fallback>
         </mc:AlternateContent>
-        <mc:AlternateContent xmlns:mc="http://schemas.openxmlformats.org/markup-compatibility/2006">
-          <mc:Choice xmlns:p14="http://schemas.microsoft.com/office/powerpoint/2010/main" Requires="p14">
+        <mc:AlternateContent xmlns:mc="http://schemas.openxmlformats.org/markup-compatibility/2006" xmlns:p14="http://schemas.microsoft.com/office/powerpoint/2010/main">
+          <mc:Choice Requires="p14">
             <p:contentPart p14:bwMode="auto" r:id="rId173">
               <p14:nvContentPartPr>
                 <p14:cNvPr id="232" name="Ink 231">
@@ -20262,7 +20270,7 @@
               </p14:xfrm>
             </p:contentPart>
           </mc:Choice>
-          <mc:Fallback>
+          <mc:Fallback xmlns="">
             <p:pic>
               <p:nvPicPr>
                 <p:cNvPr id="232" name="Ink 231">
@@ -20293,8 +20301,8 @@
             </p:pic>
           </mc:Fallback>
         </mc:AlternateContent>
-        <mc:AlternateContent xmlns:mc="http://schemas.openxmlformats.org/markup-compatibility/2006">
-          <mc:Choice xmlns:p14="http://schemas.microsoft.com/office/powerpoint/2010/main" Requires="p14">
+        <mc:AlternateContent xmlns:mc="http://schemas.openxmlformats.org/markup-compatibility/2006" xmlns:p14="http://schemas.microsoft.com/office/powerpoint/2010/main">
+          <mc:Choice Requires="p14">
             <p:contentPart p14:bwMode="auto" r:id="rId175">
               <p14:nvContentPartPr>
                 <p14:cNvPr id="233" name="Ink 232">
@@ -20313,7 +20321,7 @@
               </p14:xfrm>
             </p:contentPart>
           </mc:Choice>
-          <mc:Fallback>
+          <mc:Fallback xmlns="">
             <p:pic>
               <p:nvPicPr>
                 <p:cNvPr id="233" name="Ink 232">
@@ -20344,8 +20352,8 @@
             </p:pic>
           </mc:Fallback>
         </mc:AlternateContent>
-        <mc:AlternateContent xmlns:mc="http://schemas.openxmlformats.org/markup-compatibility/2006">
-          <mc:Choice xmlns:p14="http://schemas.microsoft.com/office/powerpoint/2010/main" Requires="p14">
+        <mc:AlternateContent xmlns:mc="http://schemas.openxmlformats.org/markup-compatibility/2006" xmlns:p14="http://schemas.microsoft.com/office/powerpoint/2010/main">
+          <mc:Choice Requires="p14">
             <p:contentPart p14:bwMode="auto" r:id="rId177">
               <p14:nvContentPartPr>
                 <p14:cNvPr id="234" name="Ink 233">
@@ -20364,7 +20372,7 @@
               </p14:xfrm>
             </p:contentPart>
           </mc:Choice>
-          <mc:Fallback>
+          <mc:Fallback xmlns="">
             <p:pic>
               <p:nvPicPr>
                 <p:cNvPr id="234" name="Ink 233">
@@ -20395,8 +20403,8 @@
             </p:pic>
           </mc:Fallback>
         </mc:AlternateContent>
-        <mc:AlternateContent xmlns:mc="http://schemas.openxmlformats.org/markup-compatibility/2006">
-          <mc:Choice xmlns:p14="http://schemas.microsoft.com/office/powerpoint/2010/main" Requires="p14">
+        <mc:AlternateContent xmlns:mc="http://schemas.openxmlformats.org/markup-compatibility/2006" xmlns:p14="http://schemas.microsoft.com/office/powerpoint/2010/main">
+          <mc:Choice Requires="p14">
             <p:contentPart p14:bwMode="auto" r:id="rId179">
               <p14:nvContentPartPr>
                 <p14:cNvPr id="235" name="Ink 234">
@@ -20415,7 +20423,7 @@
               </p14:xfrm>
             </p:contentPart>
           </mc:Choice>
-          <mc:Fallback>
+          <mc:Fallback xmlns="">
             <p:pic>
               <p:nvPicPr>
                 <p:cNvPr id="235" name="Ink 234">
@@ -20446,8 +20454,8 @@
             </p:pic>
           </mc:Fallback>
         </mc:AlternateContent>
-        <mc:AlternateContent xmlns:mc="http://schemas.openxmlformats.org/markup-compatibility/2006">
-          <mc:Choice xmlns:p14="http://schemas.microsoft.com/office/powerpoint/2010/main" Requires="p14">
+        <mc:AlternateContent xmlns:mc="http://schemas.openxmlformats.org/markup-compatibility/2006" xmlns:p14="http://schemas.microsoft.com/office/powerpoint/2010/main">
+          <mc:Choice Requires="p14">
             <p:contentPart p14:bwMode="auto" r:id="rId181">
               <p14:nvContentPartPr>
                 <p14:cNvPr id="239" name="Ink 238">
@@ -20466,7 +20474,7 @@
               </p14:xfrm>
             </p:contentPart>
           </mc:Choice>
-          <mc:Fallback>
+          <mc:Fallback xmlns="">
             <p:pic>
               <p:nvPicPr>
                 <p:cNvPr id="239" name="Ink 238">
@@ -20518,8 +20526,8 @@
             <a:chExt cx="822600" cy="336600"/>
           </a:xfrm>
         </p:grpSpPr>
-        <mc:AlternateContent xmlns:mc="http://schemas.openxmlformats.org/markup-compatibility/2006">
-          <mc:Choice xmlns:p14="http://schemas.microsoft.com/office/powerpoint/2010/main" Requires="p14">
+        <mc:AlternateContent xmlns:mc="http://schemas.openxmlformats.org/markup-compatibility/2006" xmlns:p14="http://schemas.microsoft.com/office/powerpoint/2010/main">
+          <mc:Choice Requires="p14">
             <p:contentPart p14:bwMode="auto" r:id="rId183">
               <p14:nvContentPartPr>
                 <p14:cNvPr id="241" name="Ink 240">
@@ -20538,7 +20546,7 @@
               </p14:xfrm>
             </p:contentPart>
           </mc:Choice>
-          <mc:Fallback>
+          <mc:Fallback xmlns="">
             <p:pic>
               <p:nvPicPr>
                 <p:cNvPr id="241" name="Ink 240">
@@ -20569,8 +20577,8 @@
             </p:pic>
           </mc:Fallback>
         </mc:AlternateContent>
-        <mc:AlternateContent xmlns:mc="http://schemas.openxmlformats.org/markup-compatibility/2006">
-          <mc:Choice xmlns:p14="http://schemas.microsoft.com/office/powerpoint/2010/main" Requires="p14">
+        <mc:AlternateContent xmlns:mc="http://schemas.openxmlformats.org/markup-compatibility/2006" xmlns:p14="http://schemas.microsoft.com/office/powerpoint/2010/main">
+          <mc:Choice Requires="p14">
             <p:contentPart p14:bwMode="auto" r:id="rId185">
               <p14:nvContentPartPr>
                 <p14:cNvPr id="242" name="Ink 241">
@@ -20589,7 +20597,7 @@
               </p14:xfrm>
             </p:contentPart>
           </mc:Choice>
-          <mc:Fallback>
+          <mc:Fallback xmlns="">
             <p:pic>
               <p:nvPicPr>
                 <p:cNvPr id="242" name="Ink 241">
@@ -20620,8 +20628,8 @@
             </p:pic>
           </mc:Fallback>
         </mc:AlternateContent>
-        <mc:AlternateContent xmlns:mc="http://schemas.openxmlformats.org/markup-compatibility/2006">
-          <mc:Choice xmlns:p14="http://schemas.microsoft.com/office/powerpoint/2010/main" Requires="p14">
+        <mc:AlternateContent xmlns:mc="http://schemas.openxmlformats.org/markup-compatibility/2006" xmlns:p14="http://schemas.microsoft.com/office/powerpoint/2010/main">
+          <mc:Choice Requires="p14">
             <p:contentPart p14:bwMode="auto" r:id="rId187">
               <p14:nvContentPartPr>
                 <p14:cNvPr id="244" name="Ink 243">
@@ -20640,7 +20648,7 @@
               </p14:xfrm>
             </p:contentPart>
           </mc:Choice>
-          <mc:Fallback>
+          <mc:Fallback xmlns="">
             <p:pic>
               <p:nvPicPr>
                 <p:cNvPr id="244" name="Ink 243">
@@ -20671,8 +20679,8 @@
             </p:pic>
           </mc:Fallback>
         </mc:AlternateContent>
-        <mc:AlternateContent xmlns:mc="http://schemas.openxmlformats.org/markup-compatibility/2006">
-          <mc:Choice xmlns:p14="http://schemas.microsoft.com/office/powerpoint/2010/main" Requires="p14">
+        <mc:AlternateContent xmlns:mc="http://schemas.openxmlformats.org/markup-compatibility/2006" xmlns:p14="http://schemas.microsoft.com/office/powerpoint/2010/main">
+          <mc:Choice Requires="p14">
             <p:contentPart p14:bwMode="auto" r:id="rId189">
               <p14:nvContentPartPr>
                 <p14:cNvPr id="245" name="Ink 244">
@@ -20691,7 +20699,7 @@
               </p14:xfrm>
             </p:contentPart>
           </mc:Choice>
-          <mc:Fallback>
+          <mc:Fallback xmlns="">
             <p:pic>
               <p:nvPicPr>
                 <p:cNvPr id="245" name="Ink 244">
@@ -20722,8 +20730,8 @@
             </p:pic>
           </mc:Fallback>
         </mc:AlternateContent>
-        <mc:AlternateContent xmlns:mc="http://schemas.openxmlformats.org/markup-compatibility/2006">
-          <mc:Choice xmlns:p14="http://schemas.microsoft.com/office/powerpoint/2010/main" Requires="p14">
+        <mc:AlternateContent xmlns:mc="http://schemas.openxmlformats.org/markup-compatibility/2006" xmlns:p14="http://schemas.microsoft.com/office/powerpoint/2010/main">
+          <mc:Choice Requires="p14">
             <p:contentPart p14:bwMode="auto" r:id="rId191">
               <p14:nvContentPartPr>
                 <p14:cNvPr id="246" name="Ink 245">
@@ -20742,7 +20750,7 @@
               </p14:xfrm>
             </p:contentPart>
           </mc:Choice>
-          <mc:Fallback>
+          <mc:Fallback xmlns="">
             <p:pic>
               <p:nvPicPr>
                 <p:cNvPr id="246" name="Ink 245">
@@ -20773,8 +20781,8 @@
             </p:pic>
           </mc:Fallback>
         </mc:AlternateContent>
-        <mc:AlternateContent xmlns:mc="http://schemas.openxmlformats.org/markup-compatibility/2006">
-          <mc:Choice xmlns:p14="http://schemas.microsoft.com/office/powerpoint/2010/main" Requires="p14">
+        <mc:AlternateContent xmlns:mc="http://schemas.openxmlformats.org/markup-compatibility/2006" xmlns:p14="http://schemas.microsoft.com/office/powerpoint/2010/main">
+          <mc:Choice Requires="p14">
             <p:contentPart p14:bwMode="auto" r:id="rId193">
               <p14:nvContentPartPr>
                 <p14:cNvPr id="247" name="Ink 246">
@@ -20793,7 +20801,7 @@
               </p14:xfrm>
             </p:contentPart>
           </mc:Choice>
-          <mc:Fallback>
+          <mc:Fallback xmlns="">
             <p:pic>
               <p:nvPicPr>
                 <p:cNvPr id="247" name="Ink 246">
@@ -20824,8 +20832,8 @@
             </p:pic>
           </mc:Fallback>
         </mc:AlternateContent>
-        <mc:AlternateContent xmlns:mc="http://schemas.openxmlformats.org/markup-compatibility/2006">
-          <mc:Choice xmlns:p14="http://schemas.microsoft.com/office/powerpoint/2010/main" Requires="p14">
+        <mc:AlternateContent xmlns:mc="http://schemas.openxmlformats.org/markup-compatibility/2006" xmlns:p14="http://schemas.microsoft.com/office/powerpoint/2010/main">
+          <mc:Choice Requires="p14">
             <p:contentPart p14:bwMode="auto" r:id="rId195">
               <p14:nvContentPartPr>
                 <p14:cNvPr id="248" name="Ink 247">
@@ -20844,7 +20852,7 @@
               </p14:xfrm>
             </p:contentPart>
           </mc:Choice>
-          <mc:Fallback>
+          <mc:Fallback xmlns="">
             <p:pic>
               <p:nvPicPr>
                 <p:cNvPr id="248" name="Ink 247">
@@ -20875,8 +20883,8 @@
             </p:pic>
           </mc:Fallback>
         </mc:AlternateContent>
-        <mc:AlternateContent xmlns:mc="http://schemas.openxmlformats.org/markup-compatibility/2006">
-          <mc:Choice xmlns:p14="http://schemas.microsoft.com/office/powerpoint/2010/main" Requires="p14">
+        <mc:AlternateContent xmlns:mc="http://schemas.openxmlformats.org/markup-compatibility/2006" xmlns:p14="http://schemas.microsoft.com/office/powerpoint/2010/main">
+          <mc:Choice Requires="p14">
             <p:contentPart p14:bwMode="auto" r:id="rId197">
               <p14:nvContentPartPr>
                 <p14:cNvPr id="249" name="Ink 248">
@@ -20895,7 +20903,7 @@
               </p14:xfrm>
             </p:contentPart>
           </mc:Choice>
-          <mc:Fallback>
+          <mc:Fallback xmlns="">
             <p:pic>
               <p:nvPicPr>
                 <p:cNvPr id="249" name="Ink 248">
@@ -20926,8 +20934,8 @@
             </p:pic>
           </mc:Fallback>
         </mc:AlternateContent>
-        <mc:AlternateContent xmlns:mc="http://schemas.openxmlformats.org/markup-compatibility/2006">
-          <mc:Choice xmlns:p14="http://schemas.microsoft.com/office/powerpoint/2010/main" Requires="p14">
+        <mc:AlternateContent xmlns:mc="http://schemas.openxmlformats.org/markup-compatibility/2006" xmlns:p14="http://schemas.microsoft.com/office/powerpoint/2010/main">
+          <mc:Choice Requires="p14">
             <p:contentPart p14:bwMode="auto" r:id="rId199">
               <p14:nvContentPartPr>
                 <p14:cNvPr id="250" name="Ink 249">
@@ -20946,7 +20954,7 @@
               </p14:xfrm>
             </p:contentPart>
           </mc:Choice>
-          <mc:Fallback>
+          <mc:Fallback xmlns="">
             <p:pic>
               <p:nvPicPr>
                 <p:cNvPr id="250" name="Ink 249">
@@ -20977,8 +20985,8 @@
             </p:pic>
           </mc:Fallback>
         </mc:AlternateContent>
-        <mc:AlternateContent xmlns:mc="http://schemas.openxmlformats.org/markup-compatibility/2006">
-          <mc:Choice xmlns:p14="http://schemas.microsoft.com/office/powerpoint/2010/main" Requires="p14">
+        <mc:AlternateContent xmlns:mc="http://schemas.openxmlformats.org/markup-compatibility/2006" xmlns:p14="http://schemas.microsoft.com/office/powerpoint/2010/main">
+          <mc:Choice Requires="p14">
             <p:contentPart p14:bwMode="auto" r:id="rId201">
               <p14:nvContentPartPr>
                 <p14:cNvPr id="251" name="Ink 250">
@@ -20997,7 +21005,7 @@
               </p14:xfrm>
             </p:contentPart>
           </mc:Choice>
-          <mc:Fallback>
+          <mc:Fallback xmlns="">
             <p:pic>
               <p:nvPicPr>
                 <p:cNvPr id="251" name="Ink 250">
@@ -21049,8 +21057,8 @@
             <a:chExt cx="642600" cy="217080"/>
           </a:xfrm>
         </p:grpSpPr>
-        <mc:AlternateContent xmlns:mc="http://schemas.openxmlformats.org/markup-compatibility/2006">
-          <mc:Choice xmlns:p14="http://schemas.microsoft.com/office/powerpoint/2010/main" Requires="p14">
+        <mc:AlternateContent xmlns:mc="http://schemas.openxmlformats.org/markup-compatibility/2006" xmlns:p14="http://schemas.microsoft.com/office/powerpoint/2010/main">
+          <mc:Choice Requires="p14">
             <p:contentPart p14:bwMode="auto" r:id="rId203">
               <p14:nvContentPartPr>
                 <p14:cNvPr id="276" name="Ink 275">
@@ -21069,7 +21077,7 @@
               </p14:xfrm>
             </p:contentPart>
           </mc:Choice>
-          <mc:Fallback>
+          <mc:Fallback xmlns="">
             <p:pic>
               <p:nvPicPr>
                 <p:cNvPr id="276" name="Ink 275">
@@ -21100,8 +21108,8 @@
             </p:pic>
           </mc:Fallback>
         </mc:AlternateContent>
-        <mc:AlternateContent xmlns:mc="http://schemas.openxmlformats.org/markup-compatibility/2006">
-          <mc:Choice xmlns:p14="http://schemas.microsoft.com/office/powerpoint/2010/main" Requires="p14">
+        <mc:AlternateContent xmlns:mc="http://schemas.openxmlformats.org/markup-compatibility/2006" xmlns:p14="http://schemas.microsoft.com/office/powerpoint/2010/main">
+          <mc:Choice Requires="p14">
             <p:contentPart p14:bwMode="auto" r:id="rId205">
               <p14:nvContentPartPr>
                 <p14:cNvPr id="277" name="Ink 276">
@@ -21120,7 +21128,7 @@
               </p14:xfrm>
             </p:contentPart>
           </mc:Choice>
-          <mc:Fallback>
+          <mc:Fallback xmlns="">
             <p:pic>
               <p:nvPicPr>
                 <p:cNvPr id="277" name="Ink 276">
@@ -21151,8 +21159,8 @@
             </p:pic>
           </mc:Fallback>
         </mc:AlternateContent>
-        <mc:AlternateContent xmlns:mc="http://schemas.openxmlformats.org/markup-compatibility/2006">
-          <mc:Choice xmlns:p14="http://schemas.microsoft.com/office/powerpoint/2010/main" Requires="p14">
+        <mc:AlternateContent xmlns:mc="http://schemas.openxmlformats.org/markup-compatibility/2006" xmlns:p14="http://schemas.microsoft.com/office/powerpoint/2010/main">
+          <mc:Choice Requires="p14">
             <p:contentPart p14:bwMode="auto" r:id="rId207">
               <p14:nvContentPartPr>
                 <p14:cNvPr id="278" name="Ink 277">
@@ -21171,7 +21179,7 @@
               </p14:xfrm>
             </p:contentPart>
           </mc:Choice>
-          <mc:Fallback>
+          <mc:Fallback xmlns="">
             <p:pic>
               <p:nvPicPr>
                 <p:cNvPr id="278" name="Ink 277">
@@ -21202,8 +21210,8 @@
             </p:pic>
           </mc:Fallback>
         </mc:AlternateContent>
-        <mc:AlternateContent xmlns:mc="http://schemas.openxmlformats.org/markup-compatibility/2006">
-          <mc:Choice xmlns:p14="http://schemas.microsoft.com/office/powerpoint/2010/main" Requires="p14">
+        <mc:AlternateContent xmlns:mc="http://schemas.openxmlformats.org/markup-compatibility/2006" xmlns:p14="http://schemas.microsoft.com/office/powerpoint/2010/main">
+          <mc:Choice Requires="p14">
             <p:contentPart p14:bwMode="auto" r:id="rId209">
               <p14:nvContentPartPr>
                 <p14:cNvPr id="279" name="Ink 278">
@@ -21222,7 +21230,7 @@
               </p14:xfrm>
             </p:contentPart>
           </mc:Choice>
-          <mc:Fallback>
+          <mc:Fallback xmlns="">
             <p:pic>
               <p:nvPicPr>
                 <p:cNvPr id="279" name="Ink 278">
@@ -21253,8 +21261,8 @@
             </p:pic>
           </mc:Fallback>
         </mc:AlternateContent>
-        <mc:AlternateContent xmlns:mc="http://schemas.openxmlformats.org/markup-compatibility/2006">
-          <mc:Choice xmlns:p14="http://schemas.microsoft.com/office/powerpoint/2010/main" Requires="p14">
+        <mc:AlternateContent xmlns:mc="http://schemas.openxmlformats.org/markup-compatibility/2006" xmlns:p14="http://schemas.microsoft.com/office/powerpoint/2010/main">
+          <mc:Choice Requires="p14">
             <p:contentPart p14:bwMode="auto" r:id="rId211">
               <p14:nvContentPartPr>
                 <p14:cNvPr id="280" name="Ink 279">
@@ -21273,7 +21281,7 @@
               </p14:xfrm>
             </p:contentPart>
           </mc:Choice>
-          <mc:Fallback>
+          <mc:Fallback xmlns="">
             <p:pic>
               <p:nvPicPr>
                 <p:cNvPr id="280" name="Ink 279">
@@ -21304,8 +21312,8 @@
             </p:pic>
           </mc:Fallback>
         </mc:AlternateContent>
-        <mc:AlternateContent xmlns:mc="http://schemas.openxmlformats.org/markup-compatibility/2006">
-          <mc:Choice xmlns:p14="http://schemas.microsoft.com/office/powerpoint/2010/main" Requires="p14">
+        <mc:AlternateContent xmlns:mc="http://schemas.openxmlformats.org/markup-compatibility/2006" xmlns:p14="http://schemas.microsoft.com/office/powerpoint/2010/main">
+          <mc:Choice Requires="p14">
             <p:contentPart p14:bwMode="auto" r:id="rId213">
               <p14:nvContentPartPr>
                 <p14:cNvPr id="281" name="Ink 280">
@@ -21324,7 +21332,7 @@
               </p14:xfrm>
             </p:contentPart>
           </mc:Choice>
-          <mc:Fallback>
+          <mc:Fallback xmlns="">
             <p:pic>
               <p:nvPicPr>
                 <p:cNvPr id="281" name="Ink 280">
@@ -21355,8 +21363,8 @@
             </p:pic>
           </mc:Fallback>
         </mc:AlternateContent>
-        <mc:AlternateContent xmlns:mc="http://schemas.openxmlformats.org/markup-compatibility/2006">
-          <mc:Choice xmlns:p14="http://schemas.microsoft.com/office/powerpoint/2010/main" Requires="p14">
+        <mc:AlternateContent xmlns:mc="http://schemas.openxmlformats.org/markup-compatibility/2006" xmlns:p14="http://schemas.microsoft.com/office/powerpoint/2010/main">
+          <mc:Choice Requires="p14">
             <p:contentPart p14:bwMode="auto" r:id="rId215">
               <p14:nvContentPartPr>
                 <p14:cNvPr id="282" name="Ink 281">
@@ -21375,7 +21383,7 @@
               </p14:xfrm>
             </p:contentPart>
           </mc:Choice>
-          <mc:Fallback>
+          <mc:Fallback xmlns="">
             <p:pic>
               <p:nvPicPr>
                 <p:cNvPr id="282" name="Ink 281">
@@ -21406,8 +21414,8 @@
             </p:pic>
           </mc:Fallback>
         </mc:AlternateContent>
-        <mc:AlternateContent xmlns:mc="http://schemas.openxmlformats.org/markup-compatibility/2006">
-          <mc:Choice xmlns:p14="http://schemas.microsoft.com/office/powerpoint/2010/main" Requires="p14">
+        <mc:AlternateContent xmlns:mc="http://schemas.openxmlformats.org/markup-compatibility/2006" xmlns:p14="http://schemas.microsoft.com/office/powerpoint/2010/main">
+          <mc:Choice Requires="p14">
             <p:contentPart p14:bwMode="auto" r:id="rId217">
               <p14:nvContentPartPr>
                 <p14:cNvPr id="283" name="Ink 282">
@@ -21426,7 +21434,7 @@
               </p14:xfrm>
             </p:contentPart>
           </mc:Choice>
-          <mc:Fallback>
+          <mc:Fallback xmlns="">
             <p:pic>
               <p:nvPicPr>
                 <p:cNvPr id="283" name="Ink 282">
@@ -21478,8 +21486,8 @@
             <a:chExt cx="327600" cy="136800"/>
           </a:xfrm>
         </p:grpSpPr>
-        <mc:AlternateContent xmlns:mc="http://schemas.openxmlformats.org/markup-compatibility/2006">
-          <mc:Choice xmlns:p14="http://schemas.microsoft.com/office/powerpoint/2010/main" Requires="p14">
+        <mc:AlternateContent xmlns:mc="http://schemas.openxmlformats.org/markup-compatibility/2006" xmlns:p14="http://schemas.microsoft.com/office/powerpoint/2010/main">
+          <mc:Choice Requires="p14">
             <p:contentPart p14:bwMode="auto" r:id="rId219">
               <p14:nvContentPartPr>
                 <p14:cNvPr id="284" name="Ink 283">
@@ -21498,7 +21506,7 @@
               </p14:xfrm>
             </p:contentPart>
           </mc:Choice>
-          <mc:Fallback>
+          <mc:Fallback xmlns="">
             <p:pic>
               <p:nvPicPr>
                 <p:cNvPr id="284" name="Ink 283">
@@ -21529,8 +21537,8 @@
             </p:pic>
           </mc:Fallback>
         </mc:AlternateContent>
-        <mc:AlternateContent xmlns:mc="http://schemas.openxmlformats.org/markup-compatibility/2006">
-          <mc:Choice xmlns:p14="http://schemas.microsoft.com/office/powerpoint/2010/main" Requires="p14">
+        <mc:AlternateContent xmlns:mc="http://schemas.openxmlformats.org/markup-compatibility/2006" xmlns:p14="http://schemas.microsoft.com/office/powerpoint/2010/main">
+          <mc:Choice Requires="p14">
             <p:contentPart p14:bwMode="auto" r:id="rId221">
               <p14:nvContentPartPr>
                 <p14:cNvPr id="285" name="Ink 284">
@@ -21549,7 +21557,7 @@
               </p14:xfrm>
             </p:contentPart>
           </mc:Choice>
-          <mc:Fallback>
+          <mc:Fallback xmlns="">
             <p:pic>
               <p:nvPicPr>
                 <p:cNvPr id="285" name="Ink 284">
@@ -21580,8 +21588,8 @@
             </p:pic>
           </mc:Fallback>
         </mc:AlternateContent>
-        <mc:AlternateContent xmlns:mc="http://schemas.openxmlformats.org/markup-compatibility/2006">
-          <mc:Choice xmlns:p14="http://schemas.microsoft.com/office/powerpoint/2010/main" Requires="p14">
+        <mc:AlternateContent xmlns:mc="http://schemas.openxmlformats.org/markup-compatibility/2006" xmlns:p14="http://schemas.microsoft.com/office/powerpoint/2010/main">
+          <mc:Choice Requires="p14">
             <p:contentPart p14:bwMode="auto" r:id="rId223">
               <p14:nvContentPartPr>
                 <p14:cNvPr id="286" name="Ink 285">
@@ -21600,7 +21608,7 @@
               </p14:xfrm>
             </p:contentPart>
           </mc:Choice>
-          <mc:Fallback>
+          <mc:Fallback xmlns="">
             <p:pic>
               <p:nvPicPr>
                 <p:cNvPr id="286" name="Ink 285">
@@ -21631,8 +21639,8 @@
             </p:pic>
           </mc:Fallback>
         </mc:AlternateContent>
-        <mc:AlternateContent xmlns:mc="http://schemas.openxmlformats.org/markup-compatibility/2006">
-          <mc:Choice xmlns:p14="http://schemas.microsoft.com/office/powerpoint/2010/main" Requires="p14">
+        <mc:AlternateContent xmlns:mc="http://schemas.openxmlformats.org/markup-compatibility/2006" xmlns:p14="http://schemas.microsoft.com/office/powerpoint/2010/main">
+          <mc:Choice Requires="p14">
             <p:contentPart p14:bwMode="auto" r:id="rId225">
               <p14:nvContentPartPr>
                 <p14:cNvPr id="287" name="Ink 286">
@@ -21651,7 +21659,7 @@
               </p14:xfrm>
             </p:contentPart>
           </mc:Choice>
-          <mc:Fallback>
+          <mc:Fallback xmlns="">
             <p:pic>
               <p:nvPicPr>
                 <p:cNvPr id="287" name="Ink 286">
@@ -21703,8 +21711,8 @@
             <a:chExt cx="451080" cy="227880"/>
           </a:xfrm>
         </p:grpSpPr>
-        <mc:AlternateContent xmlns:mc="http://schemas.openxmlformats.org/markup-compatibility/2006">
-          <mc:Choice xmlns:p14="http://schemas.microsoft.com/office/powerpoint/2010/main" Requires="p14">
+        <mc:AlternateContent xmlns:mc="http://schemas.openxmlformats.org/markup-compatibility/2006" xmlns:p14="http://schemas.microsoft.com/office/powerpoint/2010/main">
+          <mc:Choice Requires="p14">
             <p:contentPart p14:bwMode="auto" r:id="rId227">
               <p14:nvContentPartPr>
                 <p14:cNvPr id="288" name="Ink 287">
@@ -21723,7 +21731,7 @@
               </p14:xfrm>
             </p:contentPart>
           </mc:Choice>
-          <mc:Fallback>
+          <mc:Fallback xmlns="">
             <p:pic>
               <p:nvPicPr>
                 <p:cNvPr id="288" name="Ink 287">
@@ -21754,8 +21762,8 @@
             </p:pic>
           </mc:Fallback>
         </mc:AlternateContent>
-        <mc:AlternateContent xmlns:mc="http://schemas.openxmlformats.org/markup-compatibility/2006">
-          <mc:Choice xmlns:p14="http://schemas.microsoft.com/office/powerpoint/2010/main" Requires="p14">
+        <mc:AlternateContent xmlns:mc="http://schemas.openxmlformats.org/markup-compatibility/2006" xmlns:p14="http://schemas.microsoft.com/office/powerpoint/2010/main">
+          <mc:Choice Requires="p14">
             <p:contentPart p14:bwMode="auto" r:id="rId229">
               <p14:nvContentPartPr>
                 <p14:cNvPr id="289" name="Ink 288">
@@ -21774,7 +21782,7 @@
               </p14:xfrm>
             </p:contentPart>
           </mc:Choice>
-          <mc:Fallback>
+          <mc:Fallback xmlns="">
             <p:pic>
               <p:nvPicPr>
                 <p:cNvPr id="289" name="Ink 288">
@@ -21805,8 +21813,8 @@
             </p:pic>
           </mc:Fallback>
         </mc:AlternateContent>
-        <mc:AlternateContent xmlns:mc="http://schemas.openxmlformats.org/markup-compatibility/2006">
-          <mc:Choice xmlns:p14="http://schemas.microsoft.com/office/powerpoint/2010/main" Requires="p14">
+        <mc:AlternateContent xmlns:mc="http://schemas.openxmlformats.org/markup-compatibility/2006" xmlns:p14="http://schemas.microsoft.com/office/powerpoint/2010/main">
+          <mc:Choice Requires="p14">
             <p:contentPart p14:bwMode="auto" r:id="rId231">
               <p14:nvContentPartPr>
                 <p14:cNvPr id="290" name="Ink 289">
@@ -21825,7 +21833,7 @@
               </p14:xfrm>
             </p:contentPart>
           </mc:Choice>
-          <mc:Fallback>
+          <mc:Fallback xmlns="">
             <p:pic>
               <p:nvPicPr>
                 <p:cNvPr id="290" name="Ink 289">
@@ -21856,8 +21864,8 @@
             </p:pic>
           </mc:Fallback>
         </mc:AlternateContent>
-        <mc:AlternateContent xmlns:mc="http://schemas.openxmlformats.org/markup-compatibility/2006">
-          <mc:Choice xmlns:p14="http://schemas.microsoft.com/office/powerpoint/2010/main" Requires="p14">
+        <mc:AlternateContent xmlns:mc="http://schemas.openxmlformats.org/markup-compatibility/2006" xmlns:p14="http://schemas.microsoft.com/office/powerpoint/2010/main">
+          <mc:Choice Requires="p14">
             <p:contentPart p14:bwMode="auto" r:id="rId233">
               <p14:nvContentPartPr>
                 <p14:cNvPr id="291" name="Ink 290">
@@ -21876,7 +21884,7 @@
               </p14:xfrm>
             </p:contentPart>
           </mc:Choice>
-          <mc:Fallback>
+          <mc:Fallback xmlns="">
             <p:pic>
               <p:nvPicPr>
                 <p:cNvPr id="291" name="Ink 290">
@@ -21907,8 +21915,8 @@
             </p:pic>
           </mc:Fallback>
         </mc:AlternateContent>
-        <mc:AlternateContent xmlns:mc="http://schemas.openxmlformats.org/markup-compatibility/2006">
-          <mc:Choice xmlns:p14="http://schemas.microsoft.com/office/powerpoint/2010/main" Requires="p14">
+        <mc:AlternateContent xmlns:mc="http://schemas.openxmlformats.org/markup-compatibility/2006" xmlns:p14="http://schemas.microsoft.com/office/powerpoint/2010/main">
+          <mc:Choice Requires="p14">
             <p:contentPart p14:bwMode="auto" r:id="rId235">
               <p14:nvContentPartPr>
                 <p14:cNvPr id="292" name="Ink 291">
@@ -21927,7 +21935,7 @@
               </p14:xfrm>
             </p:contentPart>
           </mc:Choice>
-          <mc:Fallback>
+          <mc:Fallback xmlns="">
             <p:pic>
               <p:nvPicPr>
                 <p:cNvPr id="292" name="Ink 291">
@@ -21958,8 +21966,8 @@
             </p:pic>
           </mc:Fallback>
         </mc:AlternateContent>
-        <mc:AlternateContent xmlns:mc="http://schemas.openxmlformats.org/markup-compatibility/2006">
-          <mc:Choice xmlns:p14="http://schemas.microsoft.com/office/powerpoint/2010/main" Requires="p14">
+        <mc:AlternateContent xmlns:mc="http://schemas.openxmlformats.org/markup-compatibility/2006" xmlns:p14="http://schemas.microsoft.com/office/powerpoint/2010/main">
+          <mc:Choice Requires="p14">
             <p:contentPart p14:bwMode="auto" r:id="rId237">
               <p14:nvContentPartPr>
                 <p14:cNvPr id="293" name="Ink 292">
@@ -21978,7 +21986,7 @@
               </p14:xfrm>
             </p:contentPart>
           </mc:Choice>
-          <mc:Fallback>
+          <mc:Fallback xmlns="">
             <p:pic>
               <p:nvPicPr>
                 <p:cNvPr id="293" name="Ink 292">
@@ -22009,8 +22017,8 @@
             </p:pic>
           </mc:Fallback>
         </mc:AlternateContent>
-        <mc:AlternateContent xmlns:mc="http://schemas.openxmlformats.org/markup-compatibility/2006">
-          <mc:Choice xmlns:p14="http://schemas.microsoft.com/office/powerpoint/2010/main" Requires="p14">
+        <mc:AlternateContent xmlns:mc="http://schemas.openxmlformats.org/markup-compatibility/2006" xmlns:p14="http://schemas.microsoft.com/office/powerpoint/2010/main">
+          <mc:Choice Requires="p14">
             <p:contentPart p14:bwMode="auto" r:id="rId239">
               <p14:nvContentPartPr>
                 <p14:cNvPr id="294" name="Ink 293">
@@ -22029,7 +22037,7 @@
               </p14:xfrm>
             </p:contentPart>
           </mc:Choice>
-          <mc:Fallback>
+          <mc:Fallback xmlns="">
             <p:pic>
               <p:nvPicPr>
                 <p:cNvPr id="294" name="Ink 293">
@@ -22081,8 +22089,8 @@
             <a:chExt cx="700920" cy="182160"/>
           </a:xfrm>
         </p:grpSpPr>
-        <mc:AlternateContent xmlns:mc="http://schemas.openxmlformats.org/markup-compatibility/2006">
-          <mc:Choice xmlns:p14="http://schemas.microsoft.com/office/powerpoint/2010/main" Requires="p14">
+        <mc:AlternateContent xmlns:mc="http://schemas.openxmlformats.org/markup-compatibility/2006" xmlns:p14="http://schemas.microsoft.com/office/powerpoint/2010/main">
+          <mc:Choice Requires="p14">
             <p:contentPart p14:bwMode="auto" r:id="rId241">
               <p14:nvContentPartPr>
                 <p14:cNvPr id="295" name="Ink 294">
@@ -22101,7 +22109,7 @@
               </p14:xfrm>
             </p:contentPart>
           </mc:Choice>
-          <mc:Fallback>
+          <mc:Fallback xmlns="">
             <p:pic>
               <p:nvPicPr>
                 <p:cNvPr id="295" name="Ink 294">
@@ -22132,8 +22140,8 @@
             </p:pic>
           </mc:Fallback>
         </mc:AlternateContent>
-        <mc:AlternateContent xmlns:mc="http://schemas.openxmlformats.org/markup-compatibility/2006">
-          <mc:Choice xmlns:p14="http://schemas.microsoft.com/office/powerpoint/2010/main" Requires="p14">
+        <mc:AlternateContent xmlns:mc="http://schemas.openxmlformats.org/markup-compatibility/2006" xmlns:p14="http://schemas.microsoft.com/office/powerpoint/2010/main">
+          <mc:Choice Requires="p14">
             <p:contentPart p14:bwMode="auto" r:id="rId243">
               <p14:nvContentPartPr>
                 <p14:cNvPr id="296" name="Ink 295">
@@ -22152,7 +22160,7 @@
               </p14:xfrm>
             </p:contentPart>
           </mc:Choice>
-          <mc:Fallback>
+          <mc:Fallback xmlns="">
             <p:pic>
               <p:nvPicPr>
                 <p:cNvPr id="296" name="Ink 295">
@@ -22183,8 +22191,8 @@
             </p:pic>
           </mc:Fallback>
         </mc:AlternateContent>
-        <mc:AlternateContent xmlns:mc="http://schemas.openxmlformats.org/markup-compatibility/2006">
-          <mc:Choice xmlns:p14="http://schemas.microsoft.com/office/powerpoint/2010/main" Requires="p14">
+        <mc:AlternateContent xmlns:mc="http://schemas.openxmlformats.org/markup-compatibility/2006" xmlns:p14="http://schemas.microsoft.com/office/powerpoint/2010/main">
+          <mc:Choice Requires="p14">
             <p:contentPart p14:bwMode="auto" r:id="rId245">
               <p14:nvContentPartPr>
                 <p14:cNvPr id="297" name="Ink 296">
@@ -22203,7 +22211,7 @@
               </p14:xfrm>
             </p:contentPart>
           </mc:Choice>
-          <mc:Fallback>
+          <mc:Fallback xmlns="">
             <p:pic>
               <p:nvPicPr>
                 <p:cNvPr id="297" name="Ink 296">
@@ -22234,8 +22242,8 @@
             </p:pic>
           </mc:Fallback>
         </mc:AlternateContent>
-        <mc:AlternateContent xmlns:mc="http://schemas.openxmlformats.org/markup-compatibility/2006">
-          <mc:Choice xmlns:p14="http://schemas.microsoft.com/office/powerpoint/2010/main" Requires="p14">
+        <mc:AlternateContent xmlns:mc="http://schemas.openxmlformats.org/markup-compatibility/2006" xmlns:p14="http://schemas.microsoft.com/office/powerpoint/2010/main">
+          <mc:Choice Requires="p14">
             <p:contentPart p14:bwMode="auto" r:id="rId247">
               <p14:nvContentPartPr>
                 <p14:cNvPr id="298" name="Ink 297">
@@ -22254,7 +22262,7 @@
               </p14:xfrm>
             </p:contentPart>
           </mc:Choice>
-          <mc:Fallback>
+          <mc:Fallback xmlns="">
             <p:pic>
               <p:nvPicPr>
                 <p:cNvPr id="298" name="Ink 297">
@@ -22285,8 +22293,8 @@
             </p:pic>
           </mc:Fallback>
         </mc:AlternateContent>
-        <mc:AlternateContent xmlns:mc="http://schemas.openxmlformats.org/markup-compatibility/2006">
-          <mc:Choice xmlns:p14="http://schemas.microsoft.com/office/powerpoint/2010/main" Requires="p14">
+        <mc:AlternateContent xmlns:mc="http://schemas.openxmlformats.org/markup-compatibility/2006" xmlns:p14="http://schemas.microsoft.com/office/powerpoint/2010/main">
+          <mc:Choice Requires="p14">
             <p:contentPart p14:bwMode="auto" r:id="rId249">
               <p14:nvContentPartPr>
                 <p14:cNvPr id="299" name="Ink 298">
@@ -22305,7 +22313,7 @@
               </p14:xfrm>
             </p:contentPart>
           </mc:Choice>
-          <mc:Fallback>
+          <mc:Fallback xmlns="">
             <p:pic>
               <p:nvPicPr>
                 <p:cNvPr id="299" name="Ink 298">
@@ -22336,8 +22344,8 @@
             </p:pic>
           </mc:Fallback>
         </mc:AlternateContent>
-        <mc:AlternateContent xmlns:mc="http://schemas.openxmlformats.org/markup-compatibility/2006">
-          <mc:Choice xmlns:p14="http://schemas.microsoft.com/office/powerpoint/2010/main" Requires="p14">
+        <mc:AlternateContent xmlns:mc="http://schemas.openxmlformats.org/markup-compatibility/2006" xmlns:p14="http://schemas.microsoft.com/office/powerpoint/2010/main">
+          <mc:Choice Requires="p14">
             <p:contentPart p14:bwMode="auto" r:id="rId251">
               <p14:nvContentPartPr>
                 <p14:cNvPr id="300" name="Ink 299">
@@ -22356,7 +22364,7 @@
               </p14:xfrm>
             </p:contentPart>
           </mc:Choice>
-          <mc:Fallback>
+          <mc:Fallback xmlns="">
             <p:pic>
               <p:nvPicPr>
                 <p:cNvPr id="300" name="Ink 299">
@@ -22387,8 +22395,8 @@
             </p:pic>
           </mc:Fallback>
         </mc:AlternateContent>
-        <mc:AlternateContent xmlns:mc="http://schemas.openxmlformats.org/markup-compatibility/2006">
-          <mc:Choice xmlns:p14="http://schemas.microsoft.com/office/powerpoint/2010/main" Requires="p14">
+        <mc:AlternateContent xmlns:mc="http://schemas.openxmlformats.org/markup-compatibility/2006" xmlns:p14="http://schemas.microsoft.com/office/powerpoint/2010/main">
+          <mc:Choice Requires="p14">
             <p:contentPart p14:bwMode="auto" r:id="rId253">
               <p14:nvContentPartPr>
                 <p14:cNvPr id="301" name="Ink 300">
@@ -22407,7 +22415,7 @@
               </p14:xfrm>
             </p:contentPart>
           </mc:Choice>
-          <mc:Fallback>
+          <mc:Fallback xmlns="">
             <p:pic>
               <p:nvPicPr>
                 <p:cNvPr id="301" name="Ink 300">
@@ -22438,8 +22446,8 @@
             </p:pic>
           </mc:Fallback>
         </mc:AlternateContent>
-        <mc:AlternateContent xmlns:mc="http://schemas.openxmlformats.org/markup-compatibility/2006">
-          <mc:Choice xmlns:p14="http://schemas.microsoft.com/office/powerpoint/2010/main" Requires="p14">
+        <mc:AlternateContent xmlns:mc="http://schemas.openxmlformats.org/markup-compatibility/2006" xmlns:p14="http://schemas.microsoft.com/office/powerpoint/2010/main">
+          <mc:Choice Requires="p14">
             <p:contentPart p14:bwMode="auto" r:id="rId255">
               <p14:nvContentPartPr>
                 <p14:cNvPr id="302" name="Ink 301">
@@ -22458,7 +22466,7 @@
               </p14:xfrm>
             </p:contentPart>
           </mc:Choice>
-          <mc:Fallback>
+          <mc:Fallback xmlns="">
             <p:pic>
               <p:nvPicPr>
                 <p:cNvPr id="302" name="Ink 301">
@@ -22489,8 +22497,8 @@
             </p:pic>
           </mc:Fallback>
         </mc:AlternateContent>
-        <mc:AlternateContent xmlns:mc="http://schemas.openxmlformats.org/markup-compatibility/2006">
-          <mc:Choice xmlns:p14="http://schemas.microsoft.com/office/powerpoint/2010/main" Requires="p14">
+        <mc:AlternateContent xmlns:mc="http://schemas.openxmlformats.org/markup-compatibility/2006" xmlns:p14="http://schemas.microsoft.com/office/powerpoint/2010/main">
+          <mc:Choice Requires="p14">
             <p:contentPart p14:bwMode="auto" r:id="rId257">
               <p14:nvContentPartPr>
                 <p14:cNvPr id="303" name="Ink 302">
@@ -22509,7 +22517,7 @@
               </p14:xfrm>
             </p:contentPart>
           </mc:Choice>
-          <mc:Fallback>
+          <mc:Fallback xmlns="">
             <p:pic>
               <p:nvPicPr>
                 <p:cNvPr id="303" name="Ink 302">
@@ -22561,8 +22569,8 @@
             <a:chExt cx="189000" cy="179640"/>
           </a:xfrm>
         </p:grpSpPr>
-        <mc:AlternateContent xmlns:mc="http://schemas.openxmlformats.org/markup-compatibility/2006">
-          <mc:Choice xmlns:p14="http://schemas.microsoft.com/office/powerpoint/2010/main" Requires="p14">
+        <mc:AlternateContent xmlns:mc="http://schemas.openxmlformats.org/markup-compatibility/2006" xmlns:p14="http://schemas.microsoft.com/office/powerpoint/2010/main">
+          <mc:Choice Requires="p14">
             <p:contentPart p14:bwMode="auto" r:id="rId259">
               <p14:nvContentPartPr>
                 <p14:cNvPr id="304" name="Ink 303">
@@ -22581,7 +22589,7 @@
               </p14:xfrm>
             </p:contentPart>
           </mc:Choice>
-          <mc:Fallback>
+          <mc:Fallback xmlns="">
             <p:pic>
               <p:nvPicPr>
                 <p:cNvPr id="304" name="Ink 303">
@@ -22612,8 +22620,8 @@
             </p:pic>
           </mc:Fallback>
         </mc:AlternateContent>
-        <mc:AlternateContent xmlns:mc="http://schemas.openxmlformats.org/markup-compatibility/2006">
-          <mc:Choice xmlns:p14="http://schemas.microsoft.com/office/powerpoint/2010/main" Requires="p14">
+        <mc:AlternateContent xmlns:mc="http://schemas.openxmlformats.org/markup-compatibility/2006" xmlns:p14="http://schemas.microsoft.com/office/powerpoint/2010/main">
+          <mc:Choice Requires="p14">
             <p:contentPart p14:bwMode="auto" r:id="rId261">
               <p14:nvContentPartPr>
                 <p14:cNvPr id="305" name="Ink 304">
@@ -22632,7 +22640,7 @@
               </p14:xfrm>
             </p:contentPart>
           </mc:Choice>
-          <mc:Fallback>
+          <mc:Fallback xmlns="">
             <p:pic>
               <p:nvPicPr>
                 <p:cNvPr id="305" name="Ink 304">
@@ -22663,8 +22671,8 @@
             </p:pic>
           </mc:Fallback>
         </mc:AlternateContent>
-        <mc:AlternateContent xmlns:mc="http://schemas.openxmlformats.org/markup-compatibility/2006">
-          <mc:Choice xmlns:p14="http://schemas.microsoft.com/office/powerpoint/2010/main" Requires="p14">
+        <mc:AlternateContent xmlns:mc="http://schemas.openxmlformats.org/markup-compatibility/2006" xmlns:p14="http://schemas.microsoft.com/office/powerpoint/2010/main">
+          <mc:Choice Requires="p14">
             <p:contentPart p14:bwMode="auto" r:id="rId263">
               <p14:nvContentPartPr>
                 <p14:cNvPr id="306" name="Ink 305">
@@ -22683,7 +22691,7 @@
               </p14:xfrm>
             </p:contentPart>
           </mc:Choice>
-          <mc:Fallback>
+          <mc:Fallback xmlns="">
             <p:pic>
               <p:nvPicPr>
                 <p:cNvPr id="306" name="Ink 305">
@@ -22735,8 +22743,8 @@
             <a:chExt cx="376920" cy="141120"/>
           </a:xfrm>
         </p:grpSpPr>
-        <mc:AlternateContent xmlns:mc="http://schemas.openxmlformats.org/markup-compatibility/2006">
-          <mc:Choice xmlns:p14="http://schemas.microsoft.com/office/powerpoint/2010/main" Requires="p14">
+        <mc:AlternateContent xmlns:mc="http://schemas.openxmlformats.org/markup-compatibility/2006" xmlns:p14="http://schemas.microsoft.com/office/powerpoint/2010/main">
+          <mc:Choice Requires="p14">
             <p:contentPart p14:bwMode="auto" r:id="rId265">
               <p14:nvContentPartPr>
                 <p14:cNvPr id="315" name="Ink 314">
@@ -22755,7 +22763,7 @@
               </p14:xfrm>
             </p:contentPart>
           </mc:Choice>
-          <mc:Fallback>
+          <mc:Fallback xmlns="">
             <p:pic>
               <p:nvPicPr>
                 <p:cNvPr id="315" name="Ink 314">
@@ -22786,8 +22794,8 @@
             </p:pic>
           </mc:Fallback>
         </mc:AlternateContent>
-        <mc:AlternateContent xmlns:mc="http://schemas.openxmlformats.org/markup-compatibility/2006">
-          <mc:Choice xmlns:p14="http://schemas.microsoft.com/office/powerpoint/2010/main" Requires="p14">
+        <mc:AlternateContent xmlns:mc="http://schemas.openxmlformats.org/markup-compatibility/2006" xmlns:p14="http://schemas.microsoft.com/office/powerpoint/2010/main">
+          <mc:Choice Requires="p14">
             <p:contentPart p14:bwMode="auto" r:id="rId267">
               <p14:nvContentPartPr>
                 <p14:cNvPr id="316" name="Ink 315">
@@ -22806,7 +22814,7 @@
               </p14:xfrm>
             </p:contentPart>
           </mc:Choice>
-          <mc:Fallback>
+          <mc:Fallback xmlns="">
             <p:pic>
               <p:nvPicPr>
                 <p:cNvPr id="316" name="Ink 315">
@@ -22837,8 +22845,8 @@
             </p:pic>
           </mc:Fallback>
         </mc:AlternateContent>
-        <mc:AlternateContent xmlns:mc="http://schemas.openxmlformats.org/markup-compatibility/2006">
-          <mc:Choice xmlns:p14="http://schemas.microsoft.com/office/powerpoint/2010/main" Requires="p14">
+        <mc:AlternateContent xmlns:mc="http://schemas.openxmlformats.org/markup-compatibility/2006" xmlns:p14="http://schemas.microsoft.com/office/powerpoint/2010/main">
+          <mc:Choice Requires="p14">
             <p:contentPart p14:bwMode="auto" r:id="rId269">
               <p14:nvContentPartPr>
                 <p14:cNvPr id="317" name="Ink 316">
@@ -22857,7 +22865,7 @@
               </p14:xfrm>
             </p:contentPart>
           </mc:Choice>
-          <mc:Fallback>
+          <mc:Fallback xmlns="">
             <p:pic>
               <p:nvPicPr>
                 <p:cNvPr id="317" name="Ink 316">
@@ -22888,8 +22896,8 @@
             </p:pic>
           </mc:Fallback>
         </mc:AlternateContent>
-        <mc:AlternateContent xmlns:mc="http://schemas.openxmlformats.org/markup-compatibility/2006">
-          <mc:Choice xmlns:p14="http://schemas.microsoft.com/office/powerpoint/2010/main" Requires="p14">
+        <mc:AlternateContent xmlns:mc="http://schemas.openxmlformats.org/markup-compatibility/2006" xmlns:p14="http://schemas.microsoft.com/office/powerpoint/2010/main">
+          <mc:Choice Requires="p14">
             <p:contentPart p14:bwMode="auto" r:id="rId271">
               <p14:nvContentPartPr>
                 <p14:cNvPr id="318" name="Ink 317">
@@ -22908,7 +22916,7 @@
               </p14:xfrm>
             </p:contentPart>
           </mc:Choice>
-          <mc:Fallback>
+          <mc:Fallback xmlns="">
             <p:pic>
               <p:nvPicPr>
                 <p:cNvPr id="318" name="Ink 317">
@@ -22939,8 +22947,8 @@
             </p:pic>
           </mc:Fallback>
         </mc:AlternateContent>
-        <mc:AlternateContent xmlns:mc="http://schemas.openxmlformats.org/markup-compatibility/2006">
-          <mc:Choice xmlns:p14="http://schemas.microsoft.com/office/powerpoint/2010/main" Requires="p14">
+        <mc:AlternateContent xmlns:mc="http://schemas.openxmlformats.org/markup-compatibility/2006" xmlns:p14="http://schemas.microsoft.com/office/powerpoint/2010/main">
+          <mc:Choice Requires="p14">
             <p:contentPart p14:bwMode="auto" r:id="rId273">
               <p14:nvContentPartPr>
                 <p14:cNvPr id="319" name="Ink 318">
@@ -22959,7 +22967,7 @@
               </p14:xfrm>
             </p:contentPart>
           </mc:Choice>
-          <mc:Fallback>
+          <mc:Fallback xmlns="">
             <p:pic>
               <p:nvPicPr>
                 <p:cNvPr id="319" name="Ink 318">
@@ -23011,8 +23019,8 @@
             <a:chExt cx="180360" cy="135720"/>
           </a:xfrm>
         </p:grpSpPr>
-        <mc:AlternateContent xmlns:mc="http://schemas.openxmlformats.org/markup-compatibility/2006">
-          <mc:Choice xmlns:p14="http://schemas.microsoft.com/office/powerpoint/2010/main" Requires="p14">
+        <mc:AlternateContent xmlns:mc="http://schemas.openxmlformats.org/markup-compatibility/2006" xmlns:p14="http://schemas.microsoft.com/office/powerpoint/2010/main">
+          <mc:Choice Requires="p14">
             <p:contentPart p14:bwMode="auto" r:id="rId275">
               <p14:nvContentPartPr>
                 <p14:cNvPr id="321" name="Ink 320">
@@ -23031,7 +23039,7 @@
               </p14:xfrm>
             </p:contentPart>
           </mc:Choice>
-          <mc:Fallback>
+          <mc:Fallback xmlns="">
             <p:pic>
               <p:nvPicPr>
                 <p:cNvPr id="321" name="Ink 320">
@@ -23062,8 +23070,8 @@
             </p:pic>
           </mc:Fallback>
         </mc:AlternateContent>
-        <mc:AlternateContent xmlns:mc="http://schemas.openxmlformats.org/markup-compatibility/2006">
-          <mc:Choice xmlns:p14="http://schemas.microsoft.com/office/powerpoint/2010/main" Requires="p14">
+        <mc:AlternateContent xmlns:mc="http://schemas.openxmlformats.org/markup-compatibility/2006" xmlns:p14="http://schemas.microsoft.com/office/powerpoint/2010/main">
+          <mc:Choice Requires="p14">
             <p:contentPart p14:bwMode="auto" r:id="rId277">
               <p14:nvContentPartPr>
                 <p14:cNvPr id="322" name="Ink 321">
@@ -23082,7 +23090,7 @@
               </p14:xfrm>
             </p:contentPart>
           </mc:Choice>
-          <mc:Fallback>
+          <mc:Fallback xmlns="">
             <p:pic>
               <p:nvPicPr>
                 <p:cNvPr id="322" name="Ink 321">
@@ -23113,8 +23121,8 @@
             </p:pic>
           </mc:Fallback>
         </mc:AlternateContent>
-        <mc:AlternateContent xmlns:mc="http://schemas.openxmlformats.org/markup-compatibility/2006">
-          <mc:Choice xmlns:p14="http://schemas.microsoft.com/office/powerpoint/2010/main" Requires="p14">
+        <mc:AlternateContent xmlns:mc="http://schemas.openxmlformats.org/markup-compatibility/2006" xmlns:p14="http://schemas.microsoft.com/office/powerpoint/2010/main">
+          <mc:Choice Requires="p14">
             <p:contentPart p14:bwMode="auto" r:id="rId279">
               <p14:nvContentPartPr>
                 <p14:cNvPr id="324" name="Ink 323">
@@ -23133,7 +23141,7 @@
               </p14:xfrm>
             </p:contentPart>
           </mc:Choice>
-          <mc:Fallback>
+          <mc:Fallback xmlns="">
             <p:pic>
               <p:nvPicPr>
                 <p:cNvPr id="324" name="Ink 323">
@@ -23164,8 +23172,8 @@
             </p:pic>
           </mc:Fallback>
         </mc:AlternateContent>
-        <mc:AlternateContent xmlns:mc="http://schemas.openxmlformats.org/markup-compatibility/2006">
-          <mc:Choice xmlns:p14="http://schemas.microsoft.com/office/powerpoint/2010/main" Requires="p14">
+        <mc:AlternateContent xmlns:mc="http://schemas.openxmlformats.org/markup-compatibility/2006" xmlns:p14="http://schemas.microsoft.com/office/powerpoint/2010/main">
+          <mc:Choice Requires="p14">
             <p:contentPart p14:bwMode="auto" r:id="rId281">
               <p14:nvContentPartPr>
                 <p14:cNvPr id="325" name="Ink 324">
@@ -23184,7 +23192,7 @@
               </p14:xfrm>
             </p:contentPart>
           </mc:Choice>
-          <mc:Fallback>
+          <mc:Fallback xmlns="">
             <p:pic>
               <p:nvPicPr>
                 <p:cNvPr id="325" name="Ink 324">
@@ -23215,8 +23223,8 @@
             </p:pic>
           </mc:Fallback>
         </mc:AlternateContent>
-        <mc:AlternateContent xmlns:mc="http://schemas.openxmlformats.org/markup-compatibility/2006">
-          <mc:Choice xmlns:p14="http://schemas.microsoft.com/office/powerpoint/2010/main" Requires="p14">
+        <mc:AlternateContent xmlns:mc="http://schemas.openxmlformats.org/markup-compatibility/2006" xmlns:p14="http://schemas.microsoft.com/office/powerpoint/2010/main">
+          <mc:Choice Requires="p14">
             <p:contentPart p14:bwMode="auto" r:id="rId283">
               <p14:nvContentPartPr>
                 <p14:cNvPr id="326" name="Ink 325">
@@ -23235,7 +23243,7 @@
               </p14:xfrm>
             </p:contentPart>
           </mc:Choice>
-          <mc:Fallback>
+          <mc:Fallback xmlns="">
             <p:pic>
               <p:nvPicPr>
                 <p:cNvPr id="326" name="Ink 325">
@@ -23287,8 +23295,8 @@
             <a:chExt cx="2357412" cy="452064"/>
           </a:xfrm>
         </p:grpSpPr>
-        <mc:AlternateContent xmlns:mc="http://schemas.openxmlformats.org/markup-compatibility/2006">
-          <mc:Choice xmlns:p14="http://schemas.microsoft.com/office/powerpoint/2010/main" Requires="p14">
+        <mc:AlternateContent xmlns:mc="http://schemas.openxmlformats.org/markup-compatibility/2006" xmlns:p14="http://schemas.microsoft.com/office/powerpoint/2010/main">
+          <mc:Choice Requires="p14">
             <p:contentPart p14:bwMode="auto" r:id="rId285">
               <p14:nvContentPartPr>
                 <p14:cNvPr id="105" name="Ink 104">
@@ -23307,7 +23315,7 @@
               </p14:xfrm>
             </p:contentPart>
           </mc:Choice>
-          <mc:Fallback>
+          <mc:Fallback xmlns="">
             <p:pic>
               <p:nvPicPr>
                 <p:cNvPr id="105" name="Ink 104">
@@ -23338,8 +23346,8 @@
             </p:pic>
           </mc:Fallback>
         </mc:AlternateContent>
-        <mc:AlternateContent xmlns:mc="http://schemas.openxmlformats.org/markup-compatibility/2006">
-          <mc:Choice xmlns:p14="http://schemas.microsoft.com/office/powerpoint/2010/main" Requires="p14">
+        <mc:AlternateContent xmlns:mc="http://schemas.openxmlformats.org/markup-compatibility/2006" xmlns:p14="http://schemas.microsoft.com/office/powerpoint/2010/main">
+          <mc:Choice Requires="p14">
             <p:contentPart p14:bwMode="auto" r:id="rId287">
               <p14:nvContentPartPr>
                 <p14:cNvPr id="106" name="Ink 105">
@@ -23358,7 +23366,7 @@
               </p14:xfrm>
             </p:contentPart>
           </mc:Choice>
-          <mc:Fallback>
+          <mc:Fallback xmlns="">
             <p:pic>
               <p:nvPicPr>
                 <p:cNvPr id="106" name="Ink 105">
@@ -23389,8 +23397,8 @@
             </p:pic>
           </mc:Fallback>
         </mc:AlternateContent>
-        <mc:AlternateContent xmlns:mc="http://schemas.openxmlformats.org/markup-compatibility/2006">
-          <mc:Choice xmlns:p14="http://schemas.microsoft.com/office/powerpoint/2010/main" Requires="p14">
+        <mc:AlternateContent xmlns:mc="http://schemas.openxmlformats.org/markup-compatibility/2006" xmlns:p14="http://schemas.microsoft.com/office/powerpoint/2010/main">
+          <mc:Choice Requires="p14">
             <p:contentPart p14:bwMode="auto" r:id="rId289">
               <p14:nvContentPartPr>
                 <p14:cNvPr id="148" name="Ink 147">
@@ -23409,7 +23417,7 @@
               </p14:xfrm>
             </p:contentPart>
           </mc:Choice>
-          <mc:Fallback>
+          <mc:Fallback xmlns="">
             <p:pic>
               <p:nvPicPr>
                 <p:cNvPr id="148" name="Ink 147">
@@ -23440,8 +23448,8 @@
             </p:pic>
           </mc:Fallback>
         </mc:AlternateContent>
-        <mc:AlternateContent xmlns:mc="http://schemas.openxmlformats.org/markup-compatibility/2006">
-          <mc:Choice xmlns:p14="http://schemas.microsoft.com/office/powerpoint/2010/main" Requires="p14">
+        <mc:AlternateContent xmlns:mc="http://schemas.openxmlformats.org/markup-compatibility/2006" xmlns:p14="http://schemas.microsoft.com/office/powerpoint/2010/main">
+          <mc:Choice Requires="p14">
             <p:contentPart p14:bwMode="auto" r:id="rId291">
               <p14:nvContentPartPr>
                 <p14:cNvPr id="149" name="Ink 148">
@@ -23460,7 +23468,7 @@
               </p14:xfrm>
             </p:contentPart>
           </mc:Choice>
-          <mc:Fallback>
+          <mc:Fallback xmlns="">
             <p:pic>
               <p:nvPicPr>
                 <p:cNvPr id="149" name="Ink 148">
@@ -23491,8 +23499,8 @@
             </p:pic>
           </mc:Fallback>
         </mc:AlternateContent>
-        <mc:AlternateContent xmlns:mc="http://schemas.openxmlformats.org/markup-compatibility/2006">
-          <mc:Choice xmlns:p14="http://schemas.microsoft.com/office/powerpoint/2010/main" Requires="p14">
+        <mc:AlternateContent xmlns:mc="http://schemas.openxmlformats.org/markup-compatibility/2006" xmlns:p14="http://schemas.microsoft.com/office/powerpoint/2010/main">
+          <mc:Choice Requires="p14">
             <p:contentPart p14:bwMode="auto" r:id="rId293">
               <p14:nvContentPartPr>
                 <p14:cNvPr id="150" name="Ink 149">
@@ -23511,7 +23519,7 @@
               </p14:xfrm>
             </p:contentPart>
           </mc:Choice>
-          <mc:Fallback>
+          <mc:Fallback xmlns="">
             <p:pic>
               <p:nvPicPr>
                 <p:cNvPr id="150" name="Ink 149">
@@ -23542,8 +23550,8 @@
             </p:pic>
           </mc:Fallback>
         </mc:AlternateContent>
-        <mc:AlternateContent xmlns:mc="http://schemas.openxmlformats.org/markup-compatibility/2006">
-          <mc:Choice xmlns:p14="http://schemas.microsoft.com/office/powerpoint/2010/main" Requires="p14">
+        <mc:AlternateContent xmlns:mc="http://schemas.openxmlformats.org/markup-compatibility/2006" xmlns:p14="http://schemas.microsoft.com/office/powerpoint/2010/main">
+          <mc:Choice Requires="p14">
             <p:contentPart p14:bwMode="auto" r:id="rId295">
               <p14:nvContentPartPr>
                 <p14:cNvPr id="151" name="Ink 150">
@@ -23562,7 +23570,7 @@
               </p14:xfrm>
             </p:contentPart>
           </mc:Choice>
-          <mc:Fallback>
+          <mc:Fallback xmlns="">
             <p:pic>
               <p:nvPicPr>
                 <p:cNvPr id="151" name="Ink 150">
@@ -23593,8 +23601,8 @@
             </p:pic>
           </mc:Fallback>
         </mc:AlternateContent>
-        <mc:AlternateContent xmlns:mc="http://schemas.openxmlformats.org/markup-compatibility/2006">
-          <mc:Choice xmlns:p14="http://schemas.microsoft.com/office/powerpoint/2010/main" Requires="p14">
+        <mc:AlternateContent xmlns:mc="http://schemas.openxmlformats.org/markup-compatibility/2006" xmlns:p14="http://schemas.microsoft.com/office/powerpoint/2010/main">
+          <mc:Choice Requires="p14">
             <p:contentPart p14:bwMode="auto" r:id="rId297">
               <p14:nvContentPartPr>
                 <p14:cNvPr id="253" name="Ink 252">
@@ -23613,7 +23621,7 @@
               </p14:xfrm>
             </p:contentPart>
           </mc:Choice>
-          <mc:Fallback>
+          <mc:Fallback xmlns="">
             <p:pic>
               <p:nvPicPr>
                 <p:cNvPr id="253" name="Ink 252">
@@ -23644,8 +23652,8 @@
             </p:pic>
           </mc:Fallback>
         </mc:AlternateContent>
-        <mc:AlternateContent xmlns:mc="http://schemas.openxmlformats.org/markup-compatibility/2006">
-          <mc:Choice xmlns:p14="http://schemas.microsoft.com/office/powerpoint/2010/main" Requires="p14">
+        <mc:AlternateContent xmlns:mc="http://schemas.openxmlformats.org/markup-compatibility/2006" xmlns:p14="http://schemas.microsoft.com/office/powerpoint/2010/main">
+          <mc:Choice Requires="p14">
             <p:contentPart p14:bwMode="auto" r:id="rId299">
               <p14:nvContentPartPr>
                 <p14:cNvPr id="254" name="Ink 253">
@@ -23664,7 +23672,7 @@
               </p14:xfrm>
             </p:contentPart>
           </mc:Choice>
-          <mc:Fallback>
+          <mc:Fallback xmlns="">
             <p:pic>
               <p:nvPicPr>
                 <p:cNvPr id="254" name="Ink 253">
@@ -23695,8 +23703,8 @@
             </p:pic>
           </mc:Fallback>
         </mc:AlternateContent>
-        <mc:AlternateContent xmlns:mc="http://schemas.openxmlformats.org/markup-compatibility/2006">
-          <mc:Choice xmlns:p14="http://schemas.microsoft.com/office/powerpoint/2010/main" Requires="p14">
+        <mc:AlternateContent xmlns:mc="http://schemas.openxmlformats.org/markup-compatibility/2006" xmlns:p14="http://schemas.microsoft.com/office/powerpoint/2010/main">
+          <mc:Choice Requires="p14">
             <p:contentPart p14:bwMode="auto" r:id="rId301">
               <p14:nvContentPartPr>
                 <p14:cNvPr id="256" name="Ink 255">
@@ -23715,7 +23723,7 @@
               </p14:xfrm>
             </p:contentPart>
           </mc:Choice>
-          <mc:Fallback>
+          <mc:Fallback xmlns="">
             <p:pic>
               <p:nvPicPr>
                 <p:cNvPr id="256" name="Ink 255">
@@ -23746,8 +23754,8 @@
             </p:pic>
           </mc:Fallback>
         </mc:AlternateContent>
-        <mc:AlternateContent xmlns:mc="http://schemas.openxmlformats.org/markup-compatibility/2006">
-          <mc:Choice xmlns:p14="http://schemas.microsoft.com/office/powerpoint/2010/main" Requires="p14">
+        <mc:AlternateContent xmlns:mc="http://schemas.openxmlformats.org/markup-compatibility/2006" xmlns:p14="http://schemas.microsoft.com/office/powerpoint/2010/main">
+          <mc:Choice Requires="p14">
             <p:contentPart p14:bwMode="auto" r:id="rId303">
               <p14:nvContentPartPr>
                 <p14:cNvPr id="257" name="Ink 256">
@@ -23766,7 +23774,7 @@
               </p14:xfrm>
             </p:contentPart>
           </mc:Choice>
-          <mc:Fallback>
+          <mc:Fallback xmlns="">
             <p:pic>
               <p:nvPicPr>
                 <p:cNvPr id="257" name="Ink 256">
@@ -23797,8 +23805,8 @@
             </p:pic>
           </mc:Fallback>
         </mc:AlternateContent>
-        <mc:AlternateContent xmlns:mc="http://schemas.openxmlformats.org/markup-compatibility/2006">
-          <mc:Choice xmlns:p14="http://schemas.microsoft.com/office/powerpoint/2010/main" Requires="p14">
+        <mc:AlternateContent xmlns:mc="http://schemas.openxmlformats.org/markup-compatibility/2006" xmlns:p14="http://schemas.microsoft.com/office/powerpoint/2010/main">
+          <mc:Choice Requires="p14">
             <p:contentPart p14:bwMode="auto" r:id="rId305">
               <p14:nvContentPartPr>
                 <p14:cNvPr id="258" name="Ink 257">
@@ -23817,7 +23825,7 @@
               </p14:xfrm>
             </p:contentPart>
           </mc:Choice>
-          <mc:Fallback>
+          <mc:Fallback xmlns="">
             <p:pic>
               <p:nvPicPr>
                 <p:cNvPr id="258" name="Ink 257">
@@ -23848,8 +23856,8 @@
             </p:pic>
           </mc:Fallback>
         </mc:AlternateContent>
-        <mc:AlternateContent xmlns:mc="http://schemas.openxmlformats.org/markup-compatibility/2006">
-          <mc:Choice xmlns:p14="http://schemas.microsoft.com/office/powerpoint/2010/main" Requires="p14">
+        <mc:AlternateContent xmlns:mc="http://schemas.openxmlformats.org/markup-compatibility/2006" xmlns:p14="http://schemas.microsoft.com/office/powerpoint/2010/main">
+          <mc:Choice Requires="p14">
             <p:contentPart p14:bwMode="auto" r:id="rId307">
               <p14:nvContentPartPr>
                 <p14:cNvPr id="259" name="Ink 258">
@@ -23868,7 +23876,7 @@
               </p14:xfrm>
             </p:contentPart>
           </mc:Choice>
-          <mc:Fallback>
+          <mc:Fallback xmlns="">
             <p:pic>
               <p:nvPicPr>
                 <p:cNvPr id="259" name="Ink 258">
@@ -23899,8 +23907,8 @@
             </p:pic>
           </mc:Fallback>
         </mc:AlternateContent>
-        <mc:AlternateContent xmlns:mc="http://schemas.openxmlformats.org/markup-compatibility/2006">
-          <mc:Choice xmlns:p14="http://schemas.microsoft.com/office/powerpoint/2010/main" Requires="p14">
+        <mc:AlternateContent xmlns:mc="http://schemas.openxmlformats.org/markup-compatibility/2006" xmlns:p14="http://schemas.microsoft.com/office/powerpoint/2010/main">
+          <mc:Choice Requires="p14">
             <p:contentPart p14:bwMode="auto" r:id="rId309">
               <p14:nvContentPartPr>
                 <p14:cNvPr id="260" name="Ink 259">
@@ -23919,7 +23927,7 @@
               </p14:xfrm>
             </p:contentPart>
           </mc:Choice>
-          <mc:Fallback>
+          <mc:Fallback xmlns="">
             <p:pic>
               <p:nvPicPr>
                 <p:cNvPr id="260" name="Ink 259">
@@ -23950,8 +23958,8 @@
             </p:pic>
           </mc:Fallback>
         </mc:AlternateContent>
-        <mc:AlternateContent xmlns:mc="http://schemas.openxmlformats.org/markup-compatibility/2006">
-          <mc:Choice xmlns:p14="http://schemas.microsoft.com/office/powerpoint/2010/main" Requires="p14">
+        <mc:AlternateContent xmlns:mc="http://schemas.openxmlformats.org/markup-compatibility/2006" xmlns:p14="http://schemas.microsoft.com/office/powerpoint/2010/main">
+          <mc:Choice Requires="p14">
             <p:contentPart p14:bwMode="auto" r:id="rId311">
               <p14:nvContentPartPr>
                 <p14:cNvPr id="261" name="Ink 260">
@@ -23970,7 +23978,7 @@
               </p14:xfrm>
             </p:contentPart>
           </mc:Choice>
-          <mc:Fallback>
+          <mc:Fallback xmlns="">
             <p:pic>
               <p:nvPicPr>
                 <p:cNvPr id="261" name="Ink 260">
@@ -24001,8 +24009,8 @@
             </p:pic>
           </mc:Fallback>
         </mc:AlternateContent>
-        <mc:AlternateContent xmlns:mc="http://schemas.openxmlformats.org/markup-compatibility/2006">
-          <mc:Choice xmlns:p14="http://schemas.microsoft.com/office/powerpoint/2010/main" Requires="p14">
+        <mc:AlternateContent xmlns:mc="http://schemas.openxmlformats.org/markup-compatibility/2006" xmlns:p14="http://schemas.microsoft.com/office/powerpoint/2010/main">
+          <mc:Choice Requires="p14">
             <p:contentPart p14:bwMode="auto" r:id="rId313">
               <p14:nvContentPartPr>
                 <p14:cNvPr id="262" name="Ink 261">
@@ -24021,7 +24029,7 @@
               </p14:xfrm>
             </p:contentPart>
           </mc:Choice>
-          <mc:Fallback>
+          <mc:Fallback xmlns="">
             <p:pic>
               <p:nvPicPr>
                 <p:cNvPr id="262" name="Ink 261">
@@ -24052,8 +24060,8 @@
             </p:pic>
           </mc:Fallback>
         </mc:AlternateContent>
-        <mc:AlternateContent xmlns:mc="http://schemas.openxmlformats.org/markup-compatibility/2006">
-          <mc:Choice xmlns:p14="http://schemas.microsoft.com/office/powerpoint/2010/main" Requires="p14">
+        <mc:AlternateContent xmlns:mc="http://schemas.openxmlformats.org/markup-compatibility/2006" xmlns:p14="http://schemas.microsoft.com/office/powerpoint/2010/main">
+          <mc:Choice Requires="p14">
             <p:contentPart p14:bwMode="auto" r:id="rId315">
               <p14:nvContentPartPr>
                 <p14:cNvPr id="263" name="Ink 262">
@@ -24072,7 +24080,7 @@
               </p14:xfrm>
             </p:contentPart>
           </mc:Choice>
-          <mc:Fallback>
+          <mc:Fallback xmlns="">
             <p:pic>
               <p:nvPicPr>
                 <p:cNvPr id="263" name="Ink 262">
@@ -24103,8 +24111,8 @@
             </p:pic>
           </mc:Fallback>
         </mc:AlternateContent>
-        <mc:AlternateContent xmlns:mc="http://schemas.openxmlformats.org/markup-compatibility/2006">
-          <mc:Choice xmlns:p14="http://schemas.microsoft.com/office/powerpoint/2010/main" Requires="p14">
+        <mc:AlternateContent xmlns:mc="http://schemas.openxmlformats.org/markup-compatibility/2006" xmlns:p14="http://schemas.microsoft.com/office/powerpoint/2010/main">
+          <mc:Choice Requires="p14">
             <p:contentPart p14:bwMode="auto" r:id="rId317">
               <p14:nvContentPartPr>
                 <p14:cNvPr id="264" name="Ink 263">
@@ -24123,7 +24131,7 @@
               </p14:xfrm>
             </p:contentPart>
           </mc:Choice>
-          <mc:Fallback>
+          <mc:Fallback xmlns="">
             <p:pic>
               <p:nvPicPr>
                 <p:cNvPr id="264" name="Ink 263">
@@ -24154,8 +24162,8 @@
             </p:pic>
           </mc:Fallback>
         </mc:AlternateContent>
-        <mc:AlternateContent xmlns:mc="http://schemas.openxmlformats.org/markup-compatibility/2006">
-          <mc:Choice xmlns:p14="http://schemas.microsoft.com/office/powerpoint/2010/main" Requires="p14">
+        <mc:AlternateContent xmlns:mc="http://schemas.openxmlformats.org/markup-compatibility/2006" xmlns:p14="http://schemas.microsoft.com/office/powerpoint/2010/main">
+          <mc:Choice Requires="p14">
             <p:contentPart p14:bwMode="auto" r:id="rId319">
               <p14:nvContentPartPr>
                 <p14:cNvPr id="265" name="Ink 264">
@@ -24174,7 +24182,7 @@
               </p14:xfrm>
             </p:contentPart>
           </mc:Choice>
-          <mc:Fallback>
+          <mc:Fallback xmlns="">
             <p:pic>
               <p:nvPicPr>
                 <p:cNvPr id="265" name="Ink 264">
@@ -24205,8 +24213,8 @@
             </p:pic>
           </mc:Fallback>
         </mc:AlternateContent>
-        <mc:AlternateContent xmlns:mc="http://schemas.openxmlformats.org/markup-compatibility/2006">
-          <mc:Choice xmlns:p14="http://schemas.microsoft.com/office/powerpoint/2010/main" Requires="p14">
+        <mc:AlternateContent xmlns:mc="http://schemas.openxmlformats.org/markup-compatibility/2006" xmlns:p14="http://schemas.microsoft.com/office/powerpoint/2010/main">
+          <mc:Choice Requires="p14">
             <p:contentPart p14:bwMode="auto" r:id="rId321">
               <p14:nvContentPartPr>
                 <p14:cNvPr id="266" name="Ink 265">
@@ -24225,7 +24233,7 @@
               </p14:xfrm>
             </p:contentPart>
           </mc:Choice>
-          <mc:Fallback>
+          <mc:Fallback xmlns="">
             <p:pic>
               <p:nvPicPr>
                 <p:cNvPr id="266" name="Ink 265">
@@ -24256,8 +24264,8 @@
             </p:pic>
           </mc:Fallback>
         </mc:AlternateContent>
-        <mc:AlternateContent xmlns:mc="http://schemas.openxmlformats.org/markup-compatibility/2006">
-          <mc:Choice xmlns:p14="http://schemas.microsoft.com/office/powerpoint/2010/main" Requires="p14">
+        <mc:AlternateContent xmlns:mc="http://schemas.openxmlformats.org/markup-compatibility/2006" xmlns:p14="http://schemas.microsoft.com/office/powerpoint/2010/main">
+          <mc:Choice Requires="p14">
             <p:contentPart p14:bwMode="auto" r:id="rId322">
               <p14:nvContentPartPr>
                 <p14:cNvPr id="267" name="Ink 266">
@@ -24276,7 +24284,7 @@
               </p14:xfrm>
             </p:contentPart>
           </mc:Choice>
-          <mc:Fallback>
+          <mc:Fallback xmlns="">
             <p:pic>
               <p:nvPicPr>
                 <p:cNvPr id="267" name="Ink 266">
@@ -24307,8 +24315,8 @@
             </p:pic>
           </mc:Fallback>
         </mc:AlternateContent>
-        <mc:AlternateContent xmlns:mc="http://schemas.openxmlformats.org/markup-compatibility/2006">
-          <mc:Choice xmlns:p14="http://schemas.microsoft.com/office/powerpoint/2010/main" Requires="p14">
+        <mc:AlternateContent xmlns:mc="http://schemas.openxmlformats.org/markup-compatibility/2006" xmlns:p14="http://schemas.microsoft.com/office/powerpoint/2010/main">
+          <mc:Choice Requires="p14">
             <p:contentPart p14:bwMode="auto" r:id="rId324">
               <p14:nvContentPartPr>
                 <p14:cNvPr id="270" name="Ink 269">
@@ -24327,7 +24335,7 @@
               </p14:xfrm>
             </p:contentPart>
           </mc:Choice>
-          <mc:Fallback>
+          <mc:Fallback xmlns="">
             <p:pic>
               <p:nvPicPr>
                 <p:cNvPr id="270" name="Ink 269">
@@ -24358,8 +24366,8 @@
             </p:pic>
           </mc:Fallback>
         </mc:AlternateContent>
-        <mc:AlternateContent xmlns:mc="http://schemas.openxmlformats.org/markup-compatibility/2006">
-          <mc:Choice xmlns:p14="http://schemas.microsoft.com/office/powerpoint/2010/main" Requires="p14">
+        <mc:AlternateContent xmlns:mc="http://schemas.openxmlformats.org/markup-compatibility/2006" xmlns:p14="http://schemas.microsoft.com/office/powerpoint/2010/main">
+          <mc:Choice Requires="p14">
             <p:contentPart p14:bwMode="auto" r:id="rId326">
               <p14:nvContentPartPr>
                 <p14:cNvPr id="271" name="Ink 270">
@@ -24378,7 +24386,7 @@
               </p14:xfrm>
             </p:contentPart>
           </mc:Choice>
-          <mc:Fallback>
+          <mc:Fallback xmlns="">
             <p:pic>
               <p:nvPicPr>
                 <p:cNvPr id="271" name="Ink 270">
@@ -24409,8 +24417,8 @@
             </p:pic>
           </mc:Fallback>
         </mc:AlternateContent>
-        <mc:AlternateContent xmlns:mc="http://schemas.openxmlformats.org/markup-compatibility/2006">
-          <mc:Choice xmlns:p14="http://schemas.microsoft.com/office/powerpoint/2010/main" Requires="p14">
+        <mc:AlternateContent xmlns:mc="http://schemas.openxmlformats.org/markup-compatibility/2006" xmlns:p14="http://schemas.microsoft.com/office/powerpoint/2010/main">
+          <mc:Choice Requires="p14">
             <p:contentPart p14:bwMode="auto" r:id="rId328">
               <p14:nvContentPartPr>
                 <p14:cNvPr id="272" name="Ink 271">
@@ -24429,7 +24437,7 @@
               </p14:xfrm>
             </p:contentPart>
           </mc:Choice>
-          <mc:Fallback>
+          <mc:Fallback xmlns="">
             <p:pic>
               <p:nvPicPr>
                 <p:cNvPr id="272" name="Ink 271">
@@ -24460,8 +24468,8 @@
             </p:pic>
           </mc:Fallback>
         </mc:AlternateContent>
-        <mc:AlternateContent xmlns:mc="http://schemas.openxmlformats.org/markup-compatibility/2006">
-          <mc:Choice xmlns:p14="http://schemas.microsoft.com/office/powerpoint/2010/main" Requires="p14">
+        <mc:AlternateContent xmlns:mc="http://schemas.openxmlformats.org/markup-compatibility/2006" xmlns:p14="http://schemas.microsoft.com/office/powerpoint/2010/main">
+          <mc:Choice Requires="p14">
             <p:contentPart p14:bwMode="auto" r:id="rId330">
               <p14:nvContentPartPr>
                 <p14:cNvPr id="273" name="Ink 272">
@@ -24480,7 +24488,7 @@
               </p14:xfrm>
             </p:contentPart>
           </mc:Choice>
-          <mc:Fallback>
+          <mc:Fallback xmlns="">
             <p:pic>
               <p:nvPicPr>
                 <p:cNvPr id="273" name="Ink 272">
@@ -24511,8 +24519,8 @@
             </p:pic>
           </mc:Fallback>
         </mc:AlternateContent>
-        <mc:AlternateContent xmlns:mc="http://schemas.openxmlformats.org/markup-compatibility/2006">
-          <mc:Choice xmlns:p14="http://schemas.microsoft.com/office/powerpoint/2010/main" Requires="p14">
+        <mc:AlternateContent xmlns:mc="http://schemas.openxmlformats.org/markup-compatibility/2006" xmlns:p14="http://schemas.microsoft.com/office/powerpoint/2010/main">
+          <mc:Choice Requires="p14">
             <p:contentPart p14:bwMode="auto" r:id="rId332">
               <p14:nvContentPartPr>
                 <p14:cNvPr id="274" name="Ink 273">
@@ -24531,7 +24539,7 @@
               </p14:xfrm>
             </p:contentPart>
           </mc:Choice>
-          <mc:Fallback>
+          <mc:Fallback xmlns="">
             <p:pic>
               <p:nvPicPr>
                 <p:cNvPr id="274" name="Ink 273">
@@ -24562,8 +24570,8 @@
             </p:pic>
           </mc:Fallback>
         </mc:AlternateContent>
-        <mc:AlternateContent xmlns:mc="http://schemas.openxmlformats.org/markup-compatibility/2006">
-          <mc:Choice xmlns:p14="http://schemas.microsoft.com/office/powerpoint/2010/main" Requires="p14">
+        <mc:AlternateContent xmlns:mc="http://schemas.openxmlformats.org/markup-compatibility/2006" xmlns:p14="http://schemas.microsoft.com/office/powerpoint/2010/main">
+          <mc:Choice Requires="p14">
             <p:contentPart p14:bwMode="auto" r:id="rId334">
               <p14:nvContentPartPr>
                 <p14:cNvPr id="330" name="Ink 329">
@@ -24582,7 +24590,7 @@
               </p14:xfrm>
             </p:contentPart>
           </mc:Choice>
-          <mc:Fallback>
+          <mc:Fallback xmlns="">
             <p:pic>
               <p:nvPicPr>
                 <p:cNvPr id="330" name="Ink 329">
@@ -24672,8 +24680,8 @@
           </a:p>
         </p:txBody>
       </p:sp>
-      <mc:AlternateContent xmlns:mc="http://schemas.openxmlformats.org/markup-compatibility/2006">
-        <mc:Choice xmlns:a14="http://schemas.microsoft.com/office/drawing/2010/main" Requires="a14">
+      <mc:AlternateContent xmlns:mc="http://schemas.openxmlformats.org/markup-compatibility/2006" xmlns:a14="http://schemas.microsoft.com/office/drawing/2010/main">
+        <mc:Choice Requires="a14">
           <p:sp>
             <p:nvSpPr>
               <p:cNvPr id="3" name="Content Placeholder 2">
@@ -24906,18 +24914,13 @@
               <a:p>
                 <a:r>
                   <a:rPr lang="en-PH" dirty="0"/>
-                  <a:t>For refitting: show same exponent? </a:t>
+                  <a:t>For refitting: show same exponent? Just shifted</a:t>
                 </a:r>
-                <a:r>
-                  <a:rPr lang="en-PH"/>
-                  <a:t>Just shifted</a:t>
-                </a:r>
-                <a:endParaRPr lang="en-PH" dirty="0"/>
               </a:p>
             </p:txBody>
           </p:sp>
         </mc:Choice>
-        <mc:Fallback>
+        <mc:Fallback xmlns="">
           <p:sp>
             <p:nvSpPr>
               <p:cNvPr id="3" name="Content Placeholder 2">
@@ -25044,6 +25047,944 @@
     <p:extLst>
       <p:ext uri="{BB962C8B-B14F-4D97-AF65-F5344CB8AC3E}">
         <p14:creationId xmlns:p14="http://schemas.microsoft.com/office/powerpoint/2010/main" val="1761395034"/>
+      </p:ext>
+    </p:extLst>
+  </p:cSld>
+  <p:clrMapOvr>
+    <a:masterClrMapping/>
+  </p:clrMapOvr>
+</p:sld>
+</file>
+
+<file path=ppt/slides/slide14.xml><?xml version="1.0" encoding="utf-8"?>
+<p:sld xmlns:a="http://schemas.openxmlformats.org/drawingml/2006/main" xmlns:r="http://schemas.openxmlformats.org/officeDocument/2006/relationships" xmlns:p="http://schemas.openxmlformats.org/presentationml/2006/main">
+  <p:cSld>
+    <p:spTree>
+      <p:nvGrpSpPr>
+        <p:cNvPr id="1" name=""/>
+        <p:cNvGrpSpPr/>
+        <p:nvPr/>
+      </p:nvGrpSpPr>
+      <p:grpSpPr>
+        <a:xfrm>
+          <a:off x="0" y="0"/>
+          <a:ext cx="0" cy="0"/>
+          <a:chOff x="0" y="0"/>
+          <a:chExt cx="0" cy="0"/>
+        </a:xfrm>
+      </p:grpSpPr>
+      <p:sp>
+        <p:nvSpPr>
+          <p:cNvPr id="2" name="Title 1">
+            <a:extLst>
+              <a:ext uri="{FF2B5EF4-FFF2-40B4-BE49-F238E27FC236}">
+                <a16:creationId xmlns:a16="http://schemas.microsoft.com/office/drawing/2014/main" id="{A572A1E4-22C4-E2EF-ACC9-85130558522B}"/>
+              </a:ext>
+            </a:extLst>
+          </p:cNvPr>
+          <p:cNvSpPr>
+            <a:spLocks noGrp="1"/>
+          </p:cNvSpPr>
+          <p:nvPr>
+            <p:ph type="title"/>
+          </p:nvPr>
+        </p:nvSpPr>
+        <p:spPr/>
+        <p:txBody>
+          <a:bodyPr/>
+          <a:lstStyle/>
+          <a:p>
+            <a:r>
+              <a:rPr lang="en-PH" dirty="0"/>
+              <a:t>Comparison plots - size</a:t>
+            </a:r>
+          </a:p>
+        </p:txBody>
+      </p:sp>
+      <p:pic>
+        <p:nvPicPr>
+          <p:cNvPr id="14" name="Content Placeholder 13" descr="A graph of different colored lines&#10;&#10;Description automatically generated">
+            <a:extLst>
+              <a:ext uri="{FF2B5EF4-FFF2-40B4-BE49-F238E27FC236}">
+                <a16:creationId xmlns:a16="http://schemas.microsoft.com/office/drawing/2014/main" id="{01D2446D-21BC-38B5-DAC3-6ECA9C8E8660}"/>
+              </a:ext>
+            </a:extLst>
+          </p:cNvPr>
+          <p:cNvPicPr>
+            <a:picLocks noGrp="1" noChangeAspect="1"/>
+          </p:cNvPicPr>
+          <p:nvPr>
+            <p:ph idx="1"/>
+          </p:nvPr>
+        </p:nvPicPr>
+        <p:blipFill>
+          <a:blip r:embed="rId2">
+            <a:extLst>
+              <a:ext uri="{28A0092B-C50C-407E-A947-70E740481C1C}">
+                <a14:useLocalDpi xmlns:a14="http://schemas.microsoft.com/office/drawing/2010/main" val="0"/>
+              </a:ext>
+            </a:extLst>
+          </a:blip>
+          <a:stretch>
+            <a:fillRect/>
+          </a:stretch>
+        </p:blipFill>
+        <p:spPr>
+          <a:xfrm>
+            <a:off x="2393156" y="1733550"/>
+            <a:ext cx="7405688" cy="4443413"/>
+          </a:xfrm>
+        </p:spPr>
+      </p:pic>
+      <p:sp>
+        <p:nvSpPr>
+          <p:cNvPr id="4" name="Slide Number Placeholder 3">
+            <a:extLst>
+              <a:ext uri="{FF2B5EF4-FFF2-40B4-BE49-F238E27FC236}">
+                <a16:creationId xmlns:a16="http://schemas.microsoft.com/office/drawing/2014/main" id="{04D73454-DE32-7A9E-9CEC-E2E590CD7AA4}"/>
+              </a:ext>
+            </a:extLst>
+          </p:cNvPr>
+          <p:cNvSpPr>
+            <a:spLocks noGrp="1"/>
+          </p:cNvSpPr>
+          <p:nvPr>
+            <p:ph type="sldNum" sz="quarter" idx="12"/>
+          </p:nvPr>
+        </p:nvSpPr>
+        <p:spPr/>
+        <p:txBody>
+          <a:bodyPr/>
+          <a:lstStyle/>
+          <a:p>
+            <a:fld id="{32177519-FDB5-46C8-A273-662D2447F0A4}" type="slidenum">
+              <a:rPr lang="en-PH" smtClean="0"/>
+              <a:t>14</a:t>
+            </a:fld>
+            <a:endParaRPr lang="en-PH"/>
+          </a:p>
+        </p:txBody>
+      </p:sp>
+      <p:sp>
+        <p:nvSpPr>
+          <p:cNvPr id="5" name="Footer Placeholder 4">
+            <a:extLst>
+              <a:ext uri="{FF2B5EF4-FFF2-40B4-BE49-F238E27FC236}">
+                <a16:creationId xmlns:a16="http://schemas.microsoft.com/office/drawing/2014/main" id="{96ED67AF-957A-1D51-157E-927D9CBC0FDB}"/>
+              </a:ext>
+            </a:extLst>
+          </p:cNvPr>
+          <p:cNvSpPr>
+            <a:spLocks noGrp="1"/>
+          </p:cNvSpPr>
+          <p:nvPr>
+            <p:ph type="ftr" sz="quarter" idx="3"/>
+          </p:nvPr>
+        </p:nvSpPr>
+        <p:spPr/>
+        <p:txBody>
+          <a:bodyPr/>
+          <a:lstStyle/>
+          <a:p>
+            <a:endParaRPr lang="en-PH" dirty="0"/>
+          </a:p>
+        </p:txBody>
+      </p:sp>
+      <p:sp>
+        <p:nvSpPr>
+          <p:cNvPr id="6" name="Date Placeholder 5">
+            <a:extLst>
+              <a:ext uri="{FF2B5EF4-FFF2-40B4-BE49-F238E27FC236}">
+                <a16:creationId xmlns:a16="http://schemas.microsoft.com/office/drawing/2014/main" id="{9CA7948B-DF07-B2F8-0347-13DDA5B3C972}"/>
+              </a:ext>
+            </a:extLst>
+          </p:cNvPr>
+          <p:cNvSpPr>
+            <a:spLocks noGrp="1"/>
+          </p:cNvSpPr>
+          <p:nvPr>
+            <p:ph type="dt" sz="half" idx="2"/>
+          </p:nvPr>
+        </p:nvSpPr>
+        <p:spPr/>
+        <p:txBody>
+          <a:bodyPr/>
+          <a:lstStyle/>
+          <a:p>
+            <a:r>
+              <a:rPr lang="en-US"/>
+              <a:t>2024.09.19</a:t>
+            </a:r>
+            <a:endParaRPr lang="en-PH" dirty="0"/>
+          </a:p>
+        </p:txBody>
+      </p:sp>
+    </p:spTree>
+    <p:extLst>
+      <p:ext uri="{BB962C8B-B14F-4D97-AF65-F5344CB8AC3E}">
+        <p14:creationId xmlns:p14="http://schemas.microsoft.com/office/powerpoint/2010/main" val="2095587659"/>
+      </p:ext>
+    </p:extLst>
+  </p:cSld>
+  <p:clrMapOvr>
+    <a:masterClrMapping/>
+  </p:clrMapOvr>
+</p:sld>
+</file>
+
+<file path=ppt/slides/slide15.xml><?xml version="1.0" encoding="utf-8"?>
+<p:sld xmlns:a="http://schemas.openxmlformats.org/drawingml/2006/main" xmlns:r="http://schemas.openxmlformats.org/officeDocument/2006/relationships" xmlns:p="http://schemas.openxmlformats.org/presentationml/2006/main">
+  <p:cSld>
+    <p:spTree>
+      <p:nvGrpSpPr>
+        <p:cNvPr id="1" name=""/>
+        <p:cNvGrpSpPr/>
+        <p:nvPr/>
+      </p:nvGrpSpPr>
+      <p:grpSpPr>
+        <a:xfrm>
+          <a:off x="0" y="0"/>
+          <a:ext cx="0" cy="0"/>
+          <a:chOff x="0" y="0"/>
+          <a:chExt cx="0" cy="0"/>
+        </a:xfrm>
+      </p:grpSpPr>
+      <p:sp>
+        <p:nvSpPr>
+          <p:cNvPr id="2" name="Title 1">
+            <a:extLst>
+              <a:ext uri="{FF2B5EF4-FFF2-40B4-BE49-F238E27FC236}">
+                <a16:creationId xmlns:a16="http://schemas.microsoft.com/office/drawing/2014/main" id="{A2B084E9-0346-B309-F4A6-9376EE145DF6}"/>
+              </a:ext>
+            </a:extLst>
+          </p:cNvPr>
+          <p:cNvSpPr>
+            <a:spLocks noGrp="1"/>
+          </p:cNvSpPr>
+          <p:nvPr>
+            <p:ph type="title"/>
+          </p:nvPr>
+        </p:nvSpPr>
+        <p:spPr/>
+        <p:txBody>
+          <a:bodyPr/>
+          <a:lstStyle/>
+          <a:p>
+            <a:r>
+              <a:rPr lang="en-PH" dirty="0"/>
+              <a:t>Comparison plots - rho</a:t>
+            </a:r>
+          </a:p>
+        </p:txBody>
+      </p:sp>
+      <p:pic>
+        <p:nvPicPr>
+          <p:cNvPr id="8" name="Content Placeholder 7" descr="A diagram of different colored lines&#10;&#10;Description automatically generated">
+            <a:extLst>
+              <a:ext uri="{FF2B5EF4-FFF2-40B4-BE49-F238E27FC236}">
+                <a16:creationId xmlns:a16="http://schemas.microsoft.com/office/drawing/2014/main" id="{93498CF8-186A-0713-82C5-AA3B0030A3B5}"/>
+              </a:ext>
+            </a:extLst>
+          </p:cNvPr>
+          <p:cNvPicPr>
+            <a:picLocks noGrp="1" noChangeAspect="1"/>
+          </p:cNvPicPr>
+          <p:nvPr>
+            <p:ph idx="1"/>
+          </p:nvPr>
+        </p:nvPicPr>
+        <p:blipFill>
+          <a:blip r:embed="rId2">
+            <a:extLst>
+              <a:ext uri="{28A0092B-C50C-407E-A947-70E740481C1C}">
+                <a14:useLocalDpi xmlns:a14="http://schemas.microsoft.com/office/drawing/2010/main" val="0"/>
+              </a:ext>
+            </a:extLst>
+          </a:blip>
+          <a:stretch>
+            <a:fillRect/>
+          </a:stretch>
+        </p:blipFill>
+        <p:spPr>
+          <a:xfrm>
+            <a:off x="2393156" y="1733550"/>
+            <a:ext cx="7405688" cy="4443413"/>
+          </a:xfrm>
+        </p:spPr>
+      </p:pic>
+      <p:sp>
+        <p:nvSpPr>
+          <p:cNvPr id="4" name="Slide Number Placeholder 3">
+            <a:extLst>
+              <a:ext uri="{FF2B5EF4-FFF2-40B4-BE49-F238E27FC236}">
+                <a16:creationId xmlns:a16="http://schemas.microsoft.com/office/drawing/2014/main" id="{B5554856-6C72-0FC6-320B-A87BBD4528F3}"/>
+              </a:ext>
+            </a:extLst>
+          </p:cNvPr>
+          <p:cNvSpPr>
+            <a:spLocks noGrp="1"/>
+          </p:cNvSpPr>
+          <p:nvPr>
+            <p:ph type="sldNum" sz="quarter" idx="12"/>
+          </p:nvPr>
+        </p:nvSpPr>
+        <p:spPr/>
+        <p:txBody>
+          <a:bodyPr/>
+          <a:lstStyle/>
+          <a:p>
+            <a:fld id="{32177519-FDB5-46C8-A273-662D2447F0A4}" type="slidenum">
+              <a:rPr lang="en-PH" smtClean="0"/>
+              <a:t>15</a:t>
+            </a:fld>
+            <a:endParaRPr lang="en-PH"/>
+          </a:p>
+        </p:txBody>
+      </p:sp>
+      <p:sp>
+        <p:nvSpPr>
+          <p:cNvPr id="5" name="Footer Placeholder 4">
+            <a:extLst>
+              <a:ext uri="{FF2B5EF4-FFF2-40B4-BE49-F238E27FC236}">
+                <a16:creationId xmlns:a16="http://schemas.microsoft.com/office/drawing/2014/main" id="{9EEA7599-0C41-FCEA-B1A6-2B0C904A5621}"/>
+              </a:ext>
+            </a:extLst>
+          </p:cNvPr>
+          <p:cNvSpPr>
+            <a:spLocks noGrp="1"/>
+          </p:cNvSpPr>
+          <p:nvPr>
+            <p:ph type="ftr" sz="quarter" idx="3"/>
+          </p:nvPr>
+        </p:nvSpPr>
+        <p:spPr/>
+        <p:txBody>
+          <a:bodyPr/>
+          <a:lstStyle/>
+          <a:p>
+            <a:endParaRPr lang="en-PH" dirty="0"/>
+          </a:p>
+        </p:txBody>
+      </p:sp>
+      <p:sp>
+        <p:nvSpPr>
+          <p:cNvPr id="6" name="Date Placeholder 5">
+            <a:extLst>
+              <a:ext uri="{FF2B5EF4-FFF2-40B4-BE49-F238E27FC236}">
+                <a16:creationId xmlns:a16="http://schemas.microsoft.com/office/drawing/2014/main" id="{F455B8A6-4F1C-6BF6-86DF-E9DBDD878329}"/>
+              </a:ext>
+            </a:extLst>
+          </p:cNvPr>
+          <p:cNvSpPr>
+            <a:spLocks noGrp="1"/>
+          </p:cNvSpPr>
+          <p:nvPr>
+            <p:ph type="dt" sz="half" idx="2"/>
+          </p:nvPr>
+        </p:nvSpPr>
+        <p:spPr/>
+        <p:txBody>
+          <a:bodyPr/>
+          <a:lstStyle/>
+          <a:p>
+            <a:r>
+              <a:rPr lang="en-US"/>
+              <a:t>2024.09.19</a:t>
+            </a:r>
+            <a:endParaRPr lang="en-PH" dirty="0"/>
+          </a:p>
+        </p:txBody>
+      </p:sp>
+    </p:spTree>
+    <p:extLst>
+      <p:ext uri="{BB962C8B-B14F-4D97-AF65-F5344CB8AC3E}">
+        <p14:creationId xmlns:p14="http://schemas.microsoft.com/office/powerpoint/2010/main" val="2672773077"/>
+      </p:ext>
+    </p:extLst>
+  </p:cSld>
+  <p:clrMapOvr>
+    <a:masterClrMapping/>
+  </p:clrMapOvr>
+</p:sld>
+</file>
+
+<file path=ppt/slides/slide16.xml><?xml version="1.0" encoding="utf-8"?>
+<p:sld xmlns:a="http://schemas.openxmlformats.org/drawingml/2006/main" xmlns:r="http://schemas.openxmlformats.org/officeDocument/2006/relationships" xmlns:p="http://schemas.openxmlformats.org/presentationml/2006/main">
+  <p:cSld>
+    <p:spTree>
+      <p:nvGrpSpPr>
+        <p:cNvPr id="1" name=""/>
+        <p:cNvGrpSpPr/>
+        <p:nvPr/>
+      </p:nvGrpSpPr>
+      <p:grpSpPr>
+        <a:xfrm>
+          <a:off x="0" y="0"/>
+          <a:ext cx="0" cy="0"/>
+          <a:chOff x="0" y="0"/>
+          <a:chExt cx="0" cy="0"/>
+        </a:xfrm>
+      </p:grpSpPr>
+      <p:sp>
+        <p:nvSpPr>
+          <p:cNvPr id="2" name="Title 1">
+            <a:extLst>
+              <a:ext uri="{FF2B5EF4-FFF2-40B4-BE49-F238E27FC236}">
+                <a16:creationId xmlns:a16="http://schemas.microsoft.com/office/drawing/2014/main" id="{062A14FE-C01F-D242-5475-64C469E2D75C}"/>
+              </a:ext>
+            </a:extLst>
+          </p:cNvPr>
+          <p:cNvSpPr>
+            <a:spLocks noGrp="1"/>
+          </p:cNvSpPr>
+          <p:nvPr>
+            <p:ph type="title"/>
+          </p:nvPr>
+        </p:nvSpPr>
+        <p:spPr/>
+        <p:txBody>
+          <a:bodyPr/>
+          <a:lstStyle/>
+          <a:p>
+            <a:r>
+              <a:rPr lang="en-PH" dirty="0"/>
+              <a:t>Comparison plots - delta</a:t>
+            </a:r>
+          </a:p>
+        </p:txBody>
+      </p:sp>
+      <p:pic>
+        <p:nvPicPr>
+          <p:cNvPr id="8" name="Content Placeholder 7" descr="A graph of different colored dots&#10;&#10;Description automatically generated">
+            <a:extLst>
+              <a:ext uri="{FF2B5EF4-FFF2-40B4-BE49-F238E27FC236}">
+                <a16:creationId xmlns:a16="http://schemas.microsoft.com/office/drawing/2014/main" id="{27C5A426-3CEE-F6CE-7F01-1FF74FCECC3C}"/>
+              </a:ext>
+            </a:extLst>
+          </p:cNvPr>
+          <p:cNvPicPr>
+            <a:picLocks noGrp="1" noChangeAspect="1"/>
+          </p:cNvPicPr>
+          <p:nvPr>
+            <p:ph idx="1"/>
+          </p:nvPr>
+        </p:nvPicPr>
+        <p:blipFill>
+          <a:blip r:embed="rId2">
+            <a:extLst>
+              <a:ext uri="{28A0092B-C50C-407E-A947-70E740481C1C}">
+                <a14:useLocalDpi xmlns:a14="http://schemas.microsoft.com/office/drawing/2010/main" val="0"/>
+              </a:ext>
+            </a:extLst>
+          </a:blip>
+          <a:stretch>
+            <a:fillRect/>
+          </a:stretch>
+        </p:blipFill>
+        <p:spPr>
+          <a:xfrm>
+            <a:off x="2393156" y="1733550"/>
+            <a:ext cx="7405688" cy="4443413"/>
+          </a:xfrm>
+        </p:spPr>
+      </p:pic>
+      <p:sp>
+        <p:nvSpPr>
+          <p:cNvPr id="4" name="Slide Number Placeholder 3">
+            <a:extLst>
+              <a:ext uri="{FF2B5EF4-FFF2-40B4-BE49-F238E27FC236}">
+                <a16:creationId xmlns:a16="http://schemas.microsoft.com/office/drawing/2014/main" id="{8B9A152C-34D4-B124-AAE2-1CD852F84710}"/>
+              </a:ext>
+            </a:extLst>
+          </p:cNvPr>
+          <p:cNvSpPr>
+            <a:spLocks noGrp="1"/>
+          </p:cNvSpPr>
+          <p:nvPr>
+            <p:ph type="sldNum" sz="quarter" idx="12"/>
+          </p:nvPr>
+        </p:nvSpPr>
+        <p:spPr/>
+        <p:txBody>
+          <a:bodyPr/>
+          <a:lstStyle/>
+          <a:p>
+            <a:fld id="{32177519-FDB5-46C8-A273-662D2447F0A4}" type="slidenum">
+              <a:rPr lang="en-PH" smtClean="0"/>
+              <a:t>16</a:t>
+            </a:fld>
+            <a:endParaRPr lang="en-PH"/>
+          </a:p>
+        </p:txBody>
+      </p:sp>
+      <p:sp>
+        <p:nvSpPr>
+          <p:cNvPr id="5" name="Footer Placeholder 4">
+            <a:extLst>
+              <a:ext uri="{FF2B5EF4-FFF2-40B4-BE49-F238E27FC236}">
+                <a16:creationId xmlns:a16="http://schemas.microsoft.com/office/drawing/2014/main" id="{EC90FB12-D739-6DCB-8FFE-BD4743047F85}"/>
+              </a:ext>
+            </a:extLst>
+          </p:cNvPr>
+          <p:cNvSpPr>
+            <a:spLocks noGrp="1"/>
+          </p:cNvSpPr>
+          <p:nvPr>
+            <p:ph type="ftr" sz="quarter" idx="3"/>
+          </p:nvPr>
+        </p:nvSpPr>
+        <p:spPr/>
+        <p:txBody>
+          <a:bodyPr/>
+          <a:lstStyle/>
+          <a:p>
+            <a:endParaRPr lang="en-PH" dirty="0"/>
+          </a:p>
+        </p:txBody>
+      </p:sp>
+      <p:sp>
+        <p:nvSpPr>
+          <p:cNvPr id="6" name="Date Placeholder 5">
+            <a:extLst>
+              <a:ext uri="{FF2B5EF4-FFF2-40B4-BE49-F238E27FC236}">
+                <a16:creationId xmlns:a16="http://schemas.microsoft.com/office/drawing/2014/main" id="{7BF4C275-F320-B381-757C-6440C610E688}"/>
+              </a:ext>
+            </a:extLst>
+          </p:cNvPr>
+          <p:cNvSpPr>
+            <a:spLocks noGrp="1"/>
+          </p:cNvSpPr>
+          <p:nvPr>
+            <p:ph type="dt" sz="half" idx="2"/>
+          </p:nvPr>
+        </p:nvSpPr>
+        <p:spPr/>
+        <p:txBody>
+          <a:bodyPr/>
+          <a:lstStyle/>
+          <a:p>
+            <a:r>
+              <a:rPr lang="en-US"/>
+              <a:t>2024.09.19</a:t>
+            </a:r>
+            <a:endParaRPr lang="en-PH" dirty="0"/>
+          </a:p>
+        </p:txBody>
+      </p:sp>
+    </p:spTree>
+    <p:extLst>
+      <p:ext uri="{BB962C8B-B14F-4D97-AF65-F5344CB8AC3E}">
+        <p14:creationId xmlns:p14="http://schemas.microsoft.com/office/powerpoint/2010/main" val="954930436"/>
+      </p:ext>
+    </p:extLst>
+  </p:cSld>
+  <p:clrMapOvr>
+    <a:masterClrMapping/>
+  </p:clrMapOvr>
+</p:sld>
+</file>
+
+<file path=ppt/slides/slide17.xml><?xml version="1.0" encoding="utf-8"?>
+<p:sld xmlns:a="http://schemas.openxmlformats.org/drawingml/2006/main" xmlns:r="http://schemas.openxmlformats.org/officeDocument/2006/relationships" xmlns:p="http://schemas.openxmlformats.org/presentationml/2006/main">
+  <p:cSld>
+    <p:spTree>
+      <p:nvGrpSpPr>
+        <p:cNvPr id="1" name=""/>
+        <p:cNvGrpSpPr/>
+        <p:nvPr/>
+      </p:nvGrpSpPr>
+      <p:grpSpPr>
+        <a:xfrm>
+          <a:off x="0" y="0"/>
+          <a:ext cx="0" cy="0"/>
+          <a:chOff x="0" y="0"/>
+          <a:chExt cx="0" cy="0"/>
+        </a:xfrm>
+      </p:grpSpPr>
+      <p:sp>
+        <p:nvSpPr>
+          <p:cNvPr id="2" name="Title 1">
+            <a:extLst>
+              <a:ext uri="{FF2B5EF4-FFF2-40B4-BE49-F238E27FC236}">
+                <a16:creationId xmlns:a16="http://schemas.microsoft.com/office/drawing/2014/main" id="{D76B4391-717B-D651-135D-CB81199316AA}"/>
+              </a:ext>
+            </a:extLst>
+          </p:cNvPr>
+          <p:cNvSpPr>
+            <a:spLocks noGrp="1"/>
+          </p:cNvSpPr>
+          <p:nvPr>
+            <p:ph type="title"/>
+          </p:nvPr>
+        </p:nvSpPr>
+        <p:spPr/>
+        <p:txBody>
+          <a:bodyPr>
+            <a:normAutofit/>
+          </a:bodyPr>
+          <a:lstStyle/>
+          <a:p>
+            <a:r>
+              <a:rPr lang="en-PH" dirty="0"/>
+              <a:t>Parameter effects</a:t>
+            </a:r>
+          </a:p>
+        </p:txBody>
+      </p:sp>
+      <p:graphicFrame>
+        <p:nvGraphicFramePr>
+          <p:cNvPr id="7" name="Content Placeholder 6">
+            <a:extLst>
+              <a:ext uri="{FF2B5EF4-FFF2-40B4-BE49-F238E27FC236}">
+                <a16:creationId xmlns:a16="http://schemas.microsoft.com/office/drawing/2014/main" id="{F548CECF-5EFF-7877-C9DA-74987C65D9CC}"/>
+              </a:ext>
+            </a:extLst>
+          </p:cNvPr>
+          <p:cNvGraphicFramePr>
+            <a:graphicFrameLocks noGrp="1"/>
+          </p:cNvGraphicFramePr>
+          <p:nvPr>
+            <p:ph idx="1"/>
+            <p:extLst>
+              <p:ext uri="{D42A27DB-BD31-4B8C-83A1-F6EECF244321}">
+                <p14:modId xmlns:p14="http://schemas.microsoft.com/office/powerpoint/2010/main" val="3849357007"/>
+              </p:ext>
+            </p:extLst>
+          </p:nvPr>
+        </p:nvGraphicFramePr>
+        <p:xfrm>
+          <a:off x="282575" y="1733550"/>
+          <a:ext cx="11626847" cy="3352800"/>
+        </p:xfrm>
+        <a:graphic>
+          <a:graphicData uri="http://schemas.openxmlformats.org/drawingml/2006/table">
+            <a:tbl>
+              <a:tblPr firstRow="1" bandRow="1">
+                <a:tableStyleId>{5C22544A-7EE6-4342-B048-85BDC9FD1C3A}</a:tableStyleId>
+              </a:tblPr>
+              <a:tblGrid>
+                <a:gridCol w="1231899">
+                  <a:extLst>
+                    <a:ext uri="{9D8B030D-6E8A-4147-A177-3AD203B41FA5}">
+                      <a16:colId xmlns:a16="http://schemas.microsoft.com/office/drawing/2014/main" val="2457077897"/>
+                    </a:ext>
+                  </a:extLst>
+                </a:gridCol>
+                <a:gridCol w="6183631">
+                  <a:extLst>
+                    <a:ext uri="{9D8B030D-6E8A-4147-A177-3AD203B41FA5}">
+                      <a16:colId xmlns:a16="http://schemas.microsoft.com/office/drawing/2014/main" val="2526923209"/>
+                    </a:ext>
+                  </a:extLst>
+                </a:gridCol>
+                <a:gridCol w="4211317">
+                  <a:extLst>
+                    <a:ext uri="{9D8B030D-6E8A-4147-A177-3AD203B41FA5}">
+                      <a16:colId xmlns:a16="http://schemas.microsoft.com/office/drawing/2014/main" val="2279009087"/>
+                    </a:ext>
+                  </a:extLst>
+                </a:gridCol>
+              </a:tblGrid>
+              <a:tr h="370840">
+                <a:tc>
+                  <a:txBody>
+                    <a:bodyPr/>
+                    <a:lstStyle/>
+                    <a:p>
+                      <a:pPr algn="ctr"/>
+                      <a:endParaRPr lang="en-PH" sz="2800" dirty="0"/>
+                    </a:p>
+                  </a:txBody>
+                  <a:tcPr/>
+                </a:tc>
+                <a:tc>
+                  <a:txBody>
+                    <a:bodyPr/>
+                    <a:lstStyle/>
+                    <a:p>
+                      <a:pPr algn="ctr"/>
+                      <a:r>
+                        <a:rPr lang="en-PH" sz="2800" dirty="0"/>
+                        <a:t>Traditional</a:t>
+                      </a:r>
+                    </a:p>
+                  </a:txBody>
+                  <a:tcPr/>
+                </a:tc>
+                <a:tc>
+                  <a:txBody>
+                    <a:bodyPr/>
+                    <a:lstStyle/>
+                    <a:p>
+                      <a:pPr algn="ctr"/>
+                      <a:r>
+                        <a:rPr lang="en-PH" sz="2800" dirty="0"/>
+                        <a:t>PI</a:t>
+                      </a:r>
+                    </a:p>
+                  </a:txBody>
+                  <a:tcPr/>
+                </a:tc>
+                <a:extLst>
+                  <a:ext uri="{0D108BD9-81ED-4DB2-BD59-A6C34878D82A}">
+                    <a16:rowId xmlns:a16="http://schemas.microsoft.com/office/drawing/2014/main" val="497569398"/>
+                  </a:ext>
+                </a:extLst>
+              </a:tr>
+              <a:tr h="370840">
+                <a:tc>
+                  <a:txBody>
+                    <a:bodyPr/>
+                    <a:lstStyle/>
+                    <a:p>
+                      <a:pPr algn="ctr"/>
+                      <a:r>
+                        <a:rPr lang="en-PH" sz="2800" dirty="0"/>
+                        <a:t>size</a:t>
+                      </a:r>
+                    </a:p>
+                  </a:txBody>
+                  <a:tcPr/>
+                </a:tc>
+                <a:tc>
+                  <a:txBody>
+                    <a:bodyPr/>
+                    <a:lstStyle/>
+                    <a:p>
+                      <a:pPr algn="l"/>
+                      <a:r>
+                        <a:rPr lang="en-PH" sz="2800"/>
+                        <a:t>Lengthens the </a:t>
+                      </a:r>
+                      <a:r>
+                        <a:rPr lang="en-PH" sz="2800" dirty="0"/>
+                        <a:t>tail length near completion (</a:t>
+                      </a:r>
+                      <a:r>
+                        <a:rPr lang="en-PH" sz="2800" dirty="0" err="1"/>
+                        <a:t>t_max</a:t>
+                      </a:r>
+                      <a:r>
+                        <a:rPr lang="en-PH" sz="2800" dirty="0"/>
+                        <a:t>)</a:t>
+                      </a:r>
+                    </a:p>
+                  </a:txBody>
+                  <a:tcPr/>
+                </a:tc>
+                <a:tc>
+                  <a:txBody>
+                    <a:bodyPr/>
+                    <a:lstStyle/>
+                    <a:p>
+                      <a:pPr algn="l"/>
+                      <a:r>
+                        <a:rPr lang="en-PH" sz="2800" dirty="0"/>
+                        <a:t>Shift horizontal– more time delay before speed up</a:t>
+                      </a:r>
+                    </a:p>
+                  </a:txBody>
+                  <a:tcPr/>
+                </a:tc>
+                <a:extLst>
+                  <a:ext uri="{0D108BD9-81ED-4DB2-BD59-A6C34878D82A}">
+                    <a16:rowId xmlns:a16="http://schemas.microsoft.com/office/drawing/2014/main" val="633935993"/>
+                  </a:ext>
+                </a:extLst>
+              </a:tr>
+              <a:tr h="370840">
+                <a:tc>
+                  <a:txBody>
+                    <a:bodyPr/>
+                    <a:lstStyle/>
+                    <a:p>
+                      <a:pPr algn="ctr"/>
+                      <a:r>
+                        <a:rPr lang="en-PH" sz="2800" dirty="0"/>
+                        <a:t>rho</a:t>
+                      </a:r>
+                    </a:p>
+                  </a:txBody>
+                  <a:tcPr/>
+                </a:tc>
+                <a:tc gridSpan="2">
+                  <a:txBody>
+                    <a:bodyPr/>
+                    <a:lstStyle/>
+                    <a:p>
+                      <a:pPr algn="l"/>
+                      <a:r>
+                        <a:rPr lang="en-PH" sz="2800" dirty="0"/>
+                        <a:t>Scaling – lengthening and shortening of curves. Earlier is affected more but </a:t>
+                      </a:r>
+                      <a:r>
+                        <a:rPr lang="en-PH" sz="2800" dirty="0" err="1"/>
+                        <a:t>bec</a:t>
+                      </a:r>
+                      <a:r>
+                        <a:rPr lang="en-PH" sz="2800" dirty="0"/>
+                        <a:t> it’s in log scale</a:t>
+                      </a:r>
+                    </a:p>
+                  </a:txBody>
+                  <a:tcPr/>
+                </a:tc>
+                <a:tc hMerge="1">
+                  <a:txBody>
+                    <a:bodyPr/>
+                    <a:lstStyle/>
+                    <a:p>
+                      <a:endParaRPr lang="en-PH"/>
+                    </a:p>
+                  </a:txBody>
+                  <a:tcPr/>
+                </a:tc>
+                <a:extLst>
+                  <a:ext uri="{0D108BD9-81ED-4DB2-BD59-A6C34878D82A}">
+                    <a16:rowId xmlns:a16="http://schemas.microsoft.com/office/drawing/2014/main" val="4213738901"/>
+                  </a:ext>
+                </a:extLst>
+              </a:tr>
+              <a:tr h="370840">
+                <a:tc>
+                  <a:txBody>
+                    <a:bodyPr/>
+                    <a:lstStyle/>
+                    <a:p>
+                      <a:pPr algn="ctr"/>
+                      <a:r>
+                        <a:rPr lang="en-PH" sz="2800" dirty="0"/>
+                        <a:t>delta</a:t>
+                      </a:r>
+                    </a:p>
+                  </a:txBody>
+                  <a:tcPr/>
+                </a:tc>
+                <a:tc>
+                  <a:txBody>
+                    <a:bodyPr/>
+                    <a:lstStyle/>
+                    <a:p>
+                      <a:pPr algn="l"/>
+                      <a:r>
+                        <a:rPr lang="en-PH" sz="2800" dirty="0"/>
+                        <a:t>How fast the derivative/slope changes</a:t>
+                      </a:r>
+                    </a:p>
+                  </a:txBody>
+                  <a:tcPr/>
+                </a:tc>
+                <a:tc>
+                  <a:txBody>
+                    <a:bodyPr/>
+                    <a:lstStyle/>
+                    <a:p>
+                      <a:pPr algn="l"/>
+                      <a:r>
+                        <a:rPr lang="en-PH" sz="2800" dirty="0"/>
+                        <a:t>Minimal shifting</a:t>
+                      </a:r>
+                    </a:p>
+                  </a:txBody>
+                  <a:tcPr/>
+                </a:tc>
+                <a:extLst>
+                  <a:ext uri="{0D108BD9-81ED-4DB2-BD59-A6C34878D82A}">
+                    <a16:rowId xmlns:a16="http://schemas.microsoft.com/office/drawing/2014/main" val="1657905999"/>
+                  </a:ext>
+                </a:extLst>
+              </a:tr>
+            </a:tbl>
+          </a:graphicData>
+        </a:graphic>
+      </p:graphicFrame>
+      <p:sp>
+        <p:nvSpPr>
+          <p:cNvPr id="4" name="Slide Number Placeholder 3">
+            <a:extLst>
+              <a:ext uri="{FF2B5EF4-FFF2-40B4-BE49-F238E27FC236}">
+                <a16:creationId xmlns:a16="http://schemas.microsoft.com/office/drawing/2014/main" id="{4A65D2E7-9672-94B3-D3C0-8EEDBF7A106D}"/>
+              </a:ext>
+            </a:extLst>
+          </p:cNvPr>
+          <p:cNvSpPr>
+            <a:spLocks noGrp="1"/>
+          </p:cNvSpPr>
+          <p:nvPr>
+            <p:ph type="sldNum" sz="quarter" idx="12"/>
+          </p:nvPr>
+        </p:nvSpPr>
+        <p:spPr/>
+        <p:txBody>
+          <a:bodyPr/>
+          <a:lstStyle/>
+          <a:p>
+            <a:fld id="{32177519-FDB5-46C8-A273-662D2447F0A4}" type="slidenum">
+              <a:rPr lang="en-PH" smtClean="0"/>
+              <a:t>17</a:t>
+            </a:fld>
+            <a:endParaRPr lang="en-PH"/>
+          </a:p>
+        </p:txBody>
+      </p:sp>
+      <p:sp>
+        <p:nvSpPr>
+          <p:cNvPr id="5" name="Footer Placeholder 4">
+            <a:extLst>
+              <a:ext uri="{FF2B5EF4-FFF2-40B4-BE49-F238E27FC236}">
+                <a16:creationId xmlns:a16="http://schemas.microsoft.com/office/drawing/2014/main" id="{92C8C0A8-06AD-B990-68B7-A34FE143E11C}"/>
+              </a:ext>
+            </a:extLst>
+          </p:cNvPr>
+          <p:cNvSpPr>
+            <a:spLocks noGrp="1"/>
+          </p:cNvSpPr>
+          <p:nvPr>
+            <p:ph type="ftr" sz="quarter" idx="3"/>
+          </p:nvPr>
+        </p:nvSpPr>
+        <p:spPr/>
+        <p:txBody>
+          <a:bodyPr/>
+          <a:lstStyle/>
+          <a:p>
+            <a:endParaRPr lang="en-PH" dirty="0"/>
+          </a:p>
+        </p:txBody>
+      </p:sp>
+      <p:sp>
+        <p:nvSpPr>
+          <p:cNvPr id="6" name="Date Placeholder 5">
+            <a:extLst>
+              <a:ext uri="{FF2B5EF4-FFF2-40B4-BE49-F238E27FC236}">
+                <a16:creationId xmlns:a16="http://schemas.microsoft.com/office/drawing/2014/main" id="{D92EF55F-6504-131C-0803-19D1810361CC}"/>
+              </a:ext>
+            </a:extLst>
+          </p:cNvPr>
+          <p:cNvSpPr>
+            <a:spLocks noGrp="1"/>
+          </p:cNvSpPr>
+          <p:nvPr>
+            <p:ph type="dt" sz="half" idx="2"/>
+          </p:nvPr>
+        </p:nvSpPr>
+        <p:spPr/>
+        <p:txBody>
+          <a:bodyPr/>
+          <a:lstStyle/>
+          <a:p>
+            <a:r>
+              <a:rPr lang="en-US"/>
+              <a:t>2024.09.19</a:t>
+            </a:r>
+            <a:endParaRPr lang="en-PH" dirty="0"/>
+          </a:p>
+        </p:txBody>
+      </p:sp>
+    </p:spTree>
+    <p:extLst>
+      <p:ext uri="{BB962C8B-B14F-4D97-AF65-F5344CB8AC3E}">
+        <p14:creationId xmlns:p14="http://schemas.microsoft.com/office/powerpoint/2010/main" val="1756737845"/>
       </p:ext>
     </p:extLst>
   </p:cSld>

</xml_diff>